<commit_message>
linked list 예제 파일 추가
</commit_message>
<xml_diff>
--- a/presentation/array_java_api.pptx
+++ b/presentation/array_java_api.pptx
@@ -21,6 +21,12 @@
     <p:sldId id="279" r:id="rId15"/>
     <p:sldId id="269" r:id="rId16"/>
     <p:sldId id="276" r:id="rId17"/>
+    <p:sldId id="280" r:id="rId18"/>
+    <p:sldId id="281" r:id="rId19"/>
+    <p:sldId id="282" r:id="rId20"/>
+    <p:sldId id="283" r:id="rId21"/>
+    <p:sldId id="284" r:id="rId22"/>
+    <p:sldId id="285" r:id="rId23"/>
   </p:sldIdLst>
   <p:sldSz cx="12192000" cy="6858000"/>
   <p:notesSz cx="6858000" cy="9144000"/>
@@ -3955,9 +3961,1962 @@
             <p:grpSpPr>
               <a:xfrm>
                 <a:off x="3035560" y="2640086"/>
-                <a:ext cx="1036289" cy="1095195"/>
+                <a:ext cx="1036289" cy="1135372"/>
                 <a:chOff x="1877654" y="1556951"/>
-                <a:chExt cx="873783" cy="839506"/>
+                <a:chExt cx="873783" cy="870303"/>
+              </a:xfrm>
+            </p:grpSpPr>
+            <p:sp>
+              <p:nvSpPr>
+                <p:cNvPr id="20" name="모서리가 둥근 직사각형 19"/>
+                <p:cNvSpPr/>
+                <p:nvPr/>
+              </p:nvSpPr>
+              <p:spPr>
+                <a:xfrm flipH="1">
+                  <a:off x="1881293" y="1556951"/>
+                  <a:ext cx="870144" cy="839506"/>
+                </a:xfrm>
+                <a:prstGeom prst="roundRect">
+                  <a:avLst>
+                    <a:gd name="adj" fmla="val 10749"/>
+                  </a:avLst>
+                </a:prstGeom>
+                <a:noFill/>
+                <a:ln w="38100">
+                  <a:solidFill>
+                    <a:schemeClr val="tx1"/>
+                  </a:solidFill>
+                </a:ln>
+              </p:spPr>
+              <p:style>
+                <a:lnRef idx="2">
+                  <a:schemeClr val="accent1">
+                    <a:shade val="50000"/>
+                  </a:schemeClr>
+                </a:lnRef>
+                <a:fillRef idx="1">
+                  <a:schemeClr val="accent1"/>
+                </a:fillRef>
+                <a:effectRef idx="0">
+                  <a:schemeClr val="accent1"/>
+                </a:effectRef>
+                <a:fontRef idx="minor">
+                  <a:schemeClr val="lt1"/>
+                </a:fontRef>
+              </p:style>
+              <p:txBody>
+                <a:bodyPr rot="0" spcFirstLastPara="0" vertOverflow="overflow" horzOverflow="overflow" vert="horz" wrap="square" lIns="68579" tIns="34290" rIns="68579" bIns="34290" numCol="1" spcCol="0" rtlCol="0" fromWordArt="0" anchor="ctr" anchorCtr="0" forceAA="0" compatLnSpc="1">
+                  <a:prstTxWarp prst="textNoShape">
+                    <a:avLst/>
+                  </a:prstTxWarp>
+                  <a:noAutofit/>
+                </a:bodyPr>
+                <a:lstStyle/>
+                <a:p>
+                  <a:pPr algn="ctr"/>
+                  <a:endParaRPr lang="ko-KR" altLang="en-US" sz="1350" dirty="0">
+                    <a:ln w="38100">
+                      <a:solidFill>
+                        <a:srgbClr val="333333"/>
+                      </a:solidFill>
+                    </a:ln>
+                    <a:solidFill>
+                      <a:schemeClr val="tx1"/>
+                    </a:solidFill>
+                  </a:endParaRPr>
+                </a:p>
+              </p:txBody>
+            </p:sp>
+            <p:cxnSp>
+              <p:nvCxnSpPr>
+                <p:cNvPr id="21" name="직선 연결선 20"/>
+                <p:cNvCxnSpPr/>
+                <p:nvPr/>
+              </p:nvCxnSpPr>
+              <p:spPr>
+                <a:xfrm>
+                  <a:off x="1881293" y="2117124"/>
+                  <a:ext cx="870144" cy="0"/>
+                </a:xfrm>
+                <a:prstGeom prst="line">
+                  <a:avLst/>
+                </a:prstGeom>
+                <a:ln w="38100">
+                  <a:solidFill>
+                    <a:schemeClr val="tx1"/>
+                  </a:solidFill>
+                </a:ln>
+              </p:spPr>
+              <p:style>
+                <a:lnRef idx="1">
+                  <a:schemeClr val="accent1"/>
+                </a:lnRef>
+                <a:fillRef idx="0">
+                  <a:schemeClr val="accent1"/>
+                </a:fillRef>
+                <a:effectRef idx="0">
+                  <a:schemeClr val="accent1"/>
+                </a:effectRef>
+                <a:fontRef idx="minor">
+                  <a:schemeClr val="tx1"/>
+                </a:fontRef>
+              </p:style>
+            </p:cxnSp>
+            <p:sp>
+              <p:nvSpPr>
+                <p:cNvPr id="22" name="TextBox 21"/>
+                <p:cNvSpPr txBox="1"/>
+                <p:nvPr/>
+              </p:nvSpPr>
+              <p:spPr>
+                <a:xfrm>
+                  <a:off x="1877654" y="2120555"/>
+                  <a:ext cx="870143" cy="306699"/>
+                </a:xfrm>
+                <a:prstGeom prst="rect">
+                  <a:avLst/>
+                </a:prstGeom>
+                <a:noFill/>
+                <a:ln>
+                  <a:noFill/>
+                </a:ln>
+              </p:spPr>
+              <p:txBody>
+                <a:bodyPr wrap="square" rtlCol="0">
+                  <a:spAutoFit/>
+                </a:bodyPr>
+                <a:lstStyle/>
+                <a:p>
+                  <a:pPr algn="ctr"/>
+                  <a:r>
+                    <a:rPr lang="en-US" altLang="ko-KR" sz="2000" dirty="0">
+                      <a:latin typeface="넥슨 풋볼고딕 B" panose="020B0803000000000000" pitchFamily="50" charset="-127"/>
+                      <a:ea typeface="넥슨 풋볼고딕 B" panose="020B0803000000000000" pitchFamily="50" charset="-127"/>
+                    </a:rPr>
+                    <a:t>0</a:t>
+                  </a:r>
+                  <a:endParaRPr lang="ko-KR" altLang="en-US" sz="2000" dirty="0">
+                    <a:latin typeface="넥슨 풋볼고딕 B" panose="020B0803000000000000" pitchFamily="50" charset="-127"/>
+                    <a:ea typeface="넥슨 풋볼고딕 B" panose="020B0803000000000000" pitchFamily="50" charset="-127"/>
+                  </a:endParaRPr>
+                </a:p>
+              </p:txBody>
+            </p:sp>
+            <p:sp>
+              <p:nvSpPr>
+                <p:cNvPr id="23" name="TextBox 22"/>
+                <p:cNvSpPr txBox="1"/>
+                <p:nvPr/>
+              </p:nvSpPr>
+              <p:spPr>
+                <a:xfrm>
+                  <a:off x="1877654" y="1679374"/>
+                  <a:ext cx="870143" cy="318494"/>
+                </a:xfrm>
+                <a:prstGeom prst="rect">
+                  <a:avLst/>
+                </a:prstGeom>
+                <a:noFill/>
+                <a:ln>
+                  <a:noFill/>
+                </a:ln>
+              </p:spPr>
+              <p:txBody>
+                <a:bodyPr wrap="square" rtlCol="0" anchor="ctr">
+                  <a:spAutoFit/>
+                </a:bodyPr>
+                <a:lstStyle/>
+                <a:p>
+                  <a:pPr algn="ctr"/>
+                  <a:r>
+                    <a:rPr lang="en-US" altLang="ko-KR" sz="2100" dirty="0" smtClean="0">
+                      <a:latin typeface="넥슨 풋볼고딕 B" panose="020B0803000000000000" pitchFamily="50" charset="-127"/>
+                      <a:ea typeface="넥슨 풋볼고딕 B" panose="020B0803000000000000" pitchFamily="50" charset="-127"/>
+                    </a:rPr>
+                    <a:t>10</a:t>
+                  </a:r>
+                  <a:endParaRPr lang="ko-KR" altLang="en-US" sz="2100" dirty="0">
+                    <a:latin typeface="넥슨 풋볼고딕 B" panose="020B0803000000000000" pitchFamily="50" charset="-127"/>
+                    <a:ea typeface="넥슨 풋볼고딕 B" panose="020B0803000000000000" pitchFamily="50" charset="-127"/>
+                  </a:endParaRPr>
+                </a:p>
+              </p:txBody>
+            </p:sp>
+          </p:grpSp>
+          <p:grpSp>
+            <p:nvGrpSpPr>
+              <p:cNvPr id="5" name="그룹 4"/>
+              <p:cNvGrpSpPr/>
+              <p:nvPr/>
+            </p:nvGrpSpPr>
+            <p:grpSpPr>
+              <a:xfrm>
+                <a:off x="4487804" y="2640086"/>
+                <a:ext cx="1036289" cy="1135372"/>
+                <a:chOff x="1877654" y="1556951"/>
+                <a:chExt cx="873783" cy="870303"/>
+              </a:xfrm>
+            </p:grpSpPr>
+            <p:sp>
+              <p:nvSpPr>
+                <p:cNvPr id="16" name="모서리가 둥근 직사각형 15"/>
+                <p:cNvSpPr/>
+                <p:nvPr/>
+              </p:nvSpPr>
+              <p:spPr>
+                <a:xfrm flipH="1">
+                  <a:off x="1881293" y="1556951"/>
+                  <a:ext cx="870144" cy="839506"/>
+                </a:xfrm>
+                <a:prstGeom prst="roundRect">
+                  <a:avLst>
+                    <a:gd name="adj" fmla="val 10749"/>
+                  </a:avLst>
+                </a:prstGeom>
+                <a:noFill/>
+                <a:ln w="38100">
+                  <a:solidFill>
+                    <a:schemeClr val="tx1"/>
+                  </a:solidFill>
+                </a:ln>
+              </p:spPr>
+              <p:style>
+                <a:lnRef idx="2">
+                  <a:schemeClr val="accent1">
+                    <a:shade val="50000"/>
+                  </a:schemeClr>
+                </a:lnRef>
+                <a:fillRef idx="1">
+                  <a:schemeClr val="accent1"/>
+                </a:fillRef>
+                <a:effectRef idx="0">
+                  <a:schemeClr val="accent1"/>
+                </a:effectRef>
+                <a:fontRef idx="minor">
+                  <a:schemeClr val="lt1"/>
+                </a:fontRef>
+              </p:style>
+              <p:txBody>
+                <a:bodyPr rot="0" spcFirstLastPara="0" vertOverflow="overflow" horzOverflow="overflow" vert="horz" wrap="square" lIns="68579" tIns="34290" rIns="68579" bIns="34290" numCol="1" spcCol="0" rtlCol="0" fromWordArt="0" anchor="ctr" anchorCtr="0" forceAA="0" compatLnSpc="1">
+                  <a:prstTxWarp prst="textNoShape">
+                    <a:avLst/>
+                  </a:prstTxWarp>
+                  <a:noAutofit/>
+                </a:bodyPr>
+                <a:lstStyle/>
+                <a:p>
+                  <a:pPr algn="ctr"/>
+                  <a:endParaRPr lang="ko-KR" altLang="en-US" sz="1350" dirty="0">
+                    <a:ln w="38100">
+                      <a:solidFill>
+                        <a:srgbClr val="333333"/>
+                      </a:solidFill>
+                    </a:ln>
+                    <a:solidFill>
+                      <a:schemeClr val="tx1"/>
+                    </a:solidFill>
+                  </a:endParaRPr>
+                </a:p>
+              </p:txBody>
+            </p:sp>
+            <p:cxnSp>
+              <p:nvCxnSpPr>
+                <p:cNvPr id="17" name="직선 연결선 16"/>
+                <p:cNvCxnSpPr/>
+                <p:nvPr/>
+              </p:nvCxnSpPr>
+              <p:spPr>
+                <a:xfrm>
+                  <a:off x="1881293" y="2117124"/>
+                  <a:ext cx="870144" cy="0"/>
+                </a:xfrm>
+                <a:prstGeom prst="line">
+                  <a:avLst/>
+                </a:prstGeom>
+                <a:ln w="38100">
+                  <a:solidFill>
+                    <a:schemeClr val="tx1"/>
+                  </a:solidFill>
+                </a:ln>
+              </p:spPr>
+              <p:style>
+                <a:lnRef idx="1">
+                  <a:schemeClr val="accent1"/>
+                </a:lnRef>
+                <a:fillRef idx="0">
+                  <a:schemeClr val="accent1"/>
+                </a:fillRef>
+                <a:effectRef idx="0">
+                  <a:schemeClr val="accent1"/>
+                </a:effectRef>
+                <a:fontRef idx="minor">
+                  <a:schemeClr val="tx1"/>
+                </a:fontRef>
+              </p:style>
+            </p:cxnSp>
+            <p:sp>
+              <p:nvSpPr>
+                <p:cNvPr id="18" name="TextBox 17"/>
+                <p:cNvSpPr txBox="1"/>
+                <p:nvPr/>
+              </p:nvSpPr>
+              <p:spPr>
+                <a:xfrm>
+                  <a:off x="1877654" y="2120555"/>
+                  <a:ext cx="870143" cy="306699"/>
+                </a:xfrm>
+                <a:prstGeom prst="rect">
+                  <a:avLst/>
+                </a:prstGeom>
+                <a:noFill/>
+                <a:ln>
+                  <a:noFill/>
+                </a:ln>
+              </p:spPr>
+              <p:txBody>
+                <a:bodyPr wrap="square" rtlCol="0">
+                  <a:spAutoFit/>
+                </a:bodyPr>
+                <a:lstStyle/>
+                <a:p>
+                  <a:pPr algn="ctr"/>
+                  <a:r>
+                    <a:rPr lang="en-US" altLang="ko-KR" sz="2000" dirty="0">
+                      <a:latin typeface="넥슨 풋볼고딕 B" panose="020B0803000000000000" pitchFamily="50" charset="-127"/>
+                      <a:ea typeface="넥슨 풋볼고딕 B" panose="020B0803000000000000" pitchFamily="50" charset="-127"/>
+                    </a:rPr>
+                    <a:t>1</a:t>
+                  </a:r>
+                  <a:endParaRPr lang="ko-KR" altLang="en-US" sz="2000" dirty="0">
+                    <a:latin typeface="넥슨 풋볼고딕 B" panose="020B0803000000000000" pitchFamily="50" charset="-127"/>
+                    <a:ea typeface="넥슨 풋볼고딕 B" panose="020B0803000000000000" pitchFamily="50" charset="-127"/>
+                  </a:endParaRPr>
+                </a:p>
+              </p:txBody>
+            </p:sp>
+            <p:sp>
+              <p:nvSpPr>
+                <p:cNvPr id="19" name="TextBox 18"/>
+                <p:cNvSpPr txBox="1"/>
+                <p:nvPr/>
+              </p:nvSpPr>
+              <p:spPr>
+                <a:xfrm>
+                  <a:off x="1877654" y="1679374"/>
+                  <a:ext cx="870143" cy="318494"/>
+                </a:xfrm>
+                <a:prstGeom prst="rect">
+                  <a:avLst/>
+                </a:prstGeom>
+                <a:noFill/>
+                <a:ln>
+                  <a:noFill/>
+                </a:ln>
+              </p:spPr>
+              <p:txBody>
+                <a:bodyPr wrap="square" rtlCol="0" anchor="ctr">
+                  <a:spAutoFit/>
+                </a:bodyPr>
+                <a:lstStyle/>
+                <a:p>
+                  <a:pPr algn="ctr"/>
+                  <a:r>
+                    <a:rPr lang="en-US" altLang="ko-KR" sz="2100" dirty="0" smtClean="0">
+                      <a:latin typeface="넥슨 풋볼고딕 B" panose="020B0803000000000000" pitchFamily="50" charset="-127"/>
+                      <a:ea typeface="넥슨 풋볼고딕 B" panose="020B0803000000000000" pitchFamily="50" charset="-127"/>
+                    </a:rPr>
+                    <a:t>20</a:t>
+                  </a:r>
+                  <a:endParaRPr lang="ko-KR" altLang="en-US" sz="2100" dirty="0">
+                    <a:latin typeface="넥슨 풋볼고딕 B" panose="020B0803000000000000" pitchFamily="50" charset="-127"/>
+                    <a:ea typeface="넥슨 풋볼고딕 B" panose="020B0803000000000000" pitchFamily="50" charset="-127"/>
+                  </a:endParaRPr>
+                </a:p>
+              </p:txBody>
+            </p:sp>
+          </p:grpSp>
+          <p:grpSp>
+            <p:nvGrpSpPr>
+              <p:cNvPr id="6" name="그룹 5"/>
+              <p:cNvGrpSpPr/>
+              <p:nvPr/>
+            </p:nvGrpSpPr>
+            <p:grpSpPr>
+              <a:xfrm>
+                <a:off x="5940047" y="2640086"/>
+                <a:ext cx="1036289" cy="1135372"/>
+                <a:chOff x="1877654" y="1556951"/>
+                <a:chExt cx="873783" cy="870303"/>
+              </a:xfrm>
+            </p:grpSpPr>
+            <p:sp>
+              <p:nvSpPr>
+                <p:cNvPr id="12" name="모서리가 둥근 직사각형 11"/>
+                <p:cNvSpPr/>
+                <p:nvPr/>
+              </p:nvSpPr>
+              <p:spPr>
+                <a:xfrm flipH="1">
+                  <a:off x="1881293" y="1556951"/>
+                  <a:ext cx="870144" cy="839506"/>
+                </a:xfrm>
+                <a:prstGeom prst="roundRect">
+                  <a:avLst>
+                    <a:gd name="adj" fmla="val 10749"/>
+                  </a:avLst>
+                </a:prstGeom>
+                <a:noFill/>
+                <a:ln w="38100">
+                  <a:solidFill>
+                    <a:schemeClr val="tx1"/>
+                  </a:solidFill>
+                </a:ln>
+              </p:spPr>
+              <p:style>
+                <a:lnRef idx="2">
+                  <a:schemeClr val="accent1">
+                    <a:shade val="50000"/>
+                  </a:schemeClr>
+                </a:lnRef>
+                <a:fillRef idx="1">
+                  <a:schemeClr val="accent1"/>
+                </a:fillRef>
+                <a:effectRef idx="0">
+                  <a:schemeClr val="accent1"/>
+                </a:effectRef>
+                <a:fontRef idx="minor">
+                  <a:schemeClr val="lt1"/>
+                </a:fontRef>
+              </p:style>
+              <p:txBody>
+                <a:bodyPr rot="0" spcFirstLastPara="0" vertOverflow="overflow" horzOverflow="overflow" vert="horz" wrap="square" lIns="68579" tIns="34290" rIns="68579" bIns="34290" numCol="1" spcCol="0" rtlCol="0" fromWordArt="0" anchor="ctr" anchorCtr="0" forceAA="0" compatLnSpc="1">
+                  <a:prstTxWarp prst="textNoShape">
+                    <a:avLst/>
+                  </a:prstTxWarp>
+                  <a:noAutofit/>
+                </a:bodyPr>
+                <a:lstStyle/>
+                <a:p>
+                  <a:pPr algn="ctr"/>
+                  <a:endParaRPr lang="ko-KR" altLang="en-US" sz="1350" dirty="0">
+                    <a:ln w="38100">
+                      <a:solidFill>
+                        <a:srgbClr val="333333"/>
+                      </a:solidFill>
+                    </a:ln>
+                    <a:solidFill>
+                      <a:schemeClr val="tx1"/>
+                    </a:solidFill>
+                  </a:endParaRPr>
+                </a:p>
+              </p:txBody>
+            </p:sp>
+            <p:cxnSp>
+              <p:nvCxnSpPr>
+                <p:cNvPr id="13" name="직선 연결선 12"/>
+                <p:cNvCxnSpPr/>
+                <p:nvPr/>
+              </p:nvCxnSpPr>
+              <p:spPr>
+                <a:xfrm>
+                  <a:off x="1881293" y="2117124"/>
+                  <a:ext cx="870144" cy="0"/>
+                </a:xfrm>
+                <a:prstGeom prst="line">
+                  <a:avLst/>
+                </a:prstGeom>
+                <a:ln w="38100">
+                  <a:solidFill>
+                    <a:schemeClr val="tx1"/>
+                  </a:solidFill>
+                </a:ln>
+              </p:spPr>
+              <p:style>
+                <a:lnRef idx="1">
+                  <a:schemeClr val="accent1"/>
+                </a:lnRef>
+                <a:fillRef idx="0">
+                  <a:schemeClr val="accent1"/>
+                </a:fillRef>
+                <a:effectRef idx="0">
+                  <a:schemeClr val="accent1"/>
+                </a:effectRef>
+                <a:fontRef idx="minor">
+                  <a:schemeClr val="tx1"/>
+                </a:fontRef>
+              </p:style>
+            </p:cxnSp>
+            <p:sp>
+              <p:nvSpPr>
+                <p:cNvPr id="14" name="TextBox 13"/>
+                <p:cNvSpPr txBox="1"/>
+                <p:nvPr/>
+              </p:nvSpPr>
+              <p:spPr>
+                <a:xfrm>
+                  <a:off x="1877654" y="2120555"/>
+                  <a:ext cx="870143" cy="306699"/>
+                </a:xfrm>
+                <a:prstGeom prst="rect">
+                  <a:avLst/>
+                </a:prstGeom>
+                <a:noFill/>
+                <a:ln>
+                  <a:noFill/>
+                </a:ln>
+              </p:spPr>
+              <p:txBody>
+                <a:bodyPr wrap="square" rtlCol="0">
+                  <a:spAutoFit/>
+                </a:bodyPr>
+                <a:lstStyle/>
+                <a:p>
+                  <a:pPr algn="ctr"/>
+                  <a:r>
+                    <a:rPr lang="en-US" altLang="ko-KR" sz="2000" dirty="0">
+                      <a:latin typeface="넥슨 풋볼고딕 B" panose="020B0803000000000000" pitchFamily="50" charset="-127"/>
+                      <a:ea typeface="넥슨 풋볼고딕 B" panose="020B0803000000000000" pitchFamily="50" charset="-127"/>
+                    </a:rPr>
+                    <a:t>2</a:t>
+                  </a:r>
+                  <a:endParaRPr lang="ko-KR" altLang="en-US" sz="2000" dirty="0">
+                    <a:latin typeface="넥슨 풋볼고딕 B" panose="020B0803000000000000" pitchFamily="50" charset="-127"/>
+                    <a:ea typeface="넥슨 풋볼고딕 B" panose="020B0803000000000000" pitchFamily="50" charset="-127"/>
+                  </a:endParaRPr>
+                </a:p>
+              </p:txBody>
+            </p:sp>
+            <p:sp>
+              <p:nvSpPr>
+                <p:cNvPr id="15" name="TextBox 14"/>
+                <p:cNvSpPr txBox="1"/>
+                <p:nvPr/>
+              </p:nvSpPr>
+              <p:spPr>
+                <a:xfrm>
+                  <a:off x="1877654" y="1679374"/>
+                  <a:ext cx="870143" cy="318494"/>
+                </a:xfrm>
+                <a:prstGeom prst="rect">
+                  <a:avLst/>
+                </a:prstGeom>
+                <a:noFill/>
+                <a:ln>
+                  <a:noFill/>
+                </a:ln>
+              </p:spPr>
+              <p:txBody>
+                <a:bodyPr wrap="square" rtlCol="0" anchor="ctr">
+                  <a:spAutoFit/>
+                </a:bodyPr>
+                <a:lstStyle/>
+                <a:p>
+                  <a:pPr algn="ctr"/>
+                  <a:r>
+                    <a:rPr lang="en-US" altLang="ko-KR" sz="2100" dirty="0" smtClean="0">
+                      <a:latin typeface="넥슨 풋볼고딕 B" panose="020B0803000000000000" pitchFamily="50" charset="-127"/>
+                      <a:ea typeface="넥슨 풋볼고딕 B" panose="020B0803000000000000" pitchFamily="50" charset="-127"/>
+                    </a:rPr>
+                    <a:t>30</a:t>
+                  </a:r>
+                  <a:endParaRPr lang="ko-KR" altLang="en-US" sz="2100" dirty="0">
+                    <a:latin typeface="넥슨 풋볼고딕 B" panose="020B0803000000000000" pitchFamily="50" charset="-127"/>
+                    <a:ea typeface="넥슨 풋볼고딕 B" panose="020B0803000000000000" pitchFamily="50" charset="-127"/>
+                  </a:endParaRPr>
+                </a:p>
+              </p:txBody>
+            </p:sp>
+          </p:grpSp>
+          <p:grpSp>
+            <p:nvGrpSpPr>
+              <p:cNvPr id="7" name="그룹 6"/>
+              <p:cNvGrpSpPr/>
+              <p:nvPr/>
+            </p:nvGrpSpPr>
+            <p:grpSpPr>
+              <a:xfrm>
+                <a:off x="7387946" y="2640086"/>
+                <a:ext cx="1036300" cy="1135372"/>
+                <a:chOff x="649468" y="1556951"/>
+                <a:chExt cx="873788" cy="870303"/>
+              </a:xfrm>
+            </p:grpSpPr>
+            <p:sp>
+              <p:nvSpPr>
+                <p:cNvPr id="8" name="모서리가 둥근 직사각형 7"/>
+                <p:cNvSpPr/>
+                <p:nvPr/>
+              </p:nvSpPr>
+              <p:spPr>
+                <a:xfrm flipH="1">
+                  <a:off x="653111" y="1556951"/>
+                  <a:ext cx="870145" cy="839506"/>
+                </a:xfrm>
+                <a:prstGeom prst="roundRect">
+                  <a:avLst>
+                    <a:gd name="adj" fmla="val 10749"/>
+                  </a:avLst>
+                </a:prstGeom>
+                <a:noFill/>
+                <a:ln w="38100">
+                  <a:solidFill>
+                    <a:schemeClr val="tx1"/>
+                  </a:solidFill>
+                </a:ln>
+              </p:spPr>
+              <p:style>
+                <a:lnRef idx="2">
+                  <a:schemeClr val="accent1">
+                    <a:shade val="50000"/>
+                  </a:schemeClr>
+                </a:lnRef>
+                <a:fillRef idx="1">
+                  <a:schemeClr val="accent1"/>
+                </a:fillRef>
+                <a:effectRef idx="0">
+                  <a:schemeClr val="accent1"/>
+                </a:effectRef>
+                <a:fontRef idx="minor">
+                  <a:schemeClr val="lt1"/>
+                </a:fontRef>
+              </p:style>
+              <p:txBody>
+                <a:bodyPr rot="0" spcFirstLastPara="0" vertOverflow="overflow" horzOverflow="overflow" vert="horz" wrap="square" lIns="68579" tIns="34290" rIns="68579" bIns="34290" numCol="1" spcCol="0" rtlCol="0" fromWordArt="0" anchor="ctr" anchorCtr="0" forceAA="0" compatLnSpc="1">
+                  <a:prstTxWarp prst="textNoShape">
+                    <a:avLst/>
+                  </a:prstTxWarp>
+                  <a:noAutofit/>
+                </a:bodyPr>
+                <a:lstStyle/>
+                <a:p>
+                  <a:pPr algn="ctr"/>
+                  <a:endParaRPr lang="ko-KR" altLang="en-US" sz="1350" dirty="0">
+                    <a:ln w="38100">
+                      <a:solidFill>
+                        <a:srgbClr val="333333"/>
+                      </a:solidFill>
+                    </a:ln>
+                    <a:solidFill>
+                      <a:schemeClr val="tx1"/>
+                    </a:solidFill>
+                  </a:endParaRPr>
+                </a:p>
+              </p:txBody>
+            </p:sp>
+            <p:cxnSp>
+              <p:nvCxnSpPr>
+                <p:cNvPr id="9" name="직선 연결선 8"/>
+                <p:cNvCxnSpPr/>
+                <p:nvPr/>
+              </p:nvCxnSpPr>
+              <p:spPr>
+                <a:xfrm>
+                  <a:off x="653111" y="2117124"/>
+                  <a:ext cx="870143" cy="0"/>
+                </a:xfrm>
+                <a:prstGeom prst="line">
+                  <a:avLst/>
+                </a:prstGeom>
+                <a:ln w="38100">
+                  <a:solidFill>
+                    <a:schemeClr val="tx1"/>
+                  </a:solidFill>
+                </a:ln>
+              </p:spPr>
+              <p:style>
+                <a:lnRef idx="1">
+                  <a:schemeClr val="accent1"/>
+                </a:lnRef>
+                <a:fillRef idx="0">
+                  <a:schemeClr val="accent1"/>
+                </a:fillRef>
+                <a:effectRef idx="0">
+                  <a:schemeClr val="accent1"/>
+                </a:effectRef>
+                <a:fontRef idx="minor">
+                  <a:schemeClr val="tx1"/>
+                </a:fontRef>
+              </p:style>
+            </p:cxnSp>
+            <p:sp>
+              <p:nvSpPr>
+                <p:cNvPr id="10" name="TextBox 9"/>
+                <p:cNvSpPr txBox="1"/>
+                <p:nvPr/>
+              </p:nvSpPr>
+              <p:spPr>
+                <a:xfrm>
+                  <a:off x="649471" y="2120555"/>
+                  <a:ext cx="870142" cy="306699"/>
+                </a:xfrm>
+                <a:prstGeom prst="rect">
+                  <a:avLst/>
+                </a:prstGeom>
+                <a:noFill/>
+                <a:ln>
+                  <a:noFill/>
+                </a:ln>
+              </p:spPr>
+              <p:txBody>
+                <a:bodyPr wrap="square" rtlCol="0">
+                  <a:spAutoFit/>
+                </a:bodyPr>
+                <a:lstStyle/>
+                <a:p>
+                  <a:pPr algn="ctr"/>
+                  <a:r>
+                    <a:rPr lang="en-US" altLang="ko-KR" sz="2000" dirty="0" smtClean="0">
+                      <a:latin typeface="넥슨 풋볼고딕 B" panose="020B0803000000000000" pitchFamily="50" charset="-127"/>
+                      <a:ea typeface="넥슨 풋볼고딕 B" panose="020B0803000000000000" pitchFamily="50" charset="-127"/>
+                    </a:rPr>
+                    <a:t>3</a:t>
+                  </a:r>
+                  <a:endParaRPr lang="ko-KR" altLang="en-US" sz="2000" dirty="0">
+                    <a:latin typeface="넥슨 풋볼고딕 B" panose="020B0803000000000000" pitchFamily="50" charset="-127"/>
+                    <a:ea typeface="넥슨 풋볼고딕 B" panose="020B0803000000000000" pitchFamily="50" charset="-127"/>
+                  </a:endParaRPr>
+                </a:p>
+              </p:txBody>
+            </p:sp>
+            <p:sp>
+              <p:nvSpPr>
+                <p:cNvPr id="11" name="TextBox 10"/>
+                <p:cNvSpPr txBox="1"/>
+                <p:nvPr/>
+              </p:nvSpPr>
+              <p:spPr>
+                <a:xfrm>
+                  <a:off x="649468" y="1679374"/>
+                  <a:ext cx="870143" cy="318494"/>
+                </a:xfrm>
+                <a:prstGeom prst="rect">
+                  <a:avLst/>
+                </a:prstGeom>
+                <a:noFill/>
+                <a:ln>
+                  <a:noFill/>
+                </a:ln>
+              </p:spPr>
+              <p:txBody>
+                <a:bodyPr wrap="square" rtlCol="0" anchor="ctr">
+                  <a:spAutoFit/>
+                </a:bodyPr>
+                <a:lstStyle/>
+                <a:p>
+                  <a:pPr algn="ctr"/>
+                  <a:endParaRPr lang="ko-KR" altLang="en-US" sz="2100" dirty="0">
+                    <a:latin typeface="넥슨 풋볼고딕 B" panose="020B0803000000000000" pitchFamily="50" charset="-127"/>
+                    <a:ea typeface="넥슨 풋볼고딕 B" panose="020B0803000000000000" pitchFamily="50" charset="-127"/>
+                  </a:endParaRPr>
+                </a:p>
+              </p:txBody>
+            </p:sp>
+          </p:grpSp>
+        </p:grpSp>
+      </p:grpSp>
+      <p:sp>
+        <p:nvSpPr>
+          <p:cNvPr id="47" name="오른쪽 화살표 46"/>
+          <p:cNvSpPr/>
+          <p:nvPr/>
+        </p:nvSpPr>
+        <p:spPr>
+          <a:xfrm rot="16200000">
+            <a:off x="3478978" y="5084258"/>
+            <a:ext cx="745524" cy="642552"/>
+          </a:xfrm>
+          <a:prstGeom prst="rightArrow">
+            <a:avLst/>
+          </a:prstGeom>
+          <a:solidFill>
+            <a:srgbClr val="C00000"/>
+          </a:solidFill>
+          <a:ln w="38100">
+            <a:noFill/>
+          </a:ln>
+        </p:spPr>
+        <p:style>
+          <a:lnRef idx="2">
+            <a:schemeClr val="accent1">
+              <a:shade val="50000"/>
+            </a:schemeClr>
+          </a:lnRef>
+          <a:fillRef idx="1">
+            <a:schemeClr val="accent1"/>
+          </a:fillRef>
+          <a:effectRef idx="0">
+            <a:schemeClr val="accent1"/>
+          </a:effectRef>
+          <a:fontRef idx="minor">
+            <a:schemeClr val="lt1"/>
+          </a:fontRef>
+        </p:style>
+        <p:txBody>
+          <a:bodyPr rot="0" spcFirstLastPara="0" vertOverflow="overflow" horzOverflow="overflow" vert="horz" wrap="square" lIns="91440" tIns="45720" rIns="91440" bIns="45720" numCol="1" spcCol="0" rtlCol="0" fromWordArt="0" anchor="ctr" anchorCtr="0" forceAA="0" compatLnSpc="1">
+            <a:prstTxWarp prst="textNoShape">
+              <a:avLst/>
+            </a:prstTxWarp>
+            <a:noAutofit/>
+          </a:bodyPr>
+          <a:lstStyle/>
+          <a:p>
+            <a:pPr algn="ctr"/>
+            <a:endParaRPr lang="ko-KR" altLang="en-US">
+              <a:solidFill>
+                <a:schemeClr val="tx1"/>
+              </a:solidFill>
+            </a:endParaRPr>
+          </a:p>
+        </p:txBody>
+      </p:sp>
+    </p:spTree>
+    <p:extLst>
+      <p:ext uri="{BB962C8B-B14F-4D97-AF65-F5344CB8AC3E}">
+        <p14:creationId xmlns:p14="http://schemas.microsoft.com/office/powerpoint/2010/main" val="3946902081"/>
+      </p:ext>
+    </p:extLst>
+  </p:cSld>
+  <p:clrMapOvr>
+    <a:masterClrMapping/>
+  </p:clrMapOvr>
+  <p:timing>
+    <p:tnLst>
+      <p:par>
+        <p:cTn id="1" dur="indefinite" restart="never" nodeType="tmRoot"/>
+      </p:par>
+    </p:tnLst>
+  </p:timing>
+</p:sld>
+</file>
+
+<file path=ppt/slides/slide11.xml><?xml version="1.0" encoding="utf-8"?>
+<p:sld xmlns:a="http://schemas.openxmlformats.org/drawingml/2006/main" xmlns:r="http://schemas.openxmlformats.org/officeDocument/2006/relationships" xmlns:p="http://schemas.openxmlformats.org/presentationml/2006/main">
+  <p:cSld>
+    <p:spTree>
+      <p:nvGrpSpPr>
+        <p:cNvPr id="1" name=""/>
+        <p:cNvGrpSpPr/>
+        <p:nvPr/>
+      </p:nvGrpSpPr>
+      <p:grpSpPr>
+        <a:xfrm>
+          <a:off x="0" y="0"/>
+          <a:ext cx="0" cy="0"/>
+          <a:chOff x="0" y="0"/>
+          <a:chExt cx="0" cy="0"/>
+        </a:xfrm>
+      </p:grpSpPr>
+      <p:grpSp>
+        <p:nvGrpSpPr>
+          <p:cNvPr id="24" name="그룹 23"/>
+          <p:cNvGrpSpPr/>
+          <p:nvPr/>
+        </p:nvGrpSpPr>
+        <p:grpSpPr>
+          <a:xfrm>
+            <a:off x="2235905" y="1940630"/>
+            <a:ext cx="7720190" cy="2976741"/>
+            <a:chOff x="2235905" y="3013502"/>
+            <a:chExt cx="7720190" cy="2976741"/>
+          </a:xfrm>
+        </p:grpSpPr>
+        <p:sp>
+          <p:nvSpPr>
+            <p:cNvPr id="2" name="직사각형 1"/>
+            <p:cNvSpPr/>
+            <p:nvPr/>
+          </p:nvSpPr>
+          <p:spPr>
+            <a:xfrm>
+              <a:off x="2235905" y="3013502"/>
+              <a:ext cx="7720190" cy="830997"/>
+            </a:xfrm>
+            <a:prstGeom prst="rect">
+              <a:avLst/>
+            </a:prstGeom>
+            <a:ln>
+              <a:noFill/>
+            </a:ln>
+          </p:spPr>
+          <p:txBody>
+            <a:bodyPr wrap="none">
+              <a:spAutoFit/>
+            </a:bodyPr>
+            <a:lstStyle/>
+            <a:p>
+              <a:r>
+                <a:rPr lang="en-US" altLang="ko-KR" sz="4800" dirty="0" smtClean="0"/>
+                <a:t>System.out.println(numbers1[3]);</a:t>
+              </a:r>
+              <a:endParaRPr lang="ko-KR" altLang="en-US" sz="4800" dirty="0"/>
+            </a:p>
+          </p:txBody>
+        </p:sp>
+        <p:grpSp>
+          <p:nvGrpSpPr>
+            <p:cNvPr id="3" name="그룹 2"/>
+            <p:cNvGrpSpPr/>
+            <p:nvPr/>
+          </p:nvGrpSpPr>
+          <p:grpSpPr>
+            <a:xfrm>
+              <a:off x="3335754" y="4854871"/>
+              <a:ext cx="5388686" cy="1135372"/>
+              <a:chOff x="3035560" y="2640086"/>
+              <a:chExt cx="5388686" cy="1135372"/>
+            </a:xfrm>
+          </p:grpSpPr>
+          <p:grpSp>
+            <p:nvGrpSpPr>
+              <p:cNvPr id="4" name="그룹 3"/>
+              <p:cNvGrpSpPr/>
+              <p:nvPr/>
+            </p:nvGrpSpPr>
+            <p:grpSpPr>
+              <a:xfrm>
+                <a:off x="3035560" y="2640086"/>
+                <a:ext cx="1036289" cy="1135372"/>
+                <a:chOff x="1877654" y="1556951"/>
+                <a:chExt cx="873783" cy="870303"/>
+              </a:xfrm>
+            </p:grpSpPr>
+            <p:sp>
+              <p:nvSpPr>
+                <p:cNvPr id="20" name="모서리가 둥근 직사각형 19"/>
+                <p:cNvSpPr/>
+                <p:nvPr/>
+              </p:nvSpPr>
+              <p:spPr>
+                <a:xfrm flipH="1">
+                  <a:off x="1881293" y="1556951"/>
+                  <a:ext cx="870144" cy="839506"/>
+                </a:xfrm>
+                <a:prstGeom prst="roundRect">
+                  <a:avLst>
+                    <a:gd name="adj" fmla="val 10749"/>
+                  </a:avLst>
+                </a:prstGeom>
+                <a:noFill/>
+                <a:ln w="38100">
+                  <a:solidFill>
+                    <a:schemeClr val="tx1"/>
+                  </a:solidFill>
+                </a:ln>
+              </p:spPr>
+              <p:style>
+                <a:lnRef idx="2">
+                  <a:schemeClr val="accent1">
+                    <a:shade val="50000"/>
+                  </a:schemeClr>
+                </a:lnRef>
+                <a:fillRef idx="1">
+                  <a:schemeClr val="accent1"/>
+                </a:fillRef>
+                <a:effectRef idx="0">
+                  <a:schemeClr val="accent1"/>
+                </a:effectRef>
+                <a:fontRef idx="minor">
+                  <a:schemeClr val="lt1"/>
+                </a:fontRef>
+              </p:style>
+              <p:txBody>
+                <a:bodyPr rot="0" spcFirstLastPara="0" vertOverflow="overflow" horzOverflow="overflow" vert="horz" wrap="square" lIns="68579" tIns="34290" rIns="68579" bIns="34290" numCol="1" spcCol="0" rtlCol="0" fromWordArt="0" anchor="ctr" anchorCtr="0" forceAA="0" compatLnSpc="1">
+                  <a:prstTxWarp prst="textNoShape">
+                    <a:avLst/>
+                  </a:prstTxWarp>
+                  <a:noAutofit/>
+                </a:bodyPr>
+                <a:lstStyle/>
+                <a:p>
+                  <a:pPr algn="ctr"/>
+                  <a:endParaRPr lang="ko-KR" altLang="en-US" sz="1350" dirty="0">
+                    <a:ln w="38100">
+                      <a:solidFill>
+                        <a:srgbClr val="333333"/>
+                      </a:solidFill>
+                    </a:ln>
+                    <a:solidFill>
+                      <a:schemeClr val="tx1"/>
+                    </a:solidFill>
+                  </a:endParaRPr>
+                </a:p>
+              </p:txBody>
+            </p:sp>
+            <p:cxnSp>
+              <p:nvCxnSpPr>
+                <p:cNvPr id="21" name="직선 연결선 20"/>
+                <p:cNvCxnSpPr/>
+                <p:nvPr/>
+              </p:nvCxnSpPr>
+              <p:spPr>
+                <a:xfrm>
+                  <a:off x="1881293" y="2117124"/>
+                  <a:ext cx="870144" cy="0"/>
+                </a:xfrm>
+                <a:prstGeom prst="line">
+                  <a:avLst/>
+                </a:prstGeom>
+                <a:ln w="38100">
+                  <a:solidFill>
+                    <a:schemeClr val="tx1"/>
+                  </a:solidFill>
+                </a:ln>
+              </p:spPr>
+              <p:style>
+                <a:lnRef idx="1">
+                  <a:schemeClr val="accent1"/>
+                </a:lnRef>
+                <a:fillRef idx="0">
+                  <a:schemeClr val="accent1"/>
+                </a:fillRef>
+                <a:effectRef idx="0">
+                  <a:schemeClr val="accent1"/>
+                </a:effectRef>
+                <a:fontRef idx="minor">
+                  <a:schemeClr val="tx1"/>
+                </a:fontRef>
+              </p:style>
+            </p:cxnSp>
+            <p:sp>
+              <p:nvSpPr>
+                <p:cNvPr id="22" name="TextBox 21"/>
+                <p:cNvSpPr txBox="1"/>
+                <p:nvPr/>
+              </p:nvSpPr>
+              <p:spPr>
+                <a:xfrm>
+                  <a:off x="1877654" y="2120555"/>
+                  <a:ext cx="870143" cy="306699"/>
+                </a:xfrm>
+                <a:prstGeom prst="rect">
+                  <a:avLst/>
+                </a:prstGeom>
+                <a:noFill/>
+                <a:ln>
+                  <a:noFill/>
+                </a:ln>
+              </p:spPr>
+              <p:txBody>
+                <a:bodyPr wrap="square" rtlCol="0">
+                  <a:spAutoFit/>
+                </a:bodyPr>
+                <a:lstStyle/>
+                <a:p>
+                  <a:pPr algn="ctr"/>
+                  <a:r>
+                    <a:rPr lang="en-US" altLang="ko-KR" sz="2000" dirty="0">
+                      <a:latin typeface="넥슨 풋볼고딕 B" panose="020B0803000000000000" pitchFamily="50" charset="-127"/>
+                      <a:ea typeface="넥슨 풋볼고딕 B" panose="020B0803000000000000" pitchFamily="50" charset="-127"/>
+                    </a:rPr>
+                    <a:t>0</a:t>
+                  </a:r>
+                  <a:endParaRPr lang="ko-KR" altLang="en-US" sz="2000" dirty="0">
+                    <a:latin typeface="넥슨 풋볼고딕 B" panose="020B0803000000000000" pitchFamily="50" charset="-127"/>
+                    <a:ea typeface="넥슨 풋볼고딕 B" panose="020B0803000000000000" pitchFamily="50" charset="-127"/>
+                  </a:endParaRPr>
+                </a:p>
+              </p:txBody>
+            </p:sp>
+            <p:sp>
+              <p:nvSpPr>
+                <p:cNvPr id="23" name="TextBox 22"/>
+                <p:cNvSpPr txBox="1"/>
+                <p:nvPr/>
+              </p:nvSpPr>
+              <p:spPr>
+                <a:xfrm>
+                  <a:off x="1877654" y="1679374"/>
+                  <a:ext cx="870143" cy="318494"/>
+                </a:xfrm>
+                <a:prstGeom prst="rect">
+                  <a:avLst/>
+                </a:prstGeom>
+                <a:noFill/>
+                <a:ln>
+                  <a:noFill/>
+                </a:ln>
+              </p:spPr>
+              <p:txBody>
+                <a:bodyPr wrap="square" rtlCol="0" anchor="ctr">
+                  <a:spAutoFit/>
+                </a:bodyPr>
+                <a:lstStyle/>
+                <a:p>
+                  <a:pPr algn="ctr"/>
+                  <a:r>
+                    <a:rPr lang="en-US" altLang="ko-KR" sz="2100" dirty="0" smtClean="0">
+                      <a:latin typeface="넥슨 풋볼고딕 B" panose="020B0803000000000000" pitchFamily="50" charset="-127"/>
+                      <a:ea typeface="넥슨 풋볼고딕 B" panose="020B0803000000000000" pitchFamily="50" charset="-127"/>
+                    </a:rPr>
+                    <a:t>10</a:t>
+                  </a:r>
+                  <a:endParaRPr lang="ko-KR" altLang="en-US" sz="2100" dirty="0">
+                    <a:latin typeface="넥슨 풋볼고딕 B" panose="020B0803000000000000" pitchFamily="50" charset="-127"/>
+                    <a:ea typeface="넥슨 풋볼고딕 B" panose="020B0803000000000000" pitchFamily="50" charset="-127"/>
+                  </a:endParaRPr>
+                </a:p>
+              </p:txBody>
+            </p:sp>
+          </p:grpSp>
+          <p:grpSp>
+            <p:nvGrpSpPr>
+              <p:cNvPr id="5" name="그룹 4"/>
+              <p:cNvGrpSpPr/>
+              <p:nvPr/>
+            </p:nvGrpSpPr>
+            <p:grpSpPr>
+              <a:xfrm>
+                <a:off x="4487804" y="2640086"/>
+                <a:ext cx="1036289" cy="1135372"/>
+                <a:chOff x="1877654" y="1556951"/>
+                <a:chExt cx="873783" cy="870303"/>
+              </a:xfrm>
+            </p:grpSpPr>
+            <p:sp>
+              <p:nvSpPr>
+                <p:cNvPr id="16" name="모서리가 둥근 직사각형 15"/>
+                <p:cNvSpPr/>
+                <p:nvPr/>
+              </p:nvSpPr>
+              <p:spPr>
+                <a:xfrm flipH="1">
+                  <a:off x="1881293" y="1556951"/>
+                  <a:ext cx="870144" cy="839506"/>
+                </a:xfrm>
+                <a:prstGeom prst="roundRect">
+                  <a:avLst>
+                    <a:gd name="adj" fmla="val 10749"/>
+                  </a:avLst>
+                </a:prstGeom>
+                <a:noFill/>
+                <a:ln w="38100">
+                  <a:solidFill>
+                    <a:schemeClr val="tx1"/>
+                  </a:solidFill>
+                </a:ln>
+              </p:spPr>
+              <p:style>
+                <a:lnRef idx="2">
+                  <a:schemeClr val="accent1">
+                    <a:shade val="50000"/>
+                  </a:schemeClr>
+                </a:lnRef>
+                <a:fillRef idx="1">
+                  <a:schemeClr val="accent1"/>
+                </a:fillRef>
+                <a:effectRef idx="0">
+                  <a:schemeClr val="accent1"/>
+                </a:effectRef>
+                <a:fontRef idx="minor">
+                  <a:schemeClr val="lt1"/>
+                </a:fontRef>
+              </p:style>
+              <p:txBody>
+                <a:bodyPr rot="0" spcFirstLastPara="0" vertOverflow="overflow" horzOverflow="overflow" vert="horz" wrap="square" lIns="68579" tIns="34290" rIns="68579" bIns="34290" numCol="1" spcCol="0" rtlCol="0" fromWordArt="0" anchor="ctr" anchorCtr="0" forceAA="0" compatLnSpc="1">
+                  <a:prstTxWarp prst="textNoShape">
+                    <a:avLst/>
+                  </a:prstTxWarp>
+                  <a:noAutofit/>
+                </a:bodyPr>
+                <a:lstStyle/>
+                <a:p>
+                  <a:pPr algn="ctr"/>
+                  <a:endParaRPr lang="ko-KR" altLang="en-US" sz="1350" dirty="0">
+                    <a:ln w="38100">
+                      <a:solidFill>
+                        <a:srgbClr val="333333"/>
+                      </a:solidFill>
+                    </a:ln>
+                    <a:solidFill>
+                      <a:schemeClr val="tx1"/>
+                    </a:solidFill>
+                  </a:endParaRPr>
+                </a:p>
+              </p:txBody>
+            </p:sp>
+            <p:cxnSp>
+              <p:nvCxnSpPr>
+                <p:cNvPr id="17" name="직선 연결선 16"/>
+                <p:cNvCxnSpPr/>
+                <p:nvPr/>
+              </p:nvCxnSpPr>
+              <p:spPr>
+                <a:xfrm>
+                  <a:off x="1881293" y="2117124"/>
+                  <a:ext cx="870144" cy="0"/>
+                </a:xfrm>
+                <a:prstGeom prst="line">
+                  <a:avLst/>
+                </a:prstGeom>
+                <a:ln w="38100">
+                  <a:solidFill>
+                    <a:schemeClr val="tx1"/>
+                  </a:solidFill>
+                </a:ln>
+              </p:spPr>
+              <p:style>
+                <a:lnRef idx="1">
+                  <a:schemeClr val="accent1"/>
+                </a:lnRef>
+                <a:fillRef idx="0">
+                  <a:schemeClr val="accent1"/>
+                </a:fillRef>
+                <a:effectRef idx="0">
+                  <a:schemeClr val="accent1"/>
+                </a:effectRef>
+                <a:fontRef idx="minor">
+                  <a:schemeClr val="tx1"/>
+                </a:fontRef>
+              </p:style>
+            </p:cxnSp>
+            <p:sp>
+              <p:nvSpPr>
+                <p:cNvPr id="18" name="TextBox 17"/>
+                <p:cNvSpPr txBox="1"/>
+                <p:nvPr/>
+              </p:nvSpPr>
+              <p:spPr>
+                <a:xfrm>
+                  <a:off x="1877654" y="2120555"/>
+                  <a:ext cx="870143" cy="306699"/>
+                </a:xfrm>
+                <a:prstGeom prst="rect">
+                  <a:avLst/>
+                </a:prstGeom>
+                <a:noFill/>
+                <a:ln>
+                  <a:noFill/>
+                </a:ln>
+              </p:spPr>
+              <p:txBody>
+                <a:bodyPr wrap="square" rtlCol="0">
+                  <a:spAutoFit/>
+                </a:bodyPr>
+                <a:lstStyle/>
+                <a:p>
+                  <a:pPr algn="ctr"/>
+                  <a:r>
+                    <a:rPr lang="en-US" altLang="ko-KR" sz="2000" dirty="0">
+                      <a:latin typeface="넥슨 풋볼고딕 B" panose="020B0803000000000000" pitchFamily="50" charset="-127"/>
+                      <a:ea typeface="넥슨 풋볼고딕 B" panose="020B0803000000000000" pitchFamily="50" charset="-127"/>
+                    </a:rPr>
+                    <a:t>1</a:t>
+                  </a:r>
+                  <a:endParaRPr lang="ko-KR" altLang="en-US" sz="2000" dirty="0">
+                    <a:latin typeface="넥슨 풋볼고딕 B" panose="020B0803000000000000" pitchFamily="50" charset="-127"/>
+                    <a:ea typeface="넥슨 풋볼고딕 B" panose="020B0803000000000000" pitchFamily="50" charset="-127"/>
+                  </a:endParaRPr>
+                </a:p>
+              </p:txBody>
+            </p:sp>
+            <p:sp>
+              <p:nvSpPr>
+                <p:cNvPr id="19" name="TextBox 18"/>
+                <p:cNvSpPr txBox="1"/>
+                <p:nvPr/>
+              </p:nvSpPr>
+              <p:spPr>
+                <a:xfrm>
+                  <a:off x="1877654" y="1679374"/>
+                  <a:ext cx="870143" cy="318494"/>
+                </a:xfrm>
+                <a:prstGeom prst="rect">
+                  <a:avLst/>
+                </a:prstGeom>
+                <a:noFill/>
+                <a:ln>
+                  <a:noFill/>
+                </a:ln>
+              </p:spPr>
+              <p:txBody>
+                <a:bodyPr wrap="square" rtlCol="0" anchor="ctr">
+                  <a:spAutoFit/>
+                </a:bodyPr>
+                <a:lstStyle/>
+                <a:p>
+                  <a:pPr algn="ctr"/>
+                  <a:r>
+                    <a:rPr lang="en-US" altLang="ko-KR" sz="2100" dirty="0" smtClean="0">
+                      <a:latin typeface="넥슨 풋볼고딕 B" panose="020B0803000000000000" pitchFamily="50" charset="-127"/>
+                      <a:ea typeface="넥슨 풋볼고딕 B" panose="020B0803000000000000" pitchFamily="50" charset="-127"/>
+                    </a:rPr>
+                    <a:t>20</a:t>
+                  </a:r>
+                  <a:endParaRPr lang="ko-KR" altLang="en-US" sz="2100" dirty="0">
+                    <a:latin typeface="넥슨 풋볼고딕 B" panose="020B0803000000000000" pitchFamily="50" charset="-127"/>
+                    <a:ea typeface="넥슨 풋볼고딕 B" panose="020B0803000000000000" pitchFamily="50" charset="-127"/>
+                  </a:endParaRPr>
+                </a:p>
+              </p:txBody>
+            </p:sp>
+          </p:grpSp>
+          <p:grpSp>
+            <p:nvGrpSpPr>
+              <p:cNvPr id="6" name="그룹 5"/>
+              <p:cNvGrpSpPr/>
+              <p:nvPr/>
+            </p:nvGrpSpPr>
+            <p:grpSpPr>
+              <a:xfrm>
+                <a:off x="5940047" y="2640086"/>
+                <a:ext cx="1036289" cy="1135372"/>
+                <a:chOff x="1877654" y="1556951"/>
+                <a:chExt cx="873783" cy="870303"/>
+              </a:xfrm>
+            </p:grpSpPr>
+            <p:sp>
+              <p:nvSpPr>
+                <p:cNvPr id="12" name="모서리가 둥근 직사각형 11"/>
+                <p:cNvSpPr/>
+                <p:nvPr/>
+              </p:nvSpPr>
+              <p:spPr>
+                <a:xfrm flipH="1">
+                  <a:off x="1881293" y="1556951"/>
+                  <a:ext cx="870144" cy="839506"/>
+                </a:xfrm>
+                <a:prstGeom prst="roundRect">
+                  <a:avLst>
+                    <a:gd name="adj" fmla="val 10749"/>
+                  </a:avLst>
+                </a:prstGeom>
+                <a:noFill/>
+                <a:ln w="38100">
+                  <a:solidFill>
+                    <a:schemeClr val="tx1"/>
+                  </a:solidFill>
+                </a:ln>
+              </p:spPr>
+              <p:style>
+                <a:lnRef idx="2">
+                  <a:schemeClr val="accent1">
+                    <a:shade val="50000"/>
+                  </a:schemeClr>
+                </a:lnRef>
+                <a:fillRef idx="1">
+                  <a:schemeClr val="accent1"/>
+                </a:fillRef>
+                <a:effectRef idx="0">
+                  <a:schemeClr val="accent1"/>
+                </a:effectRef>
+                <a:fontRef idx="minor">
+                  <a:schemeClr val="lt1"/>
+                </a:fontRef>
+              </p:style>
+              <p:txBody>
+                <a:bodyPr rot="0" spcFirstLastPara="0" vertOverflow="overflow" horzOverflow="overflow" vert="horz" wrap="square" lIns="68579" tIns="34290" rIns="68579" bIns="34290" numCol="1" spcCol="0" rtlCol="0" fromWordArt="0" anchor="ctr" anchorCtr="0" forceAA="0" compatLnSpc="1">
+                  <a:prstTxWarp prst="textNoShape">
+                    <a:avLst/>
+                  </a:prstTxWarp>
+                  <a:noAutofit/>
+                </a:bodyPr>
+                <a:lstStyle/>
+                <a:p>
+                  <a:pPr algn="ctr"/>
+                  <a:endParaRPr lang="ko-KR" altLang="en-US" sz="1350" dirty="0">
+                    <a:ln w="38100">
+                      <a:solidFill>
+                        <a:srgbClr val="333333"/>
+                      </a:solidFill>
+                    </a:ln>
+                    <a:solidFill>
+                      <a:schemeClr val="tx1"/>
+                    </a:solidFill>
+                  </a:endParaRPr>
+                </a:p>
+              </p:txBody>
+            </p:sp>
+            <p:cxnSp>
+              <p:nvCxnSpPr>
+                <p:cNvPr id="13" name="직선 연결선 12"/>
+                <p:cNvCxnSpPr/>
+                <p:nvPr/>
+              </p:nvCxnSpPr>
+              <p:spPr>
+                <a:xfrm>
+                  <a:off x="1881293" y="2117124"/>
+                  <a:ext cx="870144" cy="0"/>
+                </a:xfrm>
+                <a:prstGeom prst="line">
+                  <a:avLst/>
+                </a:prstGeom>
+                <a:ln w="38100">
+                  <a:solidFill>
+                    <a:schemeClr val="tx1"/>
+                  </a:solidFill>
+                </a:ln>
+              </p:spPr>
+              <p:style>
+                <a:lnRef idx="1">
+                  <a:schemeClr val="accent1"/>
+                </a:lnRef>
+                <a:fillRef idx="0">
+                  <a:schemeClr val="accent1"/>
+                </a:fillRef>
+                <a:effectRef idx="0">
+                  <a:schemeClr val="accent1"/>
+                </a:effectRef>
+                <a:fontRef idx="minor">
+                  <a:schemeClr val="tx1"/>
+                </a:fontRef>
+              </p:style>
+            </p:cxnSp>
+            <p:sp>
+              <p:nvSpPr>
+                <p:cNvPr id="14" name="TextBox 13"/>
+                <p:cNvSpPr txBox="1"/>
+                <p:nvPr/>
+              </p:nvSpPr>
+              <p:spPr>
+                <a:xfrm>
+                  <a:off x="1877654" y="2120555"/>
+                  <a:ext cx="870143" cy="306699"/>
+                </a:xfrm>
+                <a:prstGeom prst="rect">
+                  <a:avLst/>
+                </a:prstGeom>
+                <a:noFill/>
+                <a:ln>
+                  <a:noFill/>
+                </a:ln>
+              </p:spPr>
+              <p:txBody>
+                <a:bodyPr wrap="square" rtlCol="0">
+                  <a:spAutoFit/>
+                </a:bodyPr>
+                <a:lstStyle/>
+                <a:p>
+                  <a:pPr algn="ctr"/>
+                  <a:r>
+                    <a:rPr lang="en-US" altLang="ko-KR" sz="2000" dirty="0">
+                      <a:latin typeface="넥슨 풋볼고딕 B" panose="020B0803000000000000" pitchFamily="50" charset="-127"/>
+                      <a:ea typeface="넥슨 풋볼고딕 B" panose="020B0803000000000000" pitchFamily="50" charset="-127"/>
+                    </a:rPr>
+                    <a:t>2</a:t>
+                  </a:r>
+                  <a:endParaRPr lang="ko-KR" altLang="en-US" sz="2000" dirty="0">
+                    <a:latin typeface="넥슨 풋볼고딕 B" panose="020B0803000000000000" pitchFamily="50" charset="-127"/>
+                    <a:ea typeface="넥슨 풋볼고딕 B" panose="020B0803000000000000" pitchFamily="50" charset="-127"/>
+                  </a:endParaRPr>
+                </a:p>
+              </p:txBody>
+            </p:sp>
+            <p:sp>
+              <p:nvSpPr>
+                <p:cNvPr id="15" name="TextBox 14"/>
+                <p:cNvSpPr txBox="1"/>
+                <p:nvPr/>
+              </p:nvSpPr>
+              <p:spPr>
+                <a:xfrm>
+                  <a:off x="1877654" y="1679374"/>
+                  <a:ext cx="870143" cy="318494"/>
+                </a:xfrm>
+                <a:prstGeom prst="rect">
+                  <a:avLst/>
+                </a:prstGeom>
+                <a:noFill/>
+                <a:ln>
+                  <a:noFill/>
+                </a:ln>
+              </p:spPr>
+              <p:txBody>
+                <a:bodyPr wrap="square" rtlCol="0" anchor="ctr">
+                  <a:spAutoFit/>
+                </a:bodyPr>
+                <a:lstStyle/>
+                <a:p>
+                  <a:pPr algn="ctr"/>
+                  <a:r>
+                    <a:rPr lang="en-US" altLang="ko-KR" sz="2100" dirty="0" smtClean="0">
+                      <a:latin typeface="넥슨 풋볼고딕 B" panose="020B0803000000000000" pitchFamily="50" charset="-127"/>
+                      <a:ea typeface="넥슨 풋볼고딕 B" panose="020B0803000000000000" pitchFamily="50" charset="-127"/>
+                    </a:rPr>
+                    <a:t>30</a:t>
+                  </a:r>
+                  <a:endParaRPr lang="ko-KR" altLang="en-US" sz="2100" dirty="0">
+                    <a:latin typeface="넥슨 풋볼고딕 B" panose="020B0803000000000000" pitchFamily="50" charset="-127"/>
+                    <a:ea typeface="넥슨 풋볼고딕 B" panose="020B0803000000000000" pitchFamily="50" charset="-127"/>
+                  </a:endParaRPr>
+                </a:p>
+              </p:txBody>
+            </p:sp>
+          </p:grpSp>
+          <p:grpSp>
+            <p:nvGrpSpPr>
+              <p:cNvPr id="7" name="그룹 6"/>
+              <p:cNvGrpSpPr/>
+              <p:nvPr/>
+            </p:nvGrpSpPr>
+            <p:grpSpPr>
+              <a:xfrm>
+                <a:off x="7387946" y="2640086"/>
+                <a:ext cx="1036300" cy="1135372"/>
+                <a:chOff x="649468" y="1556951"/>
+                <a:chExt cx="873788" cy="870303"/>
+              </a:xfrm>
+            </p:grpSpPr>
+            <p:sp>
+              <p:nvSpPr>
+                <p:cNvPr id="8" name="모서리가 둥근 직사각형 7"/>
+                <p:cNvSpPr/>
+                <p:nvPr/>
+              </p:nvSpPr>
+              <p:spPr>
+                <a:xfrm flipH="1">
+                  <a:off x="653111" y="1556951"/>
+                  <a:ext cx="870145" cy="839506"/>
+                </a:xfrm>
+                <a:prstGeom prst="roundRect">
+                  <a:avLst>
+                    <a:gd name="adj" fmla="val 10749"/>
+                  </a:avLst>
+                </a:prstGeom>
+                <a:noFill/>
+                <a:ln w="38100">
+                  <a:solidFill>
+                    <a:schemeClr val="tx1"/>
+                  </a:solidFill>
+                </a:ln>
+              </p:spPr>
+              <p:style>
+                <a:lnRef idx="2">
+                  <a:schemeClr val="accent1">
+                    <a:shade val="50000"/>
+                  </a:schemeClr>
+                </a:lnRef>
+                <a:fillRef idx="1">
+                  <a:schemeClr val="accent1"/>
+                </a:fillRef>
+                <a:effectRef idx="0">
+                  <a:schemeClr val="accent1"/>
+                </a:effectRef>
+                <a:fontRef idx="minor">
+                  <a:schemeClr val="lt1"/>
+                </a:fontRef>
+              </p:style>
+              <p:txBody>
+                <a:bodyPr rot="0" spcFirstLastPara="0" vertOverflow="overflow" horzOverflow="overflow" vert="horz" wrap="square" lIns="68579" tIns="34290" rIns="68579" bIns="34290" numCol="1" spcCol="0" rtlCol="0" fromWordArt="0" anchor="ctr" anchorCtr="0" forceAA="0" compatLnSpc="1">
+                  <a:prstTxWarp prst="textNoShape">
+                    <a:avLst/>
+                  </a:prstTxWarp>
+                  <a:noAutofit/>
+                </a:bodyPr>
+                <a:lstStyle/>
+                <a:p>
+                  <a:pPr algn="ctr"/>
+                  <a:endParaRPr lang="ko-KR" altLang="en-US" sz="1350" dirty="0">
+                    <a:ln w="38100">
+                      <a:solidFill>
+                        <a:srgbClr val="333333"/>
+                      </a:solidFill>
+                    </a:ln>
+                    <a:solidFill>
+                      <a:schemeClr val="tx1"/>
+                    </a:solidFill>
+                  </a:endParaRPr>
+                </a:p>
+              </p:txBody>
+            </p:sp>
+            <p:cxnSp>
+              <p:nvCxnSpPr>
+                <p:cNvPr id="9" name="직선 연결선 8"/>
+                <p:cNvCxnSpPr/>
+                <p:nvPr/>
+              </p:nvCxnSpPr>
+              <p:spPr>
+                <a:xfrm>
+                  <a:off x="653111" y="2117124"/>
+                  <a:ext cx="870143" cy="0"/>
+                </a:xfrm>
+                <a:prstGeom prst="line">
+                  <a:avLst/>
+                </a:prstGeom>
+                <a:ln w="38100">
+                  <a:solidFill>
+                    <a:schemeClr val="tx1"/>
+                  </a:solidFill>
+                </a:ln>
+              </p:spPr>
+              <p:style>
+                <a:lnRef idx="1">
+                  <a:schemeClr val="accent1"/>
+                </a:lnRef>
+                <a:fillRef idx="0">
+                  <a:schemeClr val="accent1"/>
+                </a:fillRef>
+                <a:effectRef idx="0">
+                  <a:schemeClr val="accent1"/>
+                </a:effectRef>
+                <a:fontRef idx="minor">
+                  <a:schemeClr val="tx1"/>
+                </a:fontRef>
+              </p:style>
+            </p:cxnSp>
+            <p:sp>
+              <p:nvSpPr>
+                <p:cNvPr id="10" name="TextBox 9"/>
+                <p:cNvSpPr txBox="1"/>
+                <p:nvPr/>
+              </p:nvSpPr>
+              <p:spPr>
+                <a:xfrm>
+                  <a:off x="649471" y="2120555"/>
+                  <a:ext cx="870142" cy="306699"/>
+                </a:xfrm>
+                <a:prstGeom prst="rect">
+                  <a:avLst/>
+                </a:prstGeom>
+                <a:noFill/>
+                <a:ln>
+                  <a:noFill/>
+                </a:ln>
+              </p:spPr>
+              <p:txBody>
+                <a:bodyPr wrap="square" rtlCol="0">
+                  <a:spAutoFit/>
+                </a:bodyPr>
+                <a:lstStyle/>
+                <a:p>
+                  <a:pPr algn="ctr"/>
+                  <a:r>
+                    <a:rPr lang="en-US" altLang="ko-KR" sz="2000" dirty="0" smtClean="0">
+                      <a:latin typeface="넥슨 풋볼고딕 B" panose="020B0803000000000000" pitchFamily="50" charset="-127"/>
+                      <a:ea typeface="넥슨 풋볼고딕 B" panose="020B0803000000000000" pitchFamily="50" charset="-127"/>
+                    </a:rPr>
+                    <a:t>3</a:t>
+                  </a:r>
+                  <a:endParaRPr lang="ko-KR" altLang="en-US" sz="2000" dirty="0">
+                    <a:latin typeface="넥슨 풋볼고딕 B" panose="020B0803000000000000" pitchFamily="50" charset="-127"/>
+                    <a:ea typeface="넥슨 풋볼고딕 B" panose="020B0803000000000000" pitchFamily="50" charset="-127"/>
+                  </a:endParaRPr>
+                </a:p>
+              </p:txBody>
+            </p:sp>
+            <p:sp>
+              <p:nvSpPr>
+                <p:cNvPr id="11" name="TextBox 10"/>
+                <p:cNvSpPr txBox="1"/>
+                <p:nvPr/>
+              </p:nvSpPr>
+              <p:spPr>
+                <a:xfrm>
+                  <a:off x="649468" y="1679374"/>
+                  <a:ext cx="870143" cy="318494"/>
+                </a:xfrm>
+                <a:prstGeom prst="rect">
+                  <a:avLst/>
+                </a:prstGeom>
+                <a:noFill/>
+                <a:ln>
+                  <a:noFill/>
+                </a:ln>
+              </p:spPr>
+              <p:txBody>
+                <a:bodyPr wrap="square" rtlCol="0" anchor="ctr">
+                  <a:spAutoFit/>
+                </a:bodyPr>
+                <a:lstStyle/>
+                <a:p>
+                  <a:pPr algn="ctr"/>
+                  <a:r>
+                    <a:rPr lang="en-US" altLang="ko-KR" sz="2100" dirty="0" smtClean="0">
+                      <a:latin typeface="넥슨 풋볼고딕 B" panose="020B0803000000000000" pitchFamily="50" charset="-127"/>
+                      <a:ea typeface="넥슨 풋볼고딕 B" panose="020B0803000000000000" pitchFamily="50" charset="-127"/>
+                    </a:rPr>
+                    <a:t>0</a:t>
+                  </a:r>
+                  <a:endParaRPr lang="ko-KR" altLang="en-US" sz="2100" dirty="0">
+                    <a:latin typeface="넥슨 풋볼고딕 B" panose="020B0803000000000000" pitchFamily="50" charset="-127"/>
+                    <a:ea typeface="넥슨 풋볼고딕 B" panose="020B0803000000000000" pitchFamily="50" charset="-127"/>
+                  </a:endParaRPr>
+                </a:p>
+              </p:txBody>
+            </p:sp>
+          </p:grpSp>
+        </p:grpSp>
+      </p:grpSp>
+      <p:sp>
+        <p:nvSpPr>
+          <p:cNvPr id="47" name="오른쪽 화살표 46"/>
+          <p:cNvSpPr/>
+          <p:nvPr/>
+        </p:nvSpPr>
+        <p:spPr>
+          <a:xfrm rot="16200000">
+            <a:off x="7831366" y="5084258"/>
+            <a:ext cx="745524" cy="642552"/>
+          </a:xfrm>
+          <a:prstGeom prst="rightArrow">
+            <a:avLst/>
+          </a:prstGeom>
+          <a:solidFill>
+            <a:srgbClr val="C00000"/>
+          </a:solidFill>
+          <a:ln w="38100">
+            <a:noFill/>
+          </a:ln>
+        </p:spPr>
+        <p:style>
+          <a:lnRef idx="2">
+            <a:schemeClr val="accent1">
+              <a:shade val="50000"/>
+            </a:schemeClr>
+          </a:lnRef>
+          <a:fillRef idx="1">
+            <a:schemeClr val="accent1"/>
+          </a:fillRef>
+          <a:effectRef idx="0">
+            <a:schemeClr val="accent1"/>
+          </a:effectRef>
+          <a:fontRef idx="minor">
+            <a:schemeClr val="lt1"/>
+          </a:fontRef>
+        </p:style>
+        <p:txBody>
+          <a:bodyPr rot="0" spcFirstLastPara="0" vertOverflow="overflow" horzOverflow="overflow" vert="horz" wrap="square" lIns="91440" tIns="45720" rIns="91440" bIns="45720" numCol="1" spcCol="0" rtlCol="0" fromWordArt="0" anchor="ctr" anchorCtr="0" forceAA="0" compatLnSpc="1">
+            <a:prstTxWarp prst="textNoShape">
+              <a:avLst/>
+            </a:prstTxWarp>
+            <a:noAutofit/>
+          </a:bodyPr>
+          <a:lstStyle/>
+          <a:p>
+            <a:pPr algn="ctr"/>
+            <a:endParaRPr lang="ko-KR" altLang="en-US">
+              <a:solidFill>
+                <a:schemeClr val="tx1"/>
+              </a:solidFill>
+            </a:endParaRPr>
+          </a:p>
+        </p:txBody>
+      </p:sp>
+    </p:spTree>
+    <p:extLst>
+      <p:ext uri="{BB962C8B-B14F-4D97-AF65-F5344CB8AC3E}">
+        <p14:creationId xmlns:p14="http://schemas.microsoft.com/office/powerpoint/2010/main" val="2938177821"/>
+      </p:ext>
+    </p:extLst>
+  </p:cSld>
+  <p:clrMapOvr>
+    <a:masterClrMapping/>
+  </p:clrMapOvr>
+  <p:timing>
+    <p:tnLst>
+      <p:par>
+        <p:cTn id="1" dur="indefinite" restart="never" nodeType="tmRoot"/>
+      </p:par>
+    </p:tnLst>
+  </p:timing>
+</p:sld>
+</file>
+
+<file path=ppt/slides/slide12.xml><?xml version="1.0" encoding="utf-8"?>
+<p:sld xmlns:a="http://schemas.openxmlformats.org/drawingml/2006/main" xmlns:r="http://schemas.openxmlformats.org/officeDocument/2006/relationships" xmlns:p="http://schemas.openxmlformats.org/presentationml/2006/main">
+  <p:cSld>
+    <p:spTree>
+      <p:nvGrpSpPr>
+        <p:cNvPr id="1" name=""/>
+        <p:cNvGrpSpPr/>
+        <p:nvPr/>
+      </p:nvGrpSpPr>
+      <p:grpSpPr>
+        <a:xfrm>
+          <a:off x="0" y="0"/>
+          <a:ext cx="0" cy="0"/>
+          <a:chOff x="0" y="0"/>
+          <a:chExt cx="0" cy="0"/>
+        </a:xfrm>
+      </p:grpSpPr>
+      <p:sp>
+        <p:nvSpPr>
+          <p:cNvPr id="2" name="TextBox 1"/>
+          <p:cNvSpPr txBox="1"/>
+          <p:nvPr/>
+        </p:nvSpPr>
+        <p:spPr>
+          <a:xfrm>
+            <a:off x="1035809" y="802864"/>
+            <a:ext cx="3421129" cy="5201424"/>
+          </a:xfrm>
+          <a:prstGeom prst="rect">
+            <a:avLst/>
+          </a:prstGeom>
+          <a:noFill/>
+        </p:spPr>
+        <p:txBody>
+          <a:bodyPr wrap="none" rtlCol="0">
+            <a:spAutoFit/>
+          </a:bodyPr>
+          <a:lstStyle/>
+          <a:p>
+            <a:r>
+              <a:rPr lang="en-US" altLang="ko-KR" sz="16600" dirty="0" smtClean="0">
+                <a:latin typeface="+mj-ea"/>
+                <a:ea typeface="+mj-ea"/>
+              </a:rPr>
+              <a:t>Size</a:t>
+            </a:r>
+            <a:endParaRPr lang="en-US" altLang="ko-KR" sz="16600" dirty="0" smtClean="0">
+              <a:latin typeface="+mj-ea"/>
+              <a:ea typeface="+mj-ea"/>
+            </a:endParaRPr>
+          </a:p>
+          <a:p>
+            <a:r>
+              <a:rPr lang="ko-KR" altLang="en-US" sz="16600" dirty="0" smtClean="0">
+                <a:latin typeface="+mj-ea"/>
+                <a:ea typeface="+mj-ea"/>
+              </a:rPr>
+              <a:t>크기</a:t>
+            </a:r>
+            <a:endParaRPr lang="ko-KR" altLang="en-US" sz="16600" dirty="0">
+              <a:latin typeface="+mj-ea"/>
+              <a:ea typeface="+mj-ea"/>
+            </a:endParaRPr>
+          </a:p>
+        </p:txBody>
+      </p:sp>
+      <p:pic>
+        <p:nvPicPr>
+          <p:cNvPr id="3" name="그림 2"/>
+          <p:cNvPicPr>
+            <a:picLocks noChangeAspect="1"/>
+          </p:cNvPicPr>
+          <p:nvPr/>
+        </p:nvPicPr>
+        <p:blipFill>
+          <a:blip r:embed="rId2" cstate="print">
+            <a:extLst>
+              <a:ext uri="{28A0092B-C50C-407E-A947-70E740481C1C}">
+                <a14:useLocalDpi xmlns:a14="http://schemas.microsoft.com/office/drawing/2010/main" val="0"/>
+              </a:ext>
+            </a:extLst>
+          </a:blip>
+          <a:stretch>
+            <a:fillRect/>
+          </a:stretch>
+        </p:blipFill>
+        <p:spPr>
+          <a:xfrm>
+            <a:off x="6583908" y="1400767"/>
+            <a:ext cx="4005618" cy="4005618"/>
+          </a:xfrm>
+          <a:prstGeom prst="rect">
+            <a:avLst/>
+          </a:prstGeom>
+        </p:spPr>
+      </p:pic>
+    </p:spTree>
+    <p:extLst>
+      <p:ext uri="{BB962C8B-B14F-4D97-AF65-F5344CB8AC3E}">
+        <p14:creationId xmlns:p14="http://schemas.microsoft.com/office/powerpoint/2010/main" val="2529119767"/>
+      </p:ext>
+    </p:extLst>
+  </p:cSld>
+  <p:clrMapOvr>
+    <a:masterClrMapping/>
+  </p:clrMapOvr>
+  <p:timing>
+    <p:tnLst>
+      <p:par>
+        <p:cTn id="1" dur="indefinite" restart="never" nodeType="tmRoot"/>
+      </p:par>
+    </p:tnLst>
+  </p:timing>
+</p:sld>
+</file>
+
+<file path=ppt/slides/slide13.xml><?xml version="1.0" encoding="utf-8"?>
+<p:sld xmlns:a="http://schemas.openxmlformats.org/drawingml/2006/main" xmlns:r="http://schemas.openxmlformats.org/officeDocument/2006/relationships" xmlns:p="http://schemas.openxmlformats.org/presentationml/2006/main">
+  <p:cSld>
+    <p:spTree>
+      <p:nvGrpSpPr>
+        <p:cNvPr id="1" name=""/>
+        <p:cNvGrpSpPr/>
+        <p:nvPr/>
+      </p:nvGrpSpPr>
+      <p:grpSpPr>
+        <a:xfrm>
+          <a:off x="0" y="0"/>
+          <a:ext cx="0" cy="0"/>
+          <a:chOff x="0" y="0"/>
+          <a:chExt cx="0" cy="0"/>
+        </a:xfrm>
+      </p:grpSpPr>
+      <p:grpSp>
+        <p:nvGrpSpPr>
+          <p:cNvPr id="25" name="그룹 24"/>
+          <p:cNvGrpSpPr/>
+          <p:nvPr/>
+        </p:nvGrpSpPr>
+        <p:grpSpPr>
+          <a:xfrm>
+            <a:off x="1781325" y="1314555"/>
+            <a:ext cx="8629350" cy="2976741"/>
+            <a:chOff x="2235905" y="1940630"/>
+            <a:chExt cx="8629350" cy="2976741"/>
+          </a:xfrm>
+        </p:grpSpPr>
+        <p:sp>
+          <p:nvSpPr>
+            <p:cNvPr id="2" name="직사각형 1"/>
+            <p:cNvSpPr/>
+            <p:nvPr/>
+          </p:nvSpPr>
+          <p:spPr>
+            <a:xfrm>
+              <a:off x="2235905" y="1940630"/>
+              <a:ext cx="8629350" cy="830997"/>
+            </a:xfrm>
+            <a:prstGeom prst="rect">
+              <a:avLst/>
+            </a:prstGeom>
+            <a:ln>
+              <a:noFill/>
+            </a:ln>
+          </p:spPr>
+          <p:txBody>
+            <a:bodyPr wrap="none">
+              <a:spAutoFit/>
+            </a:bodyPr>
+            <a:lstStyle/>
+            <a:p>
+              <a:r>
+                <a:rPr lang="en-US" altLang="ko-KR" sz="4800" dirty="0" smtClean="0"/>
+                <a:t>System.out.println(numbers1.length);</a:t>
+              </a:r>
+              <a:endParaRPr lang="ko-KR" altLang="en-US" sz="4800" dirty="0"/>
+            </a:p>
+          </p:txBody>
+        </p:sp>
+        <p:grpSp>
+          <p:nvGrpSpPr>
+            <p:cNvPr id="3" name="그룹 2"/>
+            <p:cNvGrpSpPr/>
+            <p:nvPr/>
+          </p:nvGrpSpPr>
+          <p:grpSpPr>
+            <a:xfrm>
+              <a:off x="3856237" y="3781999"/>
+              <a:ext cx="5388686" cy="1135372"/>
+              <a:chOff x="3035560" y="2640086"/>
+              <a:chExt cx="5388686" cy="1135372"/>
+            </a:xfrm>
+          </p:grpSpPr>
+          <p:grpSp>
+            <p:nvGrpSpPr>
+              <p:cNvPr id="4" name="그룹 3"/>
+              <p:cNvGrpSpPr/>
+              <p:nvPr/>
+            </p:nvGrpSpPr>
+            <p:grpSpPr>
+              <a:xfrm>
+                <a:off x="3035560" y="2640086"/>
+                <a:ext cx="1036289" cy="1135372"/>
+                <a:chOff x="1877654" y="1556951"/>
+                <a:chExt cx="873783" cy="870303"/>
               </a:xfrm>
             </p:grpSpPr>
             <p:sp>
@@ -4064,7 +6023,7 @@
               <p:spPr>
                 <a:xfrm>
                   <a:off x="1877654" y="2120555"/>
-                  <a:ext cx="870143" cy="274074"/>
+                  <a:ext cx="870143" cy="306699"/>
                 </a:xfrm>
                 <a:prstGeom prst="rect">
                   <a:avLst/>
@@ -4083,18 +6042,12 @@
                   <a:pPr algn="ctr"/>
                   <a:r>
                     <a:rPr lang="en-US" altLang="ko-KR" sz="2000" dirty="0">
-                      <a:solidFill>
-                        <a:srgbClr val="333333"/>
-                      </a:solidFill>
                       <a:latin typeface="넥슨 풋볼고딕 B" panose="020B0803000000000000" pitchFamily="50" charset="-127"/>
                       <a:ea typeface="넥슨 풋볼고딕 B" panose="020B0803000000000000" pitchFamily="50" charset="-127"/>
                     </a:rPr>
                     <a:t>0</a:t>
                   </a:r>
                   <a:endParaRPr lang="ko-KR" altLang="en-US" sz="2000" dirty="0">
-                    <a:solidFill>
-                      <a:srgbClr val="333333"/>
-                    </a:solidFill>
                     <a:latin typeface="넥슨 풋볼고딕 B" panose="020B0803000000000000" pitchFamily="50" charset="-127"/>
                     <a:ea typeface="넥슨 풋볼고딕 B" panose="020B0803000000000000" pitchFamily="50" charset="-127"/>
                   </a:endParaRPr>
@@ -4129,18 +6082,12 @@
                   <a:pPr algn="ctr"/>
                   <a:r>
                     <a:rPr lang="en-US" altLang="ko-KR" sz="2100" dirty="0" smtClean="0">
-                      <a:solidFill>
-                        <a:srgbClr val="333333"/>
-                      </a:solidFill>
                       <a:latin typeface="넥슨 풋볼고딕 B" panose="020B0803000000000000" pitchFamily="50" charset="-127"/>
                       <a:ea typeface="넥슨 풋볼고딕 B" panose="020B0803000000000000" pitchFamily="50" charset="-127"/>
                     </a:rPr>
                     <a:t>10</a:t>
                   </a:r>
                   <a:endParaRPr lang="ko-KR" altLang="en-US" sz="2100" dirty="0">
-                    <a:solidFill>
-                      <a:srgbClr val="333333"/>
-                    </a:solidFill>
                     <a:latin typeface="넥슨 풋볼고딕 B" panose="020B0803000000000000" pitchFamily="50" charset="-127"/>
                     <a:ea typeface="넥슨 풋볼고딕 B" panose="020B0803000000000000" pitchFamily="50" charset="-127"/>
                   </a:endParaRPr>
@@ -4157,9 +6104,9 @@
             <p:grpSpPr>
               <a:xfrm>
                 <a:off x="4487804" y="2640086"/>
-                <a:ext cx="1036289" cy="1095195"/>
+                <a:ext cx="1036289" cy="1135372"/>
                 <a:chOff x="1877654" y="1556951"/>
-                <a:chExt cx="873783" cy="839506"/>
+                <a:chExt cx="873783" cy="870303"/>
               </a:xfrm>
             </p:grpSpPr>
             <p:sp>
@@ -4266,7 +6213,7 @@
               <p:spPr>
                 <a:xfrm>
                   <a:off x="1877654" y="2120555"/>
-                  <a:ext cx="870143" cy="274074"/>
+                  <a:ext cx="870143" cy="306699"/>
                 </a:xfrm>
                 <a:prstGeom prst="rect">
                   <a:avLst/>
@@ -4285,18 +6232,12 @@
                   <a:pPr algn="ctr"/>
                   <a:r>
                     <a:rPr lang="en-US" altLang="ko-KR" sz="2000" dirty="0">
-                      <a:solidFill>
-                        <a:srgbClr val="333333"/>
-                      </a:solidFill>
                       <a:latin typeface="넥슨 풋볼고딕 B" panose="020B0803000000000000" pitchFamily="50" charset="-127"/>
                       <a:ea typeface="넥슨 풋볼고딕 B" panose="020B0803000000000000" pitchFamily="50" charset="-127"/>
                     </a:rPr>
                     <a:t>1</a:t>
                   </a:r>
                   <a:endParaRPr lang="ko-KR" altLang="en-US" sz="2000" dirty="0">
-                    <a:solidFill>
-                      <a:srgbClr val="333333"/>
-                    </a:solidFill>
                     <a:latin typeface="넥슨 풋볼고딕 B" panose="020B0803000000000000" pitchFamily="50" charset="-127"/>
                     <a:ea typeface="넥슨 풋볼고딕 B" panose="020B0803000000000000" pitchFamily="50" charset="-127"/>
                   </a:endParaRPr>
@@ -4331,18 +6272,12 @@
                   <a:pPr algn="ctr"/>
                   <a:r>
                     <a:rPr lang="en-US" altLang="ko-KR" sz="2100" dirty="0" smtClean="0">
-                      <a:solidFill>
-                        <a:srgbClr val="333333"/>
-                      </a:solidFill>
                       <a:latin typeface="넥슨 풋볼고딕 B" panose="020B0803000000000000" pitchFamily="50" charset="-127"/>
                       <a:ea typeface="넥슨 풋볼고딕 B" panose="020B0803000000000000" pitchFamily="50" charset="-127"/>
                     </a:rPr>
                     <a:t>20</a:t>
                   </a:r>
                   <a:endParaRPr lang="ko-KR" altLang="en-US" sz="2100" dirty="0">
-                    <a:solidFill>
-                      <a:srgbClr val="333333"/>
-                    </a:solidFill>
                     <a:latin typeface="넥슨 풋볼고딕 B" panose="020B0803000000000000" pitchFamily="50" charset="-127"/>
                     <a:ea typeface="넥슨 풋볼고딕 B" panose="020B0803000000000000" pitchFamily="50" charset="-127"/>
                   </a:endParaRPr>
@@ -4359,9 +6294,9 @@
             <p:grpSpPr>
               <a:xfrm>
                 <a:off x="5940047" y="2640086"/>
-                <a:ext cx="1036289" cy="1095195"/>
+                <a:ext cx="1036289" cy="1135372"/>
                 <a:chOff x="1877654" y="1556951"/>
-                <a:chExt cx="873783" cy="839506"/>
+                <a:chExt cx="873783" cy="870303"/>
               </a:xfrm>
             </p:grpSpPr>
             <p:sp>
@@ -4468,7 +6403,7 @@
               <p:spPr>
                 <a:xfrm>
                   <a:off x="1877654" y="2120555"/>
-                  <a:ext cx="870143" cy="274074"/>
+                  <a:ext cx="870143" cy="306699"/>
                 </a:xfrm>
                 <a:prstGeom prst="rect">
                   <a:avLst/>
@@ -4487,18 +6422,12 @@
                   <a:pPr algn="ctr"/>
                   <a:r>
                     <a:rPr lang="en-US" altLang="ko-KR" sz="2000" dirty="0">
-                      <a:solidFill>
-                        <a:srgbClr val="333333"/>
-                      </a:solidFill>
                       <a:latin typeface="넥슨 풋볼고딕 B" panose="020B0803000000000000" pitchFamily="50" charset="-127"/>
                       <a:ea typeface="넥슨 풋볼고딕 B" panose="020B0803000000000000" pitchFamily="50" charset="-127"/>
                     </a:rPr>
                     <a:t>2</a:t>
                   </a:r>
                   <a:endParaRPr lang="ko-KR" altLang="en-US" sz="2000" dirty="0">
-                    <a:solidFill>
-                      <a:srgbClr val="333333"/>
-                    </a:solidFill>
                     <a:latin typeface="넥슨 풋볼고딕 B" panose="020B0803000000000000" pitchFamily="50" charset="-127"/>
                     <a:ea typeface="넥슨 풋볼고딕 B" panose="020B0803000000000000" pitchFamily="50" charset="-127"/>
                   </a:endParaRPr>
@@ -4533,18 +6462,12 @@
                   <a:pPr algn="ctr"/>
                   <a:r>
                     <a:rPr lang="en-US" altLang="ko-KR" sz="2100" dirty="0" smtClean="0">
-                      <a:solidFill>
-                        <a:srgbClr val="333333"/>
-                      </a:solidFill>
                       <a:latin typeface="넥슨 풋볼고딕 B" panose="020B0803000000000000" pitchFamily="50" charset="-127"/>
                       <a:ea typeface="넥슨 풋볼고딕 B" panose="020B0803000000000000" pitchFamily="50" charset="-127"/>
                     </a:rPr>
                     <a:t>30</a:t>
                   </a:r>
                   <a:endParaRPr lang="ko-KR" altLang="en-US" sz="2100" dirty="0">
-                    <a:solidFill>
-                      <a:srgbClr val="333333"/>
-                    </a:solidFill>
                     <a:latin typeface="넥슨 풋볼고딕 B" panose="020B0803000000000000" pitchFamily="50" charset="-127"/>
                     <a:ea typeface="넥슨 풋볼고딕 B" panose="020B0803000000000000" pitchFamily="50" charset="-127"/>
                   </a:endParaRPr>
@@ -4689,2013 +6612,12 @@
                   <a:pPr algn="ctr"/>
                   <a:r>
                     <a:rPr lang="en-US" altLang="ko-KR" sz="2000" dirty="0" smtClean="0">
-                      <a:solidFill>
-                        <a:srgbClr val="333333"/>
-                      </a:solidFill>
                       <a:latin typeface="넥슨 풋볼고딕 B" panose="020B0803000000000000" pitchFamily="50" charset="-127"/>
                       <a:ea typeface="넥슨 풋볼고딕 B" panose="020B0803000000000000" pitchFamily="50" charset="-127"/>
                     </a:rPr>
                     <a:t>3</a:t>
                   </a:r>
                   <a:endParaRPr lang="ko-KR" altLang="en-US" sz="2000" dirty="0">
-                    <a:solidFill>
-                      <a:srgbClr val="333333"/>
-                    </a:solidFill>
-                    <a:latin typeface="넥슨 풋볼고딕 B" panose="020B0803000000000000" pitchFamily="50" charset="-127"/>
-                    <a:ea typeface="넥슨 풋볼고딕 B" panose="020B0803000000000000" pitchFamily="50" charset="-127"/>
-                  </a:endParaRPr>
-                </a:p>
-              </p:txBody>
-            </p:sp>
-            <p:sp>
-              <p:nvSpPr>
-                <p:cNvPr id="11" name="TextBox 10"/>
-                <p:cNvSpPr txBox="1"/>
-                <p:nvPr/>
-              </p:nvSpPr>
-              <p:spPr>
-                <a:xfrm>
-                  <a:off x="649468" y="1679374"/>
-                  <a:ext cx="870143" cy="318494"/>
-                </a:xfrm>
-                <a:prstGeom prst="rect">
-                  <a:avLst/>
-                </a:prstGeom>
-                <a:noFill/>
-                <a:ln>
-                  <a:noFill/>
-                </a:ln>
-              </p:spPr>
-              <p:txBody>
-                <a:bodyPr wrap="square" rtlCol="0" anchor="ctr">
-                  <a:spAutoFit/>
-                </a:bodyPr>
-                <a:lstStyle/>
-                <a:p>
-                  <a:pPr algn="ctr"/>
-                  <a:endParaRPr lang="ko-KR" altLang="en-US" sz="2100" dirty="0">
-                    <a:solidFill>
-                      <a:srgbClr val="333333"/>
-                    </a:solidFill>
-                    <a:latin typeface="넥슨 풋볼고딕 B" panose="020B0803000000000000" pitchFamily="50" charset="-127"/>
-                    <a:ea typeface="넥슨 풋볼고딕 B" panose="020B0803000000000000" pitchFamily="50" charset="-127"/>
-                  </a:endParaRPr>
-                </a:p>
-              </p:txBody>
-            </p:sp>
-          </p:grpSp>
-        </p:grpSp>
-      </p:grpSp>
-      <p:sp>
-        <p:nvSpPr>
-          <p:cNvPr id="47" name="오른쪽 화살표 46"/>
-          <p:cNvSpPr/>
-          <p:nvPr/>
-        </p:nvSpPr>
-        <p:spPr>
-          <a:xfrm rot="16200000">
-            <a:off x="3478978" y="5084258"/>
-            <a:ext cx="745524" cy="642552"/>
-          </a:xfrm>
-          <a:prstGeom prst="rightArrow">
-            <a:avLst/>
-          </a:prstGeom>
-          <a:solidFill>
-            <a:srgbClr val="C00000"/>
-          </a:solidFill>
-          <a:ln w="38100">
-            <a:noFill/>
-          </a:ln>
-        </p:spPr>
-        <p:style>
-          <a:lnRef idx="2">
-            <a:schemeClr val="accent1">
-              <a:shade val="50000"/>
-            </a:schemeClr>
-          </a:lnRef>
-          <a:fillRef idx="1">
-            <a:schemeClr val="accent1"/>
-          </a:fillRef>
-          <a:effectRef idx="0">
-            <a:schemeClr val="accent1"/>
-          </a:effectRef>
-          <a:fontRef idx="minor">
-            <a:schemeClr val="lt1"/>
-          </a:fontRef>
-        </p:style>
-        <p:txBody>
-          <a:bodyPr rot="0" spcFirstLastPara="0" vertOverflow="overflow" horzOverflow="overflow" vert="horz" wrap="square" lIns="91440" tIns="45720" rIns="91440" bIns="45720" numCol="1" spcCol="0" rtlCol="0" fromWordArt="0" anchor="ctr" anchorCtr="0" forceAA="0" compatLnSpc="1">
-            <a:prstTxWarp prst="textNoShape">
-              <a:avLst/>
-            </a:prstTxWarp>
-            <a:noAutofit/>
-          </a:bodyPr>
-          <a:lstStyle/>
-          <a:p>
-            <a:pPr algn="ctr"/>
-            <a:endParaRPr lang="ko-KR" altLang="en-US"/>
-          </a:p>
-        </p:txBody>
-      </p:sp>
-    </p:spTree>
-    <p:extLst>
-      <p:ext uri="{BB962C8B-B14F-4D97-AF65-F5344CB8AC3E}">
-        <p14:creationId xmlns:p14="http://schemas.microsoft.com/office/powerpoint/2010/main" val="3946902081"/>
-      </p:ext>
-    </p:extLst>
-  </p:cSld>
-  <p:clrMapOvr>
-    <a:masterClrMapping/>
-  </p:clrMapOvr>
-  <p:timing>
-    <p:tnLst>
-      <p:par>
-        <p:cTn id="1" dur="indefinite" restart="never" nodeType="tmRoot"/>
-      </p:par>
-    </p:tnLst>
-  </p:timing>
-</p:sld>
-</file>
-
-<file path=ppt/slides/slide11.xml><?xml version="1.0" encoding="utf-8"?>
-<p:sld xmlns:a="http://schemas.openxmlformats.org/drawingml/2006/main" xmlns:r="http://schemas.openxmlformats.org/officeDocument/2006/relationships" xmlns:p="http://schemas.openxmlformats.org/presentationml/2006/main">
-  <p:cSld>
-    <p:spTree>
-      <p:nvGrpSpPr>
-        <p:cNvPr id="1" name=""/>
-        <p:cNvGrpSpPr/>
-        <p:nvPr/>
-      </p:nvGrpSpPr>
-      <p:grpSpPr>
-        <a:xfrm>
-          <a:off x="0" y="0"/>
-          <a:ext cx="0" cy="0"/>
-          <a:chOff x="0" y="0"/>
-          <a:chExt cx="0" cy="0"/>
-        </a:xfrm>
-      </p:grpSpPr>
-      <p:grpSp>
-        <p:nvGrpSpPr>
-          <p:cNvPr id="24" name="그룹 23"/>
-          <p:cNvGrpSpPr/>
-          <p:nvPr/>
-        </p:nvGrpSpPr>
-        <p:grpSpPr>
-          <a:xfrm>
-            <a:off x="2235905" y="1940630"/>
-            <a:ext cx="7720190" cy="2976741"/>
-            <a:chOff x="2235905" y="3013502"/>
-            <a:chExt cx="7720190" cy="2976741"/>
-          </a:xfrm>
-        </p:grpSpPr>
-        <p:sp>
-          <p:nvSpPr>
-            <p:cNvPr id="2" name="직사각형 1"/>
-            <p:cNvSpPr/>
-            <p:nvPr/>
-          </p:nvSpPr>
-          <p:spPr>
-            <a:xfrm>
-              <a:off x="2235905" y="3013502"/>
-              <a:ext cx="7720190" cy="830997"/>
-            </a:xfrm>
-            <a:prstGeom prst="rect">
-              <a:avLst/>
-            </a:prstGeom>
-          </p:spPr>
-          <p:txBody>
-            <a:bodyPr wrap="none">
-              <a:spAutoFit/>
-            </a:bodyPr>
-            <a:lstStyle/>
-            <a:p>
-              <a:r>
-                <a:rPr lang="en-US" altLang="ko-KR" sz="4800" dirty="0" smtClean="0"/>
-                <a:t>System.out.println(numbers1[3]);</a:t>
-              </a:r>
-              <a:endParaRPr lang="ko-KR" altLang="en-US" sz="4800" dirty="0"/>
-            </a:p>
-          </p:txBody>
-        </p:sp>
-        <p:grpSp>
-          <p:nvGrpSpPr>
-            <p:cNvPr id="3" name="그룹 2"/>
-            <p:cNvGrpSpPr/>
-            <p:nvPr/>
-          </p:nvGrpSpPr>
-          <p:grpSpPr>
-            <a:xfrm>
-              <a:off x="3335754" y="4854871"/>
-              <a:ext cx="5388686" cy="1135372"/>
-              <a:chOff x="3035560" y="2640086"/>
-              <a:chExt cx="5388686" cy="1135372"/>
-            </a:xfrm>
-          </p:grpSpPr>
-          <p:grpSp>
-            <p:nvGrpSpPr>
-              <p:cNvPr id="4" name="그룹 3"/>
-              <p:cNvGrpSpPr/>
-              <p:nvPr/>
-            </p:nvGrpSpPr>
-            <p:grpSpPr>
-              <a:xfrm>
-                <a:off x="3035560" y="2640086"/>
-                <a:ext cx="1036289" cy="1095195"/>
-                <a:chOff x="1877654" y="1556951"/>
-                <a:chExt cx="873783" cy="839506"/>
-              </a:xfrm>
-            </p:grpSpPr>
-            <p:sp>
-              <p:nvSpPr>
-                <p:cNvPr id="20" name="모서리가 둥근 직사각형 19"/>
-                <p:cNvSpPr/>
-                <p:nvPr/>
-              </p:nvSpPr>
-              <p:spPr>
-                <a:xfrm flipH="1">
-                  <a:off x="1881293" y="1556951"/>
-                  <a:ext cx="870144" cy="839506"/>
-                </a:xfrm>
-                <a:prstGeom prst="roundRect">
-                  <a:avLst>
-                    <a:gd name="adj" fmla="val 10749"/>
-                  </a:avLst>
-                </a:prstGeom>
-                <a:noFill/>
-                <a:ln w="38100">
-                  <a:solidFill>
-                    <a:srgbClr val="333333"/>
-                  </a:solidFill>
-                </a:ln>
-              </p:spPr>
-              <p:style>
-                <a:lnRef idx="2">
-                  <a:schemeClr val="accent1">
-                    <a:shade val="50000"/>
-                  </a:schemeClr>
-                </a:lnRef>
-                <a:fillRef idx="1">
-                  <a:schemeClr val="accent1"/>
-                </a:fillRef>
-                <a:effectRef idx="0">
-                  <a:schemeClr val="accent1"/>
-                </a:effectRef>
-                <a:fontRef idx="minor">
-                  <a:schemeClr val="lt1"/>
-                </a:fontRef>
-              </p:style>
-              <p:txBody>
-                <a:bodyPr rot="0" spcFirstLastPara="0" vertOverflow="overflow" horzOverflow="overflow" vert="horz" wrap="square" lIns="68579" tIns="34290" rIns="68579" bIns="34290" numCol="1" spcCol="0" rtlCol="0" fromWordArt="0" anchor="ctr" anchorCtr="0" forceAA="0" compatLnSpc="1">
-                  <a:prstTxWarp prst="textNoShape">
-                    <a:avLst/>
-                  </a:prstTxWarp>
-                  <a:noAutofit/>
-                </a:bodyPr>
-                <a:lstStyle/>
-                <a:p>
-                  <a:pPr algn="ctr"/>
-                  <a:endParaRPr lang="ko-KR" altLang="en-US" sz="1350" dirty="0">
-                    <a:ln w="38100">
-                      <a:solidFill>
-                        <a:srgbClr val="333333"/>
-                      </a:solidFill>
-                    </a:ln>
-                    <a:noFill/>
-                  </a:endParaRPr>
-                </a:p>
-              </p:txBody>
-            </p:sp>
-            <p:cxnSp>
-              <p:nvCxnSpPr>
-                <p:cNvPr id="21" name="직선 연결선 20"/>
-                <p:cNvCxnSpPr/>
-                <p:nvPr/>
-              </p:nvCxnSpPr>
-              <p:spPr>
-                <a:xfrm>
-                  <a:off x="1881293" y="2117124"/>
-                  <a:ext cx="870144" cy="0"/>
-                </a:xfrm>
-                <a:prstGeom prst="line">
-                  <a:avLst/>
-                </a:prstGeom>
-                <a:ln w="38100">
-                  <a:solidFill>
-                    <a:srgbClr val="333333"/>
-                  </a:solidFill>
-                </a:ln>
-              </p:spPr>
-              <p:style>
-                <a:lnRef idx="1">
-                  <a:schemeClr val="accent1"/>
-                </a:lnRef>
-                <a:fillRef idx="0">
-                  <a:schemeClr val="accent1"/>
-                </a:fillRef>
-                <a:effectRef idx="0">
-                  <a:schemeClr val="accent1"/>
-                </a:effectRef>
-                <a:fontRef idx="minor">
-                  <a:schemeClr val="tx1"/>
-                </a:fontRef>
-              </p:style>
-            </p:cxnSp>
-            <p:sp>
-              <p:nvSpPr>
-                <p:cNvPr id="22" name="TextBox 21"/>
-                <p:cNvSpPr txBox="1"/>
-                <p:nvPr/>
-              </p:nvSpPr>
-              <p:spPr>
-                <a:xfrm>
-                  <a:off x="1877654" y="2120555"/>
-                  <a:ext cx="870143" cy="274074"/>
-                </a:xfrm>
-                <a:prstGeom prst="rect">
-                  <a:avLst/>
-                </a:prstGeom>
-                <a:noFill/>
-              </p:spPr>
-              <p:txBody>
-                <a:bodyPr wrap="square" rtlCol="0">
-                  <a:spAutoFit/>
-                </a:bodyPr>
-                <a:lstStyle/>
-                <a:p>
-                  <a:pPr algn="ctr"/>
-                  <a:r>
-                    <a:rPr lang="en-US" altLang="ko-KR" sz="2000" dirty="0">
-                      <a:solidFill>
-                        <a:srgbClr val="333333"/>
-                      </a:solidFill>
-                      <a:latin typeface="넥슨 풋볼고딕 B" panose="020B0803000000000000" pitchFamily="50" charset="-127"/>
-                      <a:ea typeface="넥슨 풋볼고딕 B" panose="020B0803000000000000" pitchFamily="50" charset="-127"/>
-                    </a:rPr>
-                    <a:t>0</a:t>
-                  </a:r>
-                  <a:endParaRPr lang="ko-KR" altLang="en-US" sz="2000" dirty="0">
-                    <a:solidFill>
-                      <a:srgbClr val="333333"/>
-                    </a:solidFill>
-                    <a:latin typeface="넥슨 풋볼고딕 B" panose="020B0803000000000000" pitchFamily="50" charset="-127"/>
-                    <a:ea typeface="넥슨 풋볼고딕 B" panose="020B0803000000000000" pitchFamily="50" charset="-127"/>
-                  </a:endParaRPr>
-                </a:p>
-              </p:txBody>
-            </p:sp>
-            <p:sp>
-              <p:nvSpPr>
-                <p:cNvPr id="23" name="TextBox 22"/>
-                <p:cNvSpPr txBox="1"/>
-                <p:nvPr/>
-              </p:nvSpPr>
-              <p:spPr>
-                <a:xfrm>
-                  <a:off x="1877654" y="1679374"/>
-                  <a:ext cx="870143" cy="318494"/>
-                </a:xfrm>
-                <a:prstGeom prst="rect">
-                  <a:avLst/>
-                </a:prstGeom>
-                <a:noFill/>
-              </p:spPr>
-              <p:txBody>
-                <a:bodyPr wrap="square" rtlCol="0" anchor="ctr">
-                  <a:spAutoFit/>
-                </a:bodyPr>
-                <a:lstStyle/>
-                <a:p>
-                  <a:pPr algn="ctr"/>
-                  <a:r>
-                    <a:rPr lang="en-US" altLang="ko-KR" sz="2100" dirty="0" smtClean="0">
-                      <a:solidFill>
-                        <a:srgbClr val="333333"/>
-                      </a:solidFill>
-                      <a:latin typeface="넥슨 풋볼고딕 B" panose="020B0803000000000000" pitchFamily="50" charset="-127"/>
-                      <a:ea typeface="넥슨 풋볼고딕 B" panose="020B0803000000000000" pitchFamily="50" charset="-127"/>
-                    </a:rPr>
-                    <a:t>10</a:t>
-                  </a:r>
-                  <a:endParaRPr lang="ko-KR" altLang="en-US" sz="2100" dirty="0">
-                    <a:solidFill>
-                      <a:srgbClr val="333333"/>
-                    </a:solidFill>
-                    <a:latin typeface="넥슨 풋볼고딕 B" panose="020B0803000000000000" pitchFamily="50" charset="-127"/>
-                    <a:ea typeface="넥슨 풋볼고딕 B" panose="020B0803000000000000" pitchFamily="50" charset="-127"/>
-                  </a:endParaRPr>
-                </a:p>
-              </p:txBody>
-            </p:sp>
-          </p:grpSp>
-          <p:grpSp>
-            <p:nvGrpSpPr>
-              <p:cNvPr id="5" name="그룹 4"/>
-              <p:cNvGrpSpPr/>
-              <p:nvPr/>
-            </p:nvGrpSpPr>
-            <p:grpSpPr>
-              <a:xfrm>
-                <a:off x="4487804" y="2640086"/>
-                <a:ext cx="1036289" cy="1095195"/>
-                <a:chOff x="1877654" y="1556951"/>
-                <a:chExt cx="873783" cy="839506"/>
-              </a:xfrm>
-            </p:grpSpPr>
-            <p:sp>
-              <p:nvSpPr>
-                <p:cNvPr id="16" name="모서리가 둥근 직사각형 15"/>
-                <p:cNvSpPr/>
-                <p:nvPr/>
-              </p:nvSpPr>
-              <p:spPr>
-                <a:xfrm flipH="1">
-                  <a:off x="1881293" y="1556951"/>
-                  <a:ext cx="870144" cy="839506"/>
-                </a:xfrm>
-                <a:prstGeom prst="roundRect">
-                  <a:avLst>
-                    <a:gd name="adj" fmla="val 10749"/>
-                  </a:avLst>
-                </a:prstGeom>
-                <a:noFill/>
-                <a:ln w="38100">
-                  <a:solidFill>
-                    <a:srgbClr val="333333"/>
-                  </a:solidFill>
-                </a:ln>
-              </p:spPr>
-              <p:style>
-                <a:lnRef idx="2">
-                  <a:schemeClr val="accent1">
-                    <a:shade val="50000"/>
-                  </a:schemeClr>
-                </a:lnRef>
-                <a:fillRef idx="1">
-                  <a:schemeClr val="accent1"/>
-                </a:fillRef>
-                <a:effectRef idx="0">
-                  <a:schemeClr val="accent1"/>
-                </a:effectRef>
-                <a:fontRef idx="minor">
-                  <a:schemeClr val="lt1"/>
-                </a:fontRef>
-              </p:style>
-              <p:txBody>
-                <a:bodyPr rot="0" spcFirstLastPara="0" vertOverflow="overflow" horzOverflow="overflow" vert="horz" wrap="square" lIns="68579" tIns="34290" rIns="68579" bIns="34290" numCol="1" spcCol="0" rtlCol="0" fromWordArt="0" anchor="ctr" anchorCtr="0" forceAA="0" compatLnSpc="1">
-                  <a:prstTxWarp prst="textNoShape">
-                    <a:avLst/>
-                  </a:prstTxWarp>
-                  <a:noAutofit/>
-                </a:bodyPr>
-                <a:lstStyle/>
-                <a:p>
-                  <a:pPr algn="ctr"/>
-                  <a:endParaRPr lang="ko-KR" altLang="en-US" sz="1350" dirty="0">
-                    <a:ln w="38100">
-                      <a:solidFill>
-                        <a:srgbClr val="333333"/>
-                      </a:solidFill>
-                    </a:ln>
-                    <a:noFill/>
-                  </a:endParaRPr>
-                </a:p>
-              </p:txBody>
-            </p:sp>
-            <p:cxnSp>
-              <p:nvCxnSpPr>
-                <p:cNvPr id="17" name="직선 연결선 16"/>
-                <p:cNvCxnSpPr/>
-                <p:nvPr/>
-              </p:nvCxnSpPr>
-              <p:spPr>
-                <a:xfrm>
-                  <a:off x="1881293" y="2117124"/>
-                  <a:ext cx="870144" cy="0"/>
-                </a:xfrm>
-                <a:prstGeom prst="line">
-                  <a:avLst/>
-                </a:prstGeom>
-                <a:ln w="38100">
-                  <a:solidFill>
-                    <a:srgbClr val="333333"/>
-                  </a:solidFill>
-                </a:ln>
-              </p:spPr>
-              <p:style>
-                <a:lnRef idx="1">
-                  <a:schemeClr val="accent1"/>
-                </a:lnRef>
-                <a:fillRef idx="0">
-                  <a:schemeClr val="accent1"/>
-                </a:fillRef>
-                <a:effectRef idx="0">
-                  <a:schemeClr val="accent1"/>
-                </a:effectRef>
-                <a:fontRef idx="minor">
-                  <a:schemeClr val="tx1"/>
-                </a:fontRef>
-              </p:style>
-            </p:cxnSp>
-            <p:sp>
-              <p:nvSpPr>
-                <p:cNvPr id="18" name="TextBox 17"/>
-                <p:cNvSpPr txBox="1"/>
-                <p:nvPr/>
-              </p:nvSpPr>
-              <p:spPr>
-                <a:xfrm>
-                  <a:off x="1877654" y="2120555"/>
-                  <a:ext cx="870143" cy="274074"/>
-                </a:xfrm>
-                <a:prstGeom prst="rect">
-                  <a:avLst/>
-                </a:prstGeom>
-                <a:noFill/>
-              </p:spPr>
-              <p:txBody>
-                <a:bodyPr wrap="square" rtlCol="0">
-                  <a:spAutoFit/>
-                </a:bodyPr>
-                <a:lstStyle/>
-                <a:p>
-                  <a:pPr algn="ctr"/>
-                  <a:r>
-                    <a:rPr lang="en-US" altLang="ko-KR" sz="2000" dirty="0">
-                      <a:solidFill>
-                        <a:srgbClr val="333333"/>
-                      </a:solidFill>
-                      <a:latin typeface="넥슨 풋볼고딕 B" panose="020B0803000000000000" pitchFamily="50" charset="-127"/>
-                      <a:ea typeface="넥슨 풋볼고딕 B" panose="020B0803000000000000" pitchFamily="50" charset="-127"/>
-                    </a:rPr>
-                    <a:t>1</a:t>
-                  </a:r>
-                  <a:endParaRPr lang="ko-KR" altLang="en-US" sz="2000" dirty="0">
-                    <a:solidFill>
-                      <a:srgbClr val="333333"/>
-                    </a:solidFill>
-                    <a:latin typeface="넥슨 풋볼고딕 B" panose="020B0803000000000000" pitchFamily="50" charset="-127"/>
-                    <a:ea typeface="넥슨 풋볼고딕 B" panose="020B0803000000000000" pitchFamily="50" charset="-127"/>
-                  </a:endParaRPr>
-                </a:p>
-              </p:txBody>
-            </p:sp>
-            <p:sp>
-              <p:nvSpPr>
-                <p:cNvPr id="19" name="TextBox 18"/>
-                <p:cNvSpPr txBox="1"/>
-                <p:nvPr/>
-              </p:nvSpPr>
-              <p:spPr>
-                <a:xfrm>
-                  <a:off x="1877654" y="1679374"/>
-                  <a:ext cx="870143" cy="318494"/>
-                </a:xfrm>
-                <a:prstGeom prst="rect">
-                  <a:avLst/>
-                </a:prstGeom>
-                <a:noFill/>
-              </p:spPr>
-              <p:txBody>
-                <a:bodyPr wrap="square" rtlCol="0" anchor="ctr">
-                  <a:spAutoFit/>
-                </a:bodyPr>
-                <a:lstStyle/>
-                <a:p>
-                  <a:pPr algn="ctr"/>
-                  <a:r>
-                    <a:rPr lang="en-US" altLang="ko-KR" sz="2100" dirty="0" smtClean="0">
-                      <a:solidFill>
-                        <a:srgbClr val="333333"/>
-                      </a:solidFill>
-                      <a:latin typeface="넥슨 풋볼고딕 B" panose="020B0803000000000000" pitchFamily="50" charset="-127"/>
-                      <a:ea typeface="넥슨 풋볼고딕 B" panose="020B0803000000000000" pitchFamily="50" charset="-127"/>
-                    </a:rPr>
-                    <a:t>20</a:t>
-                  </a:r>
-                  <a:endParaRPr lang="ko-KR" altLang="en-US" sz="2100" dirty="0">
-                    <a:solidFill>
-                      <a:srgbClr val="333333"/>
-                    </a:solidFill>
-                    <a:latin typeface="넥슨 풋볼고딕 B" panose="020B0803000000000000" pitchFamily="50" charset="-127"/>
-                    <a:ea typeface="넥슨 풋볼고딕 B" panose="020B0803000000000000" pitchFamily="50" charset="-127"/>
-                  </a:endParaRPr>
-                </a:p>
-              </p:txBody>
-            </p:sp>
-          </p:grpSp>
-          <p:grpSp>
-            <p:nvGrpSpPr>
-              <p:cNvPr id="6" name="그룹 5"/>
-              <p:cNvGrpSpPr/>
-              <p:nvPr/>
-            </p:nvGrpSpPr>
-            <p:grpSpPr>
-              <a:xfrm>
-                <a:off x="5940047" y="2640086"/>
-                <a:ext cx="1036289" cy="1095195"/>
-                <a:chOff x="1877654" y="1556951"/>
-                <a:chExt cx="873783" cy="839506"/>
-              </a:xfrm>
-            </p:grpSpPr>
-            <p:sp>
-              <p:nvSpPr>
-                <p:cNvPr id="12" name="모서리가 둥근 직사각형 11"/>
-                <p:cNvSpPr/>
-                <p:nvPr/>
-              </p:nvSpPr>
-              <p:spPr>
-                <a:xfrm flipH="1">
-                  <a:off x="1881293" y="1556951"/>
-                  <a:ext cx="870144" cy="839506"/>
-                </a:xfrm>
-                <a:prstGeom prst="roundRect">
-                  <a:avLst>
-                    <a:gd name="adj" fmla="val 10749"/>
-                  </a:avLst>
-                </a:prstGeom>
-                <a:noFill/>
-                <a:ln w="38100">
-                  <a:solidFill>
-                    <a:srgbClr val="333333"/>
-                  </a:solidFill>
-                </a:ln>
-              </p:spPr>
-              <p:style>
-                <a:lnRef idx="2">
-                  <a:schemeClr val="accent1">
-                    <a:shade val="50000"/>
-                  </a:schemeClr>
-                </a:lnRef>
-                <a:fillRef idx="1">
-                  <a:schemeClr val="accent1"/>
-                </a:fillRef>
-                <a:effectRef idx="0">
-                  <a:schemeClr val="accent1"/>
-                </a:effectRef>
-                <a:fontRef idx="minor">
-                  <a:schemeClr val="lt1"/>
-                </a:fontRef>
-              </p:style>
-              <p:txBody>
-                <a:bodyPr rot="0" spcFirstLastPara="0" vertOverflow="overflow" horzOverflow="overflow" vert="horz" wrap="square" lIns="68579" tIns="34290" rIns="68579" bIns="34290" numCol="1" spcCol="0" rtlCol="0" fromWordArt="0" anchor="ctr" anchorCtr="0" forceAA="0" compatLnSpc="1">
-                  <a:prstTxWarp prst="textNoShape">
-                    <a:avLst/>
-                  </a:prstTxWarp>
-                  <a:noAutofit/>
-                </a:bodyPr>
-                <a:lstStyle/>
-                <a:p>
-                  <a:pPr algn="ctr"/>
-                  <a:endParaRPr lang="ko-KR" altLang="en-US" sz="1350" dirty="0">
-                    <a:ln w="38100">
-                      <a:solidFill>
-                        <a:srgbClr val="333333"/>
-                      </a:solidFill>
-                    </a:ln>
-                    <a:noFill/>
-                  </a:endParaRPr>
-                </a:p>
-              </p:txBody>
-            </p:sp>
-            <p:cxnSp>
-              <p:nvCxnSpPr>
-                <p:cNvPr id="13" name="직선 연결선 12"/>
-                <p:cNvCxnSpPr/>
-                <p:nvPr/>
-              </p:nvCxnSpPr>
-              <p:spPr>
-                <a:xfrm>
-                  <a:off x="1881293" y="2117124"/>
-                  <a:ext cx="870144" cy="0"/>
-                </a:xfrm>
-                <a:prstGeom prst="line">
-                  <a:avLst/>
-                </a:prstGeom>
-                <a:ln w="38100">
-                  <a:solidFill>
-                    <a:srgbClr val="333333"/>
-                  </a:solidFill>
-                </a:ln>
-              </p:spPr>
-              <p:style>
-                <a:lnRef idx="1">
-                  <a:schemeClr val="accent1"/>
-                </a:lnRef>
-                <a:fillRef idx="0">
-                  <a:schemeClr val="accent1"/>
-                </a:fillRef>
-                <a:effectRef idx="0">
-                  <a:schemeClr val="accent1"/>
-                </a:effectRef>
-                <a:fontRef idx="minor">
-                  <a:schemeClr val="tx1"/>
-                </a:fontRef>
-              </p:style>
-            </p:cxnSp>
-            <p:sp>
-              <p:nvSpPr>
-                <p:cNvPr id="14" name="TextBox 13"/>
-                <p:cNvSpPr txBox="1"/>
-                <p:nvPr/>
-              </p:nvSpPr>
-              <p:spPr>
-                <a:xfrm>
-                  <a:off x="1877654" y="2120555"/>
-                  <a:ext cx="870143" cy="274074"/>
-                </a:xfrm>
-                <a:prstGeom prst="rect">
-                  <a:avLst/>
-                </a:prstGeom>
-                <a:noFill/>
-              </p:spPr>
-              <p:txBody>
-                <a:bodyPr wrap="square" rtlCol="0">
-                  <a:spAutoFit/>
-                </a:bodyPr>
-                <a:lstStyle/>
-                <a:p>
-                  <a:pPr algn="ctr"/>
-                  <a:r>
-                    <a:rPr lang="en-US" altLang="ko-KR" sz="2000" dirty="0">
-                      <a:solidFill>
-                        <a:srgbClr val="333333"/>
-                      </a:solidFill>
-                      <a:latin typeface="넥슨 풋볼고딕 B" panose="020B0803000000000000" pitchFamily="50" charset="-127"/>
-                      <a:ea typeface="넥슨 풋볼고딕 B" panose="020B0803000000000000" pitchFamily="50" charset="-127"/>
-                    </a:rPr>
-                    <a:t>2</a:t>
-                  </a:r>
-                  <a:endParaRPr lang="ko-KR" altLang="en-US" sz="2000" dirty="0">
-                    <a:solidFill>
-                      <a:srgbClr val="333333"/>
-                    </a:solidFill>
-                    <a:latin typeface="넥슨 풋볼고딕 B" panose="020B0803000000000000" pitchFamily="50" charset="-127"/>
-                    <a:ea typeface="넥슨 풋볼고딕 B" panose="020B0803000000000000" pitchFamily="50" charset="-127"/>
-                  </a:endParaRPr>
-                </a:p>
-              </p:txBody>
-            </p:sp>
-            <p:sp>
-              <p:nvSpPr>
-                <p:cNvPr id="15" name="TextBox 14"/>
-                <p:cNvSpPr txBox="1"/>
-                <p:nvPr/>
-              </p:nvSpPr>
-              <p:spPr>
-                <a:xfrm>
-                  <a:off x="1877654" y="1679374"/>
-                  <a:ext cx="870143" cy="318494"/>
-                </a:xfrm>
-                <a:prstGeom prst="rect">
-                  <a:avLst/>
-                </a:prstGeom>
-                <a:noFill/>
-              </p:spPr>
-              <p:txBody>
-                <a:bodyPr wrap="square" rtlCol="0" anchor="ctr">
-                  <a:spAutoFit/>
-                </a:bodyPr>
-                <a:lstStyle/>
-                <a:p>
-                  <a:pPr algn="ctr"/>
-                  <a:r>
-                    <a:rPr lang="en-US" altLang="ko-KR" sz="2100" dirty="0" smtClean="0">
-                      <a:solidFill>
-                        <a:srgbClr val="333333"/>
-                      </a:solidFill>
-                      <a:latin typeface="넥슨 풋볼고딕 B" panose="020B0803000000000000" pitchFamily="50" charset="-127"/>
-                      <a:ea typeface="넥슨 풋볼고딕 B" panose="020B0803000000000000" pitchFamily="50" charset="-127"/>
-                    </a:rPr>
-                    <a:t>30</a:t>
-                  </a:r>
-                  <a:endParaRPr lang="ko-KR" altLang="en-US" sz="2100" dirty="0">
-                    <a:solidFill>
-                      <a:srgbClr val="333333"/>
-                    </a:solidFill>
-                    <a:latin typeface="넥슨 풋볼고딕 B" panose="020B0803000000000000" pitchFamily="50" charset="-127"/>
-                    <a:ea typeface="넥슨 풋볼고딕 B" panose="020B0803000000000000" pitchFamily="50" charset="-127"/>
-                  </a:endParaRPr>
-                </a:p>
-              </p:txBody>
-            </p:sp>
-          </p:grpSp>
-          <p:grpSp>
-            <p:nvGrpSpPr>
-              <p:cNvPr id="7" name="그룹 6"/>
-              <p:cNvGrpSpPr/>
-              <p:nvPr/>
-            </p:nvGrpSpPr>
-            <p:grpSpPr>
-              <a:xfrm>
-                <a:off x="7387946" y="2640086"/>
-                <a:ext cx="1036300" cy="1135372"/>
-                <a:chOff x="649468" y="1556951"/>
-                <a:chExt cx="873788" cy="870303"/>
-              </a:xfrm>
-            </p:grpSpPr>
-            <p:sp>
-              <p:nvSpPr>
-                <p:cNvPr id="8" name="모서리가 둥근 직사각형 7"/>
-                <p:cNvSpPr/>
-                <p:nvPr/>
-              </p:nvSpPr>
-              <p:spPr>
-                <a:xfrm flipH="1">
-                  <a:off x="653111" y="1556951"/>
-                  <a:ext cx="870145" cy="839506"/>
-                </a:xfrm>
-                <a:prstGeom prst="roundRect">
-                  <a:avLst>
-                    <a:gd name="adj" fmla="val 10749"/>
-                  </a:avLst>
-                </a:prstGeom>
-                <a:noFill/>
-                <a:ln w="38100">
-                  <a:solidFill>
-                    <a:srgbClr val="333333"/>
-                  </a:solidFill>
-                </a:ln>
-              </p:spPr>
-              <p:style>
-                <a:lnRef idx="2">
-                  <a:schemeClr val="accent1">
-                    <a:shade val="50000"/>
-                  </a:schemeClr>
-                </a:lnRef>
-                <a:fillRef idx="1">
-                  <a:schemeClr val="accent1"/>
-                </a:fillRef>
-                <a:effectRef idx="0">
-                  <a:schemeClr val="accent1"/>
-                </a:effectRef>
-                <a:fontRef idx="minor">
-                  <a:schemeClr val="lt1"/>
-                </a:fontRef>
-              </p:style>
-              <p:txBody>
-                <a:bodyPr rot="0" spcFirstLastPara="0" vertOverflow="overflow" horzOverflow="overflow" vert="horz" wrap="square" lIns="68579" tIns="34290" rIns="68579" bIns="34290" numCol="1" spcCol="0" rtlCol="0" fromWordArt="0" anchor="ctr" anchorCtr="0" forceAA="0" compatLnSpc="1">
-                  <a:prstTxWarp prst="textNoShape">
-                    <a:avLst/>
-                  </a:prstTxWarp>
-                  <a:noAutofit/>
-                </a:bodyPr>
-                <a:lstStyle/>
-                <a:p>
-                  <a:pPr algn="ctr"/>
-                  <a:endParaRPr lang="ko-KR" altLang="en-US" sz="1350" dirty="0">
-                    <a:ln w="38100">
-                      <a:solidFill>
-                        <a:srgbClr val="333333"/>
-                      </a:solidFill>
-                    </a:ln>
-                    <a:noFill/>
-                  </a:endParaRPr>
-                </a:p>
-              </p:txBody>
-            </p:sp>
-            <p:cxnSp>
-              <p:nvCxnSpPr>
-                <p:cNvPr id="9" name="직선 연결선 8"/>
-                <p:cNvCxnSpPr/>
-                <p:nvPr/>
-              </p:nvCxnSpPr>
-              <p:spPr>
-                <a:xfrm>
-                  <a:off x="653111" y="2117124"/>
-                  <a:ext cx="870143" cy="0"/>
-                </a:xfrm>
-                <a:prstGeom prst="line">
-                  <a:avLst/>
-                </a:prstGeom>
-                <a:ln w="38100">
-                  <a:solidFill>
-                    <a:srgbClr val="333333"/>
-                  </a:solidFill>
-                </a:ln>
-              </p:spPr>
-              <p:style>
-                <a:lnRef idx="1">
-                  <a:schemeClr val="accent1"/>
-                </a:lnRef>
-                <a:fillRef idx="0">
-                  <a:schemeClr val="accent1"/>
-                </a:fillRef>
-                <a:effectRef idx="0">
-                  <a:schemeClr val="accent1"/>
-                </a:effectRef>
-                <a:fontRef idx="minor">
-                  <a:schemeClr val="tx1"/>
-                </a:fontRef>
-              </p:style>
-            </p:cxnSp>
-            <p:sp>
-              <p:nvSpPr>
-                <p:cNvPr id="10" name="TextBox 9"/>
-                <p:cNvSpPr txBox="1"/>
-                <p:nvPr/>
-              </p:nvSpPr>
-              <p:spPr>
-                <a:xfrm>
-                  <a:off x="649471" y="2120555"/>
-                  <a:ext cx="870142" cy="306699"/>
-                </a:xfrm>
-                <a:prstGeom prst="rect">
-                  <a:avLst/>
-                </a:prstGeom>
-                <a:noFill/>
-              </p:spPr>
-              <p:txBody>
-                <a:bodyPr wrap="square" rtlCol="0">
-                  <a:spAutoFit/>
-                </a:bodyPr>
-                <a:lstStyle/>
-                <a:p>
-                  <a:pPr algn="ctr"/>
-                  <a:r>
-                    <a:rPr lang="en-US" altLang="ko-KR" sz="2000" dirty="0" smtClean="0">
-                      <a:solidFill>
-                        <a:srgbClr val="333333"/>
-                      </a:solidFill>
-                      <a:latin typeface="넥슨 풋볼고딕 B" panose="020B0803000000000000" pitchFamily="50" charset="-127"/>
-                      <a:ea typeface="넥슨 풋볼고딕 B" panose="020B0803000000000000" pitchFamily="50" charset="-127"/>
-                    </a:rPr>
-                    <a:t>3</a:t>
-                  </a:r>
-                  <a:endParaRPr lang="ko-KR" altLang="en-US" sz="2000" dirty="0">
-                    <a:solidFill>
-                      <a:srgbClr val="333333"/>
-                    </a:solidFill>
-                    <a:latin typeface="넥슨 풋볼고딕 B" panose="020B0803000000000000" pitchFamily="50" charset="-127"/>
-                    <a:ea typeface="넥슨 풋볼고딕 B" panose="020B0803000000000000" pitchFamily="50" charset="-127"/>
-                  </a:endParaRPr>
-                </a:p>
-              </p:txBody>
-            </p:sp>
-            <p:sp>
-              <p:nvSpPr>
-                <p:cNvPr id="11" name="TextBox 10"/>
-                <p:cNvSpPr txBox="1"/>
-                <p:nvPr/>
-              </p:nvSpPr>
-              <p:spPr>
-                <a:xfrm>
-                  <a:off x="649468" y="1679374"/>
-                  <a:ext cx="870143" cy="318494"/>
-                </a:xfrm>
-                <a:prstGeom prst="rect">
-                  <a:avLst/>
-                </a:prstGeom>
-                <a:noFill/>
-              </p:spPr>
-              <p:txBody>
-                <a:bodyPr wrap="square" rtlCol="0" anchor="ctr">
-                  <a:spAutoFit/>
-                </a:bodyPr>
-                <a:lstStyle/>
-                <a:p>
-                  <a:pPr algn="ctr"/>
-                  <a:r>
-                    <a:rPr lang="en-US" altLang="ko-KR" sz="2100" dirty="0" smtClean="0">
-                      <a:solidFill>
-                        <a:srgbClr val="333333"/>
-                      </a:solidFill>
-                      <a:latin typeface="넥슨 풋볼고딕 B" panose="020B0803000000000000" pitchFamily="50" charset="-127"/>
-                      <a:ea typeface="넥슨 풋볼고딕 B" panose="020B0803000000000000" pitchFamily="50" charset="-127"/>
-                    </a:rPr>
-                    <a:t>0</a:t>
-                  </a:r>
-                  <a:endParaRPr lang="ko-KR" altLang="en-US" sz="2100" dirty="0">
-                    <a:solidFill>
-                      <a:srgbClr val="333333"/>
-                    </a:solidFill>
-                    <a:latin typeface="넥슨 풋볼고딕 B" panose="020B0803000000000000" pitchFamily="50" charset="-127"/>
-                    <a:ea typeface="넥슨 풋볼고딕 B" panose="020B0803000000000000" pitchFamily="50" charset="-127"/>
-                  </a:endParaRPr>
-                </a:p>
-              </p:txBody>
-            </p:sp>
-          </p:grpSp>
-        </p:grpSp>
-      </p:grpSp>
-      <p:sp>
-        <p:nvSpPr>
-          <p:cNvPr id="47" name="오른쪽 화살표 46"/>
-          <p:cNvSpPr/>
-          <p:nvPr/>
-        </p:nvSpPr>
-        <p:spPr>
-          <a:xfrm rot="16200000">
-            <a:off x="7831366" y="5084258"/>
-            <a:ext cx="745524" cy="642552"/>
-          </a:xfrm>
-          <a:prstGeom prst="rightArrow">
-            <a:avLst/>
-          </a:prstGeom>
-          <a:solidFill>
-            <a:srgbClr val="C00000"/>
-          </a:solidFill>
-          <a:ln w="38100">
-            <a:noFill/>
-          </a:ln>
-        </p:spPr>
-        <p:style>
-          <a:lnRef idx="2">
-            <a:schemeClr val="accent1">
-              <a:shade val="50000"/>
-            </a:schemeClr>
-          </a:lnRef>
-          <a:fillRef idx="1">
-            <a:schemeClr val="accent1"/>
-          </a:fillRef>
-          <a:effectRef idx="0">
-            <a:schemeClr val="accent1"/>
-          </a:effectRef>
-          <a:fontRef idx="minor">
-            <a:schemeClr val="lt1"/>
-          </a:fontRef>
-        </p:style>
-        <p:txBody>
-          <a:bodyPr rot="0" spcFirstLastPara="0" vertOverflow="overflow" horzOverflow="overflow" vert="horz" wrap="square" lIns="91440" tIns="45720" rIns="91440" bIns="45720" numCol="1" spcCol="0" rtlCol="0" fromWordArt="0" anchor="ctr" anchorCtr="0" forceAA="0" compatLnSpc="1">
-            <a:prstTxWarp prst="textNoShape">
-              <a:avLst/>
-            </a:prstTxWarp>
-            <a:noAutofit/>
-          </a:bodyPr>
-          <a:lstStyle/>
-          <a:p>
-            <a:pPr algn="ctr"/>
-            <a:endParaRPr lang="ko-KR" altLang="en-US"/>
-          </a:p>
-        </p:txBody>
-      </p:sp>
-    </p:spTree>
-    <p:extLst>
-      <p:ext uri="{BB962C8B-B14F-4D97-AF65-F5344CB8AC3E}">
-        <p14:creationId xmlns:p14="http://schemas.microsoft.com/office/powerpoint/2010/main" val="2938177821"/>
-      </p:ext>
-    </p:extLst>
-  </p:cSld>
-  <p:clrMapOvr>
-    <a:masterClrMapping/>
-  </p:clrMapOvr>
-  <p:timing>
-    <p:tnLst>
-      <p:par>
-        <p:cTn id="1" dur="indefinite" restart="never" nodeType="tmRoot"/>
-      </p:par>
-    </p:tnLst>
-  </p:timing>
-</p:sld>
-</file>
-
-<file path=ppt/slides/slide12.xml><?xml version="1.0" encoding="utf-8"?>
-<p:sld xmlns:a="http://schemas.openxmlformats.org/drawingml/2006/main" xmlns:r="http://schemas.openxmlformats.org/officeDocument/2006/relationships" xmlns:p="http://schemas.openxmlformats.org/presentationml/2006/main">
-  <p:cSld>
-    <p:spTree>
-      <p:nvGrpSpPr>
-        <p:cNvPr id="1" name=""/>
-        <p:cNvGrpSpPr/>
-        <p:nvPr/>
-      </p:nvGrpSpPr>
-      <p:grpSpPr>
-        <a:xfrm>
-          <a:off x="0" y="0"/>
-          <a:ext cx="0" cy="0"/>
-          <a:chOff x="0" y="0"/>
-          <a:chExt cx="0" cy="0"/>
-        </a:xfrm>
-      </p:grpSpPr>
-      <p:sp>
-        <p:nvSpPr>
-          <p:cNvPr id="2" name="TextBox 1"/>
-          <p:cNvSpPr txBox="1"/>
-          <p:nvPr/>
-        </p:nvSpPr>
-        <p:spPr>
-          <a:xfrm>
-            <a:off x="1035809" y="802864"/>
-            <a:ext cx="3421129" cy="5201424"/>
-          </a:xfrm>
-          <a:prstGeom prst="rect">
-            <a:avLst/>
-          </a:prstGeom>
-          <a:noFill/>
-        </p:spPr>
-        <p:txBody>
-          <a:bodyPr wrap="none" rtlCol="0">
-            <a:spAutoFit/>
-          </a:bodyPr>
-          <a:lstStyle/>
-          <a:p>
-            <a:r>
-              <a:rPr lang="en-US" altLang="ko-KR" sz="16600" dirty="0" smtClean="0">
-                <a:latin typeface="+mj-ea"/>
-                <a:ea typeface="+mj-ea"/>
-              </a:rPr>
-              <a:t>Size</a:t>
-            </a:r>
-            <a:endParaRPr lang="en-US" altLang="ko-KR" sz="16600" dirty="0" smtClean="0">
-              <a:latin typeface="+mj-ea"/>
-              <a:ea typeface="+mj-ea"/>
-            </a:endParaRPr>
-          </a:p>
-          <a:p>
-            <a:r>
-              <a:rPr lang="ko-KR" altLang="en-US" sz="16600" dirty="0" smtClean="0">
-                <a:latin typeface="+mj-ea"/>
-                <a:ea typeface="+mj-ea"/>
-              </a:rPr>
-              <a:t>크기</a:t>
-            </a:r>
-            <a:endParaRPr lang="ko-KR" altLang="en-US" sz="16600" dirty="0">
-              <a:latin typeface="+mj-ea"/>
-              <a:ea typeface="+mj-ea"/>
-            </a:endParaRPr>
-          </a:p>
-        </p:txBody>
-      </p:sp>
-      <p:pic>
-        <p:nvPicPr>
-          <p:cNvPr id="3" name="그림 2"/>
-          <p:cNvPicPr>
-            <a:picLocks noChangeAspect="1"/>
-          </p:cNvPicPr>
-          <p:nvPr/>
-        </p:nvPicPr>
-        <p:blipFill>
-          <a:blip r:embed="rId2" cstate="print">
-            <a:extLst>
-              <a:ext uri="{28A0092B-C50C-407E-A947-70E740481C1C}">
-                <a14:useLocalDpi xmlns:a14="http://schemas.microsoft.com/office/drawing/2010/main" val="0"/>
-              </a:ext>
-            </a:extLst>
-          </a:blip>
-          <a:stretch>
-            <a:fillRect/>
-          </a:stretch>
-        </p:blipFill>
-        <p:spPr>
-          <a:xfrm>
-            <a:off x="6583908" y="1400767"/>
-            <a:ext cx="4005618" cy="4005618"/>
-          </a:xfrm>
-          <a:prstGeom prst="rect">
-            <a:avLst/>
-          </a:prstGeom>
-        </p:spPr>
-      </p:pic>
-    </p:spTree>
-    <p:extLst>
-      <p:ext uri="{BB962C8B-B14F-4D97-AF65-F5344CB8AC3E}">
-        <p14:creationId xmlns:p14="http://schemas.microsoft.com/office/powerpoint/2010/main" val="2529119767"/>
-      </p:ext>
-    </p:extLst>
-  </p:cSld>
-  <p:clrMapOvr>
-    <a:masterClrMapping/>
-  </p:clrMapOvr>
-  <p:timing>
-    <p:tnLst>
-      <p:par>
-        <p:cTn id="1" dur="indefinite" restart="never" nodeType="tmRoot"/>
-      </p:par>
-    </p:tnLst>
-  </p:timing>
-</p:sld>
-</file>
-
-<file path=ppt/slides/slide13.xml><?xml version="1.0" encoding="utf-8"?>
-<p:sld xmlns:a="http://schemas.openxmlformats.org/drawingml/2006/main" xmlns:r="http://schemas.openxmlformats.org/officeDocument/2006/relationships" xmlns:p="http://schemas.openxmlformats.org/presentationml/2006/main">
-  <p:cSld>
-    <p:spTree>
-      <p:nvGrpSpPr>
-        <p:cNvPr id="1" name=""/>
-        <p:cNvGrpSpPr/>
-        <p:nvPr/>
-      </p:nvGrpSpPr>
-      <p:grpSpPr>
-        <a:xfrm>
-          <a:off x="0" y="0"/>
-          <a:ext cx="0" cy="0"/>
-          <a:chOff x="0" y="0"/>
-          <a:chExt cx="0" cy="0"/>
-        </a:xfrm>
-      </p:grpSpPr>
-      <p:grpSp>
-        <p:nvGrpSpPr>
-          <p:cNvPr id="25" name="그룹 24"/>
-          <p:cNvGrpSpPr/>
-          <p:nvPr/>
-        </p:nvGrpSpPr>
-        <p:grpSpPr>
-          <a:xfrm>
-            <a:off x="1781325" y="1314555"/>
-            <a:ext cx="8629350" cy="2976741"/>
-            <a:chOff x="2235905" y="1940630"/>
-            <a:chExt cx="8629350" cy="2976741"/>
-          </a:xfrm>
-        </p:grpSpPr>
-        <p:sp>
-          <p:nvSpPr>
-            <p:cNvPr id="2" name="직사각형 1"/>
-            <p:cNvSpPr/>
-            <p:nvPr/>
-          </p:nvSpPr>
-          <p:spPr>
-            <a:xfrm>
-              <a:off x="2235905" y="1940630"/>
-              <a:ext cx="8629350" cy="830997"/>
-            </a:xfrm>
-            <a:prstGeom prst="rect">
-              <a:avLst/>
-            </a:prstGeom>
-            <a:ln>
-              <a:noFill/>
-            </a:ln>
-          </p:spPr>
-          <p:txBody>
-            <a:bodyPr wrap="none">
-              <a:spAutoFit/>
-            </a:bodyPr>
-            <a:lstStyle/>
-            <a:p>
-              <a:r>
-                <a:rPr lang="en-US" altLang="ko-KR" sz="4800" dirty="0" smtClean="0"/>
-                <a:t>System.out.println(numbers1.length);</a:t>
-              </a:r>
-              <a:endParaRPr lang="ko-KR" altLang="en-US" sz="4800" dirty="0"/>
-            </a:p>
-          </p:txBody>
-        </p:sp>
-        <p:grpSp>
-          <p:nvGrpSpPr>
-            <p:cNvPr id="3" name="그룹 2"/>
-            <p:cNvGrpSpPr/>
-            <p:nvPr/>
-          </p:nvGrpSpPr>
-          <p:grpSpPr>
-            <a:xfrm>
-              <a:off x="3856237" y="3781999"/>
-              <a:ext cx="5388686" cy="1135372"/>
-              <a:chOff x="3035560" y="2640086"/>
-              <a:chExt cx="5388686" cy="1135372"/>
-            </a:xfrm>
-          </p:grpSpPr>
-          <p:grpSp>
-            <p:nvGrpSpPr>
-              <p:cNvPr id="4" name="그룹 3"/>
-              <p:cNvGrpSpPr/>
-              <p:nvPr/>
-            </p:nvGrpSpPr>
-            <p:grpSpPr>
-              <a:xfrm>
-                <a:off x="3035560" y="2640086"/>
-                <a:ext cx="1036289" cy="1095195"/>
-                <a:chOff x="1877654" y="1556951"/>
-                <a:chExt cx="873783" cy="839506"/>
-              </a:xfrm>
-            </p:grpSpPr>
-            <p:sp>
-              <p:nvSpPr>
-                <p:cNvPr id="20" name="모서리가 둥근 직사각형 19"/>
-                <p:cNvSpPr/>
-                <p:nvPr/>
-              </p:nvSpPr>
-              <p:spPr>
-                <a:xfrm flipH="1">
-                  <a:off x="1881293" y="1556951"/>
-                  <a:ext cx="870144" cy="839506"/>
-                </a:xfrm>
-                <a:prstGeom prst="roundRect">
-                  <a:avLst>
-                    <a:gd name="adj" fmla="val 10749"/>
-                  </a:avLst>
-                </a:prstGeom>
-                <a:noFill/>
-                <a:ln w="38100">
-                  <a:solidFill>
-                    <a:schemeClr val="tx1"/>
-                  </a:solidFill>
-                </a:ln>
-              </p:spPr>
-              <p:style>
-                <a:lnRef idx="2">
-                  <a:schemeClr val="accent1">
-                    <a:shade val="50000"/>
-                  </a:schemeClr>
-                </a:lnRef>
-                <a:fillRef idx="1">
-                  <a:schemeClr val="accent1"/>
-                </a:fillRef>
-                <a:effectRef idx="0">
-                  <a:schemeClr val="accent1"/>
-                </a:effectRef>
-                <a:fontRef idx="minor">
-                  <a:schemeClr val="lt1"/>
-                </a:fontRef>
-              </p:style>
-              <p:txBody>
-                <a:bodyPr rot="0" spcFirstLastPara="0" vertOverflow="overflow" horzOverflow="overflow" vert="horz" wrap="square" lIns="68579" tIns="34290" rIns="68579" bIns="34290" numCol="1" spcCol="0" rtlCol="0" fromWordArt="0" anchor="ctr" anchorCtr="0" forceAA="0" compatLnSpc="1">
-                  <a:prstTxWarp prst="textNoShape">
-                    <a:avLst/>
-                  </a:prstTxWarp>
-                  <a:noAutofit/>
-                </a:bodyPr>
-                <a:lstStyle/>
-                <a:p>
-                  <a:pPr algn="ctr"/>
-                  <a:endParaRPr lang="ko-KR" altLang="en-US" sz="1350" dirty="0">
-                    <a:ln w="38100">
-                      <a:solidFill>
-                        <a:srgbClr val="333333"/>
-                      </a:solidFill>
-                    </a:ln>
-                    <a:noFill/>
-                  </a:endParaRPr>
-                </a:p>
-              </p:txBody>
-            </p:sp>
-            <p:cxnSp>
-              <p:nvCxnSpPr>
-                <p:cNvPr id="21" name="직선 연결선 20"/>
-                <p:cNvCxnSpPr/>
-                <p:nvPr/>
-              </p:nvCxnSpPr>
-              <p:spPr>
-                <a:xfrm>
-                  <a:off x="1881293" y="2117124"/>
-                  <a:ext cx="870144" cy="0"/>
-                </a:xfrm>
-                <a:prstGeom prst="line">
-                  <a:avLst/>
-                </a:prstGeom>
-                <a:ln w="38100">
-                  <a:solidFill>
-                    <a:schemeClr val="tx1"/>
-                  </a:solidFill>
-                </a:ln>
-              </p:spPr>
-              <p:style>
-                <a:lnRef idx="1">
-                  <a:schemeClr val="accent1"/>
-                </a:lnRef>
-                <a:fillRef idx="0">
-                  <a:schemeClr val="accent1"/>
-                </a:fillRef>
-                <a:effectRef idx="0">
-                  <a:schemeClr val="accent1"/>
-                </a:effectRef>
-                <a:fontRef idx="minor">
-                  <a:schemeClr val="tx1"/>
-                </a:fontRef>
-              </p:style>
-            </p:cxnSp>
-            <p:sp>
-              <p:nvSpPr>
-                <p:cNvPr id="22" name="TextBox 21"/>
-                <p:cNvSpPr txBox="1"/>
-                <p:nvPr/>
-              </p:nvSpPr>
-              <p:spPr>
-                <a:xfrm>
-                  <a:off x="1877654" y="2120555"/>
-                  <a:ext cx="870143" cy="274074"/>
-                </a:xfrm>
-                <a:prstGeom prst="rect">
-                  <a:avLst/>
-                </a:prstGeom>
-                <a:noFill/>
-                <a:ln>
-                  <a:noFill/>
-                </a:ln>
-              </p:spPr>
-              <p:txBody>
-                <a:bodyPr wrap="square" rtlCol="0">
-                  <a:spAutoFit/>
-                </a:bodyPr>
-                <a:lstStyle/>
-                <a:p>
-                  <a:pPr algn="ctr"/>
-                  <a:r>
-                    <a:rPr lang="en-US" altLang="ko-KR" sz="2000" dirty="0">
-                      <a:solidFill>
-                        <a:srgbClr val="333333"/>
-                      </a:solidFill>
-                      <a:latin typeface="넥슨 풋볼고딕 B" panose="020B0803000000000000" pitchFamily="50" charset="-127"/>
-                      <a:ea typeface="넥슨 풋볼고딕 B" panose="020B0803000000000000" pitchFamily="50" charset="-127"/>
-                    </a:rPr>
-                    <a:t>0</a:t>
-                  </a:r>
-                  <a:endParaRPr lang="ko-KR" altLang="en-US" sz="2000" dirty="0">
-                    <a:solidFill>
-                      <a:srgbClr val="333333"/>
-                    </a:solidFill>
-                    <a:latin typeface="넥슨 풋볼고딕 B" panose="020B0803000000000000" pitchFamily="50" charset="-127"/>
-                    <a:ea typeface="넥슨 풋볼고딕 B" panose="020B0803000000000000" pitchFamily="50" charset="-127"/>
-                  </a:endParaRPr>
-                </a:p>
-              </p:txBody>
-            </p:sp>
-            <p:sp>
-              <p:nvSpPr>
-                <p:cNvPr id="23" name="TextBox 22"/>
-                <p:cNvSpPr txBox="1"/>
-                <p:nvPr/>
-              </p:nvSpPr>
-              <p:spPr>
-                <a:xfrm>
-                  <a:off x="1877654" y="1679374"/>
-                  <a:ext cx="870143" cy="318494"/>
-                </a:xfrm>
-                <a:prstGeom prst="rect">
-                  <a:avLst/>
-                </a:prstGeom>
-                <a:noFill/>
-                <a:ln>
-                  <a:noFill/>
-                </a:ln>
-              </p:spPr>
-              <p:txBody>
-                <a:bodyPr wrap="square" rtlCol="0" anchor="ctr">
-                  <a:spAutoFit/>
-                </a:bodyPr>
-                <a:lstStyle/>
-                <a:p>
-                  <a:pPr algn="ctr"/>
-                  <a:r>
-                    <a:rPr lang="en-US" altLang="ko-KR" sz="2100" dirty="0" smtClean="0">
-                      <a:solidFill>
-                        <a:srgbClr val="333333"/>
-                      </a:solidFill>
-                      <a:latin typeface="넥슨 풋볼고딕 B" panose="020B0803000000000000" pitchFamily="50" charset="-127"/>
-                      <a:ea typeface="넥슨 풋볼고딕 B" panose="020B0803000000000000" pitchFamily="50" charset="-127"/>
-                    </a:rPr>
-                    <a:t>10</a:t>
-                  </a:r>
-                  <a:endParaRPr lang="ko-KR" altLang="en-US" sz="2100" dirty="0">
-                    <a:solidFill>
-                      <a:srgbClr val="333333"/>
-                    </a:solidFill>
-                    <a:latin typeface="넥슨 풋볼고딕 B" panose="020B0803000000000000" pitchFamily="50" charset="-127"/>
-                    <a:ea typeface="넥슨 풋볼고딕 B" panose="020B0803000000000000" pitchFamily="50" charset="-127"/>
-                  </a:endParaRPr>
-                </a:p>
-              </p:txBody>
-            </p:sp>
-          </p:grpSp>
-          <p:grpSp>
-            <p:nvGrpSpPr>
-              <p:cNvPr id="5" name="그룹 4"/>
-              <p:cNvGrpSpPr/>
-              <p:nvPr/>
-            </p:nvGrpSpPr>
-            <p:grpSpPr>
-              <a:xfrm>
-                <a:off x="4487804" y="2640086"/>
-                <a:ext cx="1036289" cy="1095195"/>
-                <a:chOff x="1877654" y="1556951"/>
-                <a:chExt cx="873783" cy="839506"/>
-              </a:xfrm>
-            </p:grpSpPr>
-            <p:sp>
-              <p:nvSpPr>
-                <p:cNvPr id="16" name="모서리가 둥근 직사각형 15"/>
-                <p:cNvSpPr/>
-                <p:nvPr/>
-              </p:nvSpPr>
-              <p:spPr>
-                <a:xfrm flipH="1">
-                  <a:off x="1881293" y="1556951"/>
-                  <a:ext cx="870144" cy="839506"/>
-                </a:xfrm>
-                <a:prstGeom prst="roundRect">
-                  <a:avLst>
-                    <a:gd name="adj" fmla="val 10749"/>
-                  </a:avLst>
-                </a:prstGeom>
-                <a:noFill/>
-                <a:ln w="38100">
-                  <a:solidFill>
-                    <a:schemeClr val="tx1"/>
-                  </a:solidFill>
-                </a:ln>
-              </p:spPr>
-              <p:style>
-                <a:lnRef idx="2">
-                  <a:schemeClr val="accent1">
-                    <a:shade val="50000"/>
-                  </a:schemeClr>
-                </a:lnRef>
-                <a:fillRef idx="1">
-                  <a:schemeClr val="accent1"/>
-                </a:fillRef>
-                <a:effectRef idx="0">
-                  <a:schemeClr val="accent1"/>
-                </a:effectRef>
-                <a:fontRef idx="minor">
-                  <a:schemeClr val="lt1"/>
-                </a:fontRef>
-              </p:style>
-              <p:txBody>
-                <a:bodyPr rot="0" spcFirstLastPara="0" vertOverflow="overflow" horzOverflow="overflow" vert="horz" wrap="square" lIns="68579" tIns="34290" rIns="68579" bIns="34290" numCol="1" spcCol="0" rtlCol="0" fromWordArt="0" anchor="ctr" anchorCtr="0" forceAA="0" compatLnSpc="1">
-                  <a:prstTxWarp prst="textNoShape">
-                    <a:avLst/>
-                  </a:prstTxWarp>
-                  <a:noAutofit/>
-                </a:bodyPr>
-                <a:lstStyle/>
-                <a:p>
-                  <a:pPr algn="ctr"/>
-                  <a:endParaRPr lang="ko-KR" altLang="en-US" sz="1350" dirty="0">
-                    <a:ln w="38100">
-                      <a:solidFill>
-                        <a:srgbClr val="333333"/>
-                      </a:solidFill>
-                    </a:ln>
-                    <a:noFill/>
-                  </a:endParaRPr>
-                </a:p>
-              </p:txBody>
-            </p:sp>
-            <p:cxnSp>
-              <p:nvCxnSpPr>
-                <p:cNvPr id="17" name="직선 연결선 16"/>
-                <p:cNvCxnSpPr/>
-                <p:nvPr/>
-              </p:nvCxnSpPr>
-              <p:spPr>
-                <a:xfrm>
-                  <a:off x="1881293" y="2117124"/>
-                  <a:ext cx="870144" cy="0"/>
-                </a:xfrm>
-                <a:prstGeom prst="line">
-                  <a:avLst/>
-                </a:prstGeom>
-                <a:ln w="38100">
-                  <a:solidFill>
-                    <a:schemeClr val="tx1"/>
-                  </a:solidFill>
-                </a:ln>
-              </p:spPr>
-              <p:style>
-                <a:lnRef idx="1">
-                  <a:schemeClr val="accent1"/>
-                </a:lnRef>
-                <a:fillRef idx="0">
-                  <a:schemeClr val="accent1"/>
-                </a:fillRef>
-                <a:effectRef idx="0">
-                  <a:schemeClr val="accent1"/>
-                </a:effectRef>
-                <a:fontRef idx="minor">
-                  <a:schemeClr val="tx1"/>
-                </a:fontRef>
-              </p:style>
-            </p:cxnSp>
-            <p:sp>
-              <p:nvSpPr>
-                <p:cNvPr id="18" name="TextBox 17"/>
-                <p:cNvSpPr txBox="1"/>
-                <p:nvPr/>
-              </p:nvSpPr>
-              <p:spPr>
-                <a:xfrm>
-                  <a:off x="1877654" y="2120555"/>
-                  <a:ext cx="870143" cy="274074"/>
-                </a:xfrm>
-                <a:prstGeom prst="rect">
-                  <a:avLst/>
-                </a:prstGeom>
-                <a:noFill/>
-                <a:ln>
-                  <a:noFill/>
-                </a:ln>
-              </p:spPr>
-              <p:txBody>
-                <a:bodyPr wrap="square" rtlCol="0">
-                  <a:spAutoFit/>
-                </a:bodyPr>
-                <a:lstStyle/>
-                <a:p>
-                  <a:pPr algn="ctr"/>
-                  <a:r>
-                    <a:rPr lang="en-US" altLang="ko-KR" sz="2000" dirty="0">
-                      <a:solidFill>
-                        <a:srgbClr val="333333"/>
-                      </a:solidFill>
-                      <a:latin typeface="넥슨 풋볼고딕 B" panose="020B0803000000000000" pitchFamily="50" charset="-127"/>
-                      <a:ea typeface="넥슨 풋볼고딕 B" panose="020B0803000000000000" pitchFamily="50" charset="-127"/>
-                    </a:rPr>
-                    <a:t>1</a:t>
-                  </a:r>
-                  <a:endParaRPr lang="ko-KR" altLang="en-US" sz="2000" dirty="0">
-                    <a:solidFill>
-                      <a:srgbClr val="333333"/>
-                    </a:solidFill>
-                    <a:latin typeface="넥슨 풋볼고딕 B" panose="020B0803000000000000" pitchFamily="50" charset="-127"/>
-                    <a:ea typeface="넥슨 풋볼고딕 B" panose="020B0803000000000000" pitchFamily="50" charset="-127"/>
-                  </a:endParaRPr>
-                </a:p>
-              </p:txBody>
-            </p:sp>
-            <p:sp>
-              <p:nvSpPr>
-                <p:cNvPr id="19" name="TextBox 18"/>
-                <p:cNvSpPr txBox="1"/>
-                <p:nvPr/>
-              </p:nvSpPr>
-              <p:spPr>
-                <a:xfrm>
-                  <a:off x="1877654" y="1679374"/>
-                  <a:ext cx="870143" cy="318494"/>
-                </a:xfrm>
-                <a:prstGeom prst="rect">
-                  <a:avLst/>
-                </a:prstGeom>
-                <a:noFill/>
-                <a:ln>
-                  <a:noFill/>
-                </a:ln>
-              </p:spPr>
-              <p:txBody>
-                <a:bodyPr wrap="square" rtlCol="0" anchor="ctr">
-                  <a:spAutoFit/>
-                </a:bodyPr>
-                <a:lstStyle/>
-                <a:p>
-                  <a:pPr algn="ctr"/>
-                  <a:r>
-                    <a:rPr lang="en-US" altLang="ko-KR" sz="2100" dirty="0" smtClean="0">
-                      <a:solidFill>
-                        <a:srgbClr val="333333"/>
-                      </a:solidFill>
-                      <a:latin typeface="넥슨 풋볼고딕 B" panose="020B0803000000000000" pitchFamily="50" charset="-127"/>
-                      <a:ea typeface="넥슨 풋볼고딕 B" panose="020B0803000000000000" pitchFamily="50" charset="-127"/>
-                    </a:rPr>
-                    <a:t>20</a:t>
-                  </a:r>
-                  <a:endParaRPr lang="ko-KR" altLang="en-US" sz="2100" dirty="0">
-                    <a:solidFill>
-                      <a:srgbClr val="333333"/>
-                    </a:solidFill>
-                    <a:latin typeface="넥슨 풋볼고딕 B" panose="020B0803000000000000" pitchFamily="50" charset="-127"/>
-                    <a:ea typeface="넥슨 풋볼고딕 B" panose="020B0803000000000000" pitchFamily="50" charset="-127"/>
-                  </a:endParaRPr>
-                </a:p>
-              </p:txBody>
-            </p:sp>
-          </p:grpSp>
-          <p:grpSp>
-            <p:nvGrpSpPr>
-              <p:cNvPr id="6" name="그룹 5"/>
-              <p:cNvGrpSpPr/>
-              <p:nvPr/>
-            </p:nvGrpSpPr>
-            <p:grpSpPr>
-              <a:xfrm>
-                <a:off x="5940047" y="2640086"/>
-                <a:ext cx="1036289" cy="1095195"/>
-                <a:chOff x="1877654" y="1556951"/>
-                <a:chExt cx="873783" cy="839506"/>
-              </a:xfrm>
-            </p:grpSpPr>
-            <p:sp>
-              <p:nvSpPr>
-                <p:cNvPr id="12" name="모서리가 둥근 직사각형 11"/>
-                <p:cNvSpPr/>
-                <p:nvPr/>
-              </p:nvSpPr>
-              <p:spPr>
-                <a:xfrm flipH="1">
-                  <a:off x="1881293" y="1556951"/>
-                  <a:ext cx="870144" cy="839506"/>
-                </a:xfrm>
-                <a:prstGeom prst="roundRect">
-                  <a:avLst>
-                    <a:gd name="adj" fmla="val 10749"/>
-                  </a:avLst>
-                </a:prstGeom>
-                <a:noFill/>
-                <a:ln w="38100">
-                  <a:solidFill>
-                    <a:schemeClr val="tx1"/>
-                  </a:solidFill>
-                </a:ln>
-              </p:spPr>
-              <p:style>
-                <a:lnRef idx="2">
-                  <a:schemeClr val="accent1">
-                    <a:shade val="50000"/>
-                  </a:schemeClr>
-                </a:lnRef>
-                <a:fillRef idx="1">
-                  <a:schemeClr val="accent1"/>
-                </a:fillRef>
-                <a:effectRef idx="0">
-                  <a:schemeClr val="accent1"/>
-                </a:effectRef>
-                <a:fontRef idx="minor">
-                  <a:schemeClr val="lt1"/>
-                </a:fontRef>
-              </p:style>
-              <p:txBody>
-                <a:bodyPr rot="0" spcFirstLastPara="0" vertOverflow="overflow" horzOverflow="overflow" vert="horz" wrap="square" lIns="68579" tIns="34290" rIns="68579" bIns="34290" numCol="1" spcCol="0" rtlCol="0" fromWordArt="0" anchor="ctr" anchorCtr="0" forceAA="0" compatLnSpc="1">
-                  <a:prstTxWarp prst="textNoShape">
-                    <a:avLst/>
-                  </a:prstTxWarp>
-                  <a:noAutofit/>
-                </a:bodyPr>
-                <a:lstStyle/>
-                <a:p>
-                  <a:pPr algn="ctr"/>
-                  <a:endParaRPr lang="ko-KR" altLang="en-US" sz="1350" dirty="0">
-                    <a:ln w="38100">
-                      <a:solidFill>
-                        <a:srgbClr val="333333"/>
-                      </a:solidFill>
-                    </a:ln>
-                    <a:noFill/>
-                  </a:endParaRPr>
-                </a:p>
-              </p:txBody>
-            </p:sp>
-            <p:cxnSp>
-              <p:nvCxnSpPr>
-                <p:cNvPr id="13" name="직선 연결선 12"/>
-                <p:cNvCxnSpPr/>
-                <p:nvPr/>
-              </p:nvCxnSpPr>
-              <p:spPr>
-                <a:xfrm>
-                  <a:off x="1881293" y="2117124"/>
-                  <a:ext cx="870144" cy="0"/>
-                </a:xfrm>
-                <a:prstGeom prst="line">
-                  <a:avLst/>
-                </a:prstGeom>
-                <a:ln w="38100">
-                  <a:solidFill>
-                    <a:schemeClr val="tx1"/>
-                  </a:solidFill>
-                </a:ln>
-              </p:spPr>
-              <p:style>
-                <a:lnRef idx="1">
-                  <a:schemeClr val="accent1"/>
-                </a:lnRef>
-                <a:fillRef idx="0">
-                  <a:schemeClr val="accent1"/>
-                </a:fillRef>
-                <a:effectRef idx="0">
-                  <a:schemeClr val="accent1"/>
-                </a:effectRef>
-                <a:fontRef idx="minor">
-                  <a:schemeClr val="tx1"/>
-                </a:fontRef>
-              </p:style>
-            </p:cxnSp>
-            <p:sp>
-              <p:nvSpPr>
-                <p:cNvPr id="14" name="TextBox 13"/>
-                <p:cNvSpPr txBox="1"/>
-                <p:nvPr/>
-              </p:nvSpPr>
-              <p:spPr>
-                <a:xfrm>
-                  <a:off x="1877654" y="2120555"/>
-                  <a:ext cx="870143" cy="274074"/>
-                </a:xfrm>
-                <a:prstGeom prst="rect">
-                  <a:avLst/>
-                </a:prstGeom>
-                <a:noFill/>
-                <a:ln>
-                  <a:noFill/>
-                </a:ln>
-              </p:spPr>
-              <p:txBody>
-                <a:bodyPr wrap="square" rtlCol="0">
-                  <a:spAutoFit/>
-                </a:bodyPr>
-                <a:lstStyle/>
-                <a:p>
-                  <a:pPr algn="ctr"/>
-                  <a:r>
-                    <a:rPr lang="en-US" altLang="ko-KR" sz="2000" dirty="0">
-                      <a:solidFill>
-                        <a:srgbClr val="333333"/>
-                      </a:solidFill>
-                      <a:latin typeface="넥슨 풋볼고딕 B" panose="020B0803000000000000" pitchFamily="50" charset="-127"/>
-                      <a:ea typeface="넥슨 풋볼고딕 B" panose="020B0803000000000000" pitchFamily="50" charset="-127"/>
-                    </a:rPr>
-                    <a:t>2</a:t>
-                  </a:r>
-                  <a:endParaRPr lang="ko-KR" altLang="en-US" sz="2000" dirty="0">
-                    <a:solidFill>
-                      <a:srgbClr val="333333"/>
-                    </a:solidFill>
-                    <a:latin typeface="넥슨 풋볼고딕 B" panose="020B0803000000000000" pitchFamily="50" charset="-127"/>
-                    <a:ea typeface="넥슨 풋볼고딕 B" panose="020B0803000000000000" pitchFamily="50" charset="-127"/>
-                  </a:endParaRPr>
-                </a:p>
-              </p:txBody>
-            </p:sp>
-            <p:sp>
-              <p:nvSpPr>
-                <p:cNvPr id="15" name="TextBox 14"/>
-                <p:cNvSpPr txBox="1"/>
-                <p:nvPr/>
-              </p:nvSpPr>
-              <p:spPr>
-                <a:xfrm>
-                  <a:off x="1877654" y="1679374"/>
-                  <a:ext cx="870143" cy="318494"/>
-                </a:xfrm>
-                <a:prstGeom prst="rect">
-                  <a:avLst/>
-                </a:prstGeom>
-                <a:noFill/>
-                <a:ln>
-                  <a:noFill/>
-                </a:ln>
-              </p:spPr>
-              <p:txBody>
-                <a:bodyPr wrap="square" rtlCol="0" anchor="ctr">
-                  <a:spAutoFit/>
-                </a:bodyPr>
-                <a:lstStyle/>
-                <a:p>
-                  <a:pPr algn="ctr"/>
-                  <a:r>
-                    <a:rPr lang="en-US" altLang="ko-KR" sz="2100" dirty="0" smtClean="0">
-                      <a:solidFill>
-                        <a:srgbClr val="333333"/>
-                      </a:solidFill>
-                      <a:latin typeface="넥슨 풋볼고딕 B" panose="020B0803000000000000" pitchFamily="50" charset="-127"/>
-                      <a:ea typeface="넥슨 풋볼고딕 B" panose="020B0803000000000000" pitchFamily="50" charset="-127"/>
-                    </a:rPr>
-                    <a:t>30</a:t>
-                  </a:r>
-                  <a:endParaRPr lang="ko-KR" altLang="en-US" sz="2100" dirty="0">
-                    <a:solidFill>
-                      <a:srgbClr val="333333"/>
-                    </a:solidFill>
-                    <a:latin typeface="넥슨 풋볼고딕 B" panose="020B0803000000000000" pitchFamily="50" charset="-127"/>
-                    <a:ea typeface="넥슨 풋볼고딕 B" panose="020B0803000000000000" pitchFamily="50" charset="-127"/>
-                  </a:endParaRPr>
-                </a:p>
-              </p:txBody>
-            </p:sp>
-          </p:grpSp>
-          <p:grpSp>
-            <p:nvGrpSpPr>
-              <p:cNvPr id="7" name="그룹 6"/>
-              <p:cNvGrpSpPr/>
-              <p:nvPr/>
-            </p:nvGrpSpPr>
-            <p:grpSpPr>
-              <a:xfrm>
-                <a:off x="7387946" y="2640086"/>
-                <a:ext cx="1036300" cy="1135372"/>
-                <a:chOff x="649468" y="1556951"/>
-                <a:chExt cx="873788" cy="870303"/>
-              </a:xfrm>
-            </p:grpSpPr>
-            <p:sp>
-              <p:nvSpPr>
-                <p:cNvPr id="8" name="모서리가 둥근 직사각형 7"/>
-                <p:cNvSpPr/>
-                <p:nvPr/>
-              </p:nvSpPr>
-              <p:spPr>
-                <a:xfrm flipH="1">
-                  <a:off x="653111" y="1556951"/>
-                  <a:ext cx="870145" cy="839506"/>
-                </a:xfrm>
-                <a:prstGeom prst="roundRect">
-                  <a:avLst>
-                    <a:gd name="adj" fmla="val 10749"/>
-                  </a:avLst>
-                </a:prstGeom>
-                <a:noFill/>
-                <a:ln w="38100">
-                  <a:solidFill>
-                    <a:schemeClr val="tx1"/>
-                  </a:solidFill>
-                </a:ln>
-              </p:spPr>
-              <p:style>
-                <a:lnRef idx="2">
-                  <a:schemeClr val="accent1">
-                    <a:shade val="50000"/>
-                  </a:schemeClr>
-                </a:lnRef>
-                <a:fillRef idx="1">
-                  <a:schemeClr val="accent1"/>
-                </a:fillRef>
-                <a:effectRef idx="0">
-                  <a:schemeClr val="accent1"/>
-                </a:effectRef>
-                <a:fontRef idx="minor">
-                  <a:schemeClr val="lt1"/>
-                </a:fontRef>
-              </p:style>
-              <p:txBody>
-                <a:bodyPr rot="0" spcFirstLastPara="0" vertOverflow="overflow" horzOverflow="overflow" vert="horz" wrap="square" lIns="68579" tIns="34290" rIns="68579" bIns="34290" numCol="1" spcCol="0" rtlCol="0" fromWordArt="0" anchor="ctr" anchorCtr="0" forceAA="0" compatLnSpc="1">
-                  <a:prstTxWarp prst="textNoShape">
-                    <a:avLst/>
-                  </a:prstTxWarp>
-                  <a:noAutofit/>
-                </a:bodyPr>
-                <a:lstStyle/>
-                <a:p>
-                  <a:pPr algn="ctr"/>
-                  <a:endParaRPr lang="ko-KR" altLang="en-US" sz="1350" dirty="0">
-                    <a:ln w="38100">
-                      <a:solidFill>
-                        <a:srgbClr val="333333"/>
-                      </a:solidFill>
-                    </a:ln>
-                    <a:noFill/>
-                  </a:endParaRPr>
-                </a:p>
-              </p:txBody>
-            </p:sp>
-            <p:cxnSp>
-              <p:nvCxnSpPr>
-                <p:cNvPr id="9" name="직선 연결선 8"/>
-                <p:cNvCxnSpPr/>
-                <p:nvPr/>
-              </p:nvCxnSpPr>
-              <p:spPr>
-                <a:xfrm>
-                  <a:off x="653111" y="2117124"/>
-                  <a:ext cx="870143" cy="0"/>
-                </a:xfrm>
-                <a:prstGeom prst="line">
-                  <a:avLst/>
-                </a:prstGeom>
-                <a:ln w="38100">
-                  <a:solidFill>
-                    <a:schemeClr val="tx1"/>
-                  </a:solidFill>
-                </a:ln>
-              </p:spPr>
-              <p:style>
-                <a:lnRef idx="1">
-                  <a:schemeClr val="accent1"/>
-                </a:lnRef>
-                <a:fillRef idx="0">
-                  <a:schemeClr val="accent1"/>
-                </a:fillRef>
-                <a:effectRef idx="0">
-                  <a:schemeClr val="accent1"/>
-                </a:effectRef>
-                <a:fontRef idx="minor">
-                  <a:schemeClr val="tx1"/>
-                </a:fontRef>
-              </p:style>
-            </p:cxnSp>
-            <p:sp>
-              <p:nvSpPr>
-                <p:cNvPr id="10" name="TextBox 9"/>
-                <p:cNvSpPr txBox="1"/>
-                <p:nvPr/>
-              </p:nvSpPr>
-              <p:spPr>
-                <a:xfrm>
-                  <a:off x="649471" y="2120555"/>
-                  <a:ext cx="870142" cy="306699"/>
-                </a:xfrm>
-                <a:prstGeom prst="rect">
-                  <a:avLst/>
-                </a:prstGeom>
-                <a:noFill/>
-                <a:ln>
-                  <a:noFill/>
-                </a:ln>
-              </p:spPr>
-              <p:txBody>
-                <a:bodyPr wrap="square" rtlCol="0">
-                  <a:spAutoFit/>
-                </a:bodyPr>
-                <a:lstStyle/>
-                <a:p>
-                  <a:pPr algn="ctr"/>
-                  <a:r>
-                    <a:rPr lang="en-US" altLang="ko-KR" sz="2000" dirty="0" smtClean="0">
-                      <a:solidFill>
-                        <a:srgbClr val="333333"/>
-                      </a:solidFill>
-                      <a:latin typeface="넥슨 풋볼고딕 B" panose="020B0803000000000000" pitchFamily="50" charset="-127"/>
-                      <a:ea typeface="넥슨 풋볼고딕 B" panose="020B0803000000000000" pitchFamily="50" charset="-127"/>
-                    </a:rPr>
-                    <a:t>3</a:t>
-                  </a:r>
-                  <a:endParaRPr lang="ko-KR" altLang="en-US" sz="2000" dirty="0">
-                    <a:solidFill>
-                      <a:srgbClr val="333333"/>
-                    </a:solidFill>
                     <a:latin typeface="넥슨 풋볼고딕 B" panose="020B0803000000000000" pitchFamily="50" charset="-127"/>
                     <a:ea typeface="넥슨 풋볼고딕 B" panose="020B0803000000000000" pitchFamily="50" charset="-127"/>
                   </a:endParaRPr>
@@ -6730,18 +6652,12 @@
                   <a:pPr algn="ctr"/>
                   <a:r>
                     <a:rPr lang="en-US" altLang="ko-KR" sz="2100" dirty="0" smtClean="0">
-                      <a:solidFill>
-                        <a:srgbClr val="333333"/>
-                      </a:solidFill>
                       <a:latin typeface="넥슨 풋볼고딕 B" panose="020B0803000000000000" pitchFamily="50" charset="-127"/>
                       <a:ea typeface="넥슨 풋볼고딕 B" panose="020B0803000000000000" pitchFamily="50" charset="-127"/>
                     </a:rPr>
                     <a:t>0</a:t>
                   </a:r>
                   <a:endParaRPr lang="ko-KR" altLang="en-US" sz="2100" dirty="0">
-                    <a:solidFill>
-                      <a:srgbClr val="333333"/>
-                    </a:solidFill>
                     <a:latin typeface="넥슨 풋볼고딕 B" panose="020B0803000000000000" pitchFamily="50" charset="-127"/>
                     <a:ea typeface="넥슨 풋볼고딕 B" panose="020B0803000000000000" pitchFamily="50" charset="-127"/>
                   </a:endParaRPr>
@@ -7147,6 +7063,13 @@
   <p:clrMapOvr>
     <a:masterClrMapping/>
   </p:clrMapOvr>
+  <p:timing>
+    <p:tnLst>
+      <p:par>
+        <p:cTn id="1" dur="indefinite" restart="never" nodeType="tmRoot"/>
+      </p:par>
+    </p:tnLst>
+  </p:timing>
 </p:sld>
 </file>
 
@@ -7254,6 +7177,206 @@
   <p:clrMapOvr>
     <a:masterClrMapping/>
   </p:clrMapOvr>
+  <p:timing>
+    <p:tnLst>
+      <p:par>
+        <p:cTn id="1" dur="indefinite" restart="never" nodeType="tmRoot"/>
+      </p:par>
+    </p:tnLst>
+  </p:timing>
+</p:sld>
+</file>
+
+<file path=ppt/slides/slide17.xml><?xml version="1.0" encoding="utf-8"?>
+<p:sld xmlns:a="http://schemas.openxmlformats.org/drawingml/2006/main" xmlns:r="http://schemas.openxmlformats.org/officeDocument/2006/relationships" xmlns:p="http://schemas.openxmlformats.org/presentationml/2006/main">
+  <p:cSld>
+    <p:spTree>
+      <p:nvGrpSpPr>
+        <p:cNvPr id="1" name=""/>
+        <p:cNvGrpSpPr/>
+        <p:nvPr/>
+      </p:nvGrpSpPr>
+      <p:grpSpPr>
+        <a:xfrm>
+          <a:off x="0" y="0"/>
+          <a:ext cx="0" cy="0"/>
+          <a:chOff x="0" y="0"/>
+          <a:chExt cx="0" cy="0"/>
+        </a:xfrm>
+      </p:grpSpPr>
+      <p:sp>
+        <p:nvSpPr>
+          <p:cNvPr id="2" name="제목 1"/>
+          <p:cNvSpPr>
+            <a:spLocks noGrp="1"/>
+          </p:cNvSpPr>
+          <p:nvPr>
+            <p:ph type="title"/>
+          </p:nvPr>
+        </p:nvSpPr>
+        <p:spPr/>
+        <p:txBody>
+          <a:bodyPr/>
+          <a:lstStyle/>
+          <a:p>
+            <a:r>
+              <a:rPr lang="ko-KR" altLang="en-US" dirty="0" smtClean="0"/>
+              <a:t>배열의 단점</a:t>
+            </a:r>
+            <a:endParaRPr lang="ko-KR" altLang="en-US" dirty="0"/>
+          </a:p>
+        </p:txBody>
+      </p:sp>
+    </p:spTree>
+    <p:extLst>
+      <p:ext uri="{BB962C8B-B14F-4D97-AF65-F5344CB8AC3E}">
+        <p14:creationId xmlns:p14="http://schemas.microsoft.com/office/powerpoint/2010/main" val="4191929915"/>
+      </p:ext>
+    </p:extLst>
+  </p:cSld>
+  <p:clrMapOvr>
+    <a:masterClrMapping/>
+  </p:clrMapOvr>
+  <p:timing>
+    <p:tnLst>
+      <p:par>
+        <p:cTn id="1" dur="indefinite" restart="never" nodeType="tmRoot"/>
+      </p:par>
+    </p:tnLst>
+  </p:timing>
+</p:sld>
+</file>
+
+<file path=ppt/slides/slide18.xml><?xml version="1.0" encoding="utf-8"?>
+<p:sld xmlns:a="http://schemas.openxmlformats.org/drawingml/2006/main" xmlns:r="http://schemas.openxmlformats.org/officeDocument/2006/relationships" xmlns:p="http://schemas.openxmlformats.org/presentationml/2006/main">
+  <p:cSld>
+    <p:spTree>
+      <p:nvGrpSpPr>
+        <p:cNvPr id="1" name=""/>
+        <p:cNvGrpSpPr/>
+        <p:nvPr/>
+      </p:nvGrpSpPr>
+      <p:grpSpPr>
+        <a:xfrm>
+          <a:off x="0" y="0"/>
+          <a:ext cx="0" cy="0"/>
+          <a:chOff x="0" y="0"/>
+          <a:chExt cx="0" cy="0"/>
+        </a:xfrm>
+      </p:grpSpPr>
+      <p:sp>
+        <p:nvSpPr>
+          <p:cNvPr id="2" name="제목 1"/>
+          <p:cNvSpPr>
+            <a:spLocks noGrp="1"/>
+          </p:cNvSpPr>
+          <p:nvPr>
+            <p:ph type="title"/>
+          </p:nvPr>
+        </p:nvSpPr>
+        <p:spPr/>
+        <p:txBody>
+          <a:bodyPr>
+            <a:normAutofit fontScale="90000"/>
+          </a:bodyPr>
+          <a:lstStyle/>
+          <a:p>
+            <a:r>
+              <a:rPr lang="ko-KR" altLang="en-US" dirty="0" smtClean="0"/>
+              <a:t>크기가 정해져 있다</a:t>
+            </a:r>
+            <a:r>
+              <a:rPr lang="en-US" altLang="ko-KR" dirty="0" smtClean="0"/>
+              <a:t/>
+            </a:r>
+            <a:br>
+              <a:rPr lang="en-US" altLang="ko-KR" dirty="0" smtClean="0"/>
+            </a:br>
+            <a:r>
+              <a:rPr lang="ko-KR" altLang="en-US" dirty="0" smtClean="0"/>
+              <a:t>기능이 없다</a:t>
+            </a:r>
+            <a:endParaRPr lang="ko-KR" altLang="en-US" dirty="0"/>
+          </a:p>
+        </p:txBody>
+      </p:sp>
+    </p:spTree>
+    <p:extLst>
+      <p:ext uri="{BB962C8B-B14F-4D97-AF65-F5344CB8AC3E}">
+        <p14:creationId xmlns:p14="http://schemas.microsoft.com/office/powerpoint/2010/main" val="976637590"/>
+      </p:ext>
+    </p:extLst>
+  </p:cSld>
+  <p:clrMapOvr>
+    <a:masterClrMapping/>
+  </p:clrMapOvr>
+  <p:timing>
+    <p:tnLst>
+      <p:par>
+        <p:cTn id="1" dur="indefinite" restart="never" nodeType="tmRoot"/>
+      </p:par>
+    </p:tnLst>
+  </p:timing>
+</p:sld>
+</file>
+
+<file path=ppt/slides/slide19.xml><?xml version="1.0" encoding="utf-8"?>
+<p:sld xmlns:a="http://schemas.openxmlformats.org/drawingml/2006/main" xmlns:r="http://schemas.openxmlformats.org/officeDocument/2006/relationships" xmlns:p="http://schemas.openxmlformats.org/presentationml/2006/main">
+  <p:cSld>
+    <p:spTree>
+      <p:nvGrpSpPr>
+        <p:cNvPr id="1" name=""/>
+        <p:cNvGrpSpPr/>
+        <p:nvPr/>
+      </p:nvGrpSpPr>
+      <p:grpSpPr>
+        <a:xfrm>
+          <a:off x="0" y="0"/>
+          <a:ext cx="0" cy="0"/>
+          <a:chOff x="0" y="0"/>
+          <a:chExt cx="0" cy="0"/>
+        </a:xfrm>
+      </p:grpSpPr>
+      <p:sp>
+        <p:nvSpPr>
+          <p:cNvPr id="2" name="제목 1"/>
+          <p:cNvSpPr>
+            <a:spLocks noGrp="1"/>
+          </p:cNvSpPr>
+          <p:nvPr>
+            <p:ph type="title"/>
+          </p:nvPr>
+        </p:nvSpPr>
+        <p:spPr/>
+        <p:txBody>
+          <a:bodyPr/>
+          <a:lstStyle/>
+          <a:p>
+            <a:r>
+              <a:rPr lang="ko-KR" altLang="en-US" dirty="0" smtClean="0"/>
+              <a:t>배열의 장점</a:t>
+            </a:r>
+            <a:endParaRPr lang="ko-KR" altLang="en-US" dirty="0"/>
+          </a:p>
+        </p:txBody>
+      </p:sp>
+    </p:spTree>
+    <p:extLst>
+      <p:ext uri="{BB962C8B-B14F-4D97-AF65-F5344CB8AC3E}">
+        <p14:creationId xmlns:p14="http://schemas.microsoft.com/office/powerpoint/2010/main" val="1781701721"/>
+      </p:ext>
+    </p:extLst>
+  </p:cSld>
+  <p:clrMapOvr>
+    <a:masterClrMapping/>
+  </p:clrMapOvr>
+  <p:timing>
+    <p:tnLst>
+      <p:par>
+        <p:cTn id="1" dur="indefinite" restart="never" nodeType="tmRoot"/>
+      </p:par>
+    </p:tnLst>
+  </p:timing>
 </p:sld>
 </file>
 
@@ -7357,6 +7480,212 @@
     <p:extLst>
       <p:ext uri="{BB962C8B-B14F-4D97-AF65-F5344CB8AC3E}">
         <p14:creationId xmlns:p14="http://schemas.microsoft.com/office/powerpoint/2010/main" val="652863278"/>
+      </p:ext>
+    </p:extLst>
+  </p:cSld>
+  <p:clrMapOvr>
+    <a:masterClrMapping/>
+  </p:clrMapOvr>
+  <p:timing>
+    <p:tnLst>
+      <p:par>
+        <p:cTn id="1" dur="indefinite" restart="never" nodeType="tmRoot"/>
+      </p:par>
+    </p:tnLst>
+  </p:timing>
+</p:sld>
+</file>
+
+<file path=ppt/slides/slide20.xml><?xml version="1.0" encoding="utf-8"?>
+<p:sld xmlns:a="http://schemas.openxmlformats.org/drawingml/2006/main" xmlns:r="http://schemas.openxmlformats.org/officeDocument/2006/relationships" xmlns:p="http://schemas.openxmlformats.org/presentationml/2006/main">
+  <p:cSld>
+    <p:spTree>
+      <p:nvGrpSpPr>
+        <p:cNvPr id="1" name=""/>
+        <p:cNvGrpSpPr/>
+        <p:nvPr/>
+      </p:nvGrpSpPr>
+      <p:grpSpPr>
+        <a:xfrm>
+          <a:off x="0" y="0"/>
+          <a:ext cx="0" cy="0"/>
+          <a:chOff x="0" y="0"/>
+          <a:chExt cx="0" cy="0"/>
+        </a:xfrm>
+      </p:grpSpPr>
+      <p:sp>
+        <p:nvSpPr>
+          <p:cNvPr id="2" name="제목 1"/>
+          <p:cNvSpPr>
+            <a:spLocks noGrp="1"/>
+          </p:cNvSpPr>
+          <p:nvPr>
+            <p:ph type="title"/>
+          </p:nvPr>
+        </p:nvSpPr>
+        <p:spPr/>
+        <p:txBody>
+          <a:bodyPr>
+            <a:normAutofit fontScale="90000"/>
+          </a:bodyPr>
+          <a:lstStyle/>
+          <a:p>
+            <a:r>
+              <a:rPr lang="ko-KR" altLang="en-US" dirty="0" smtClean="0"/>
+              <a:t>크기가 정해져 있다</a:t>
+            </a:r>
+            <a:r>
+              <a:rPr lang="en-US" altLang="ko-KR" dirty="0" smtClean="0"/>
+              <a:t/>
+            </a:r>
+            <a:br>
+              <a:rPr lang="en-US" altLang="ko-KR" dirty="0" smtClean="0"/>
+            </a:br>
+            <a:r>
+              <a:rPr lang="ko-KR" altLang="en-US" dirty="0" smtClean="0"/>
+              <a:t>기능이 없다</a:t>
+            </a:r>
+            <a:endParaRPr lang="ko-KR" altLang="en-US" dirty="0"/>
+          </a:p>
+        </p:txBody>
+      </p:sp>
+    </p:spTree>
+    <p:extLst>
+      <p:ext uri="{BB962C8B-B14F-4D97-AF65-F5344CB8AC3E}">
+        <p14:creationId xmlns:p14="http://schemas.microsoft.com/office/powerpoint/2010/main" val="3082117162"/>
+      </p:ext>
+    </p:extLst>
+  </p:cSld>
+  <p:clrMapOvr>
+    <a:masterClrMapping/>
+  </p:clrMapOvr>
+  <p:timing>
+    <p:tnLst>
+      <p:par>
+        <p:cTn id="1" dur="indefinite" restart="never" nodeType="tmRoot"/>
+      </p:par>
+    </p:tnLst>
+  </p:timing>
+</p:sld>
+</file>
+
+<file path=ppt/slides/slide21.xml><?xml version="1.0" encoding="utf-8"?>
+<p:sld xmlns:a="http://schemas.openxmlformats.org/drawingml/2006/main" xmlns:r="http://schemas.openxmlformats.org/officeDocument/2006/relationships" xmlns:p="http://schemas.openxmlformats.org/presentationml/2006/main">
+  <p:cSld>
+    <p:spTree>
+      <p:nvGrpSpPr>
+        <p:cNvPr id="1" name=""/>
+        <p:cNvGrpSpPr/>
+        <p:nvPr/>
+      </p:nvGrpSpPr>
+      <p:grpSpPr>
+        <a:xfrm>
+          <a:off x="0" y="0"/>
+          <a:ext cx="0" cy="0"/>
+          <a:chOff x="0" y="0"/>
+          <a:chExt cx="0" cy="0"/>
+        </a:xfrm>
+      </p:grpSpPr>
+      <p:sp>
+        <p:nvSpPr>
+          <p:cNvPr id="2" name="제목 1"/>
+          <p:cNvSpPr>
+            <a:spLocks noGrp="1"/>
+          </p:cNvSpPr>
+          <p:nvPr>
+            <p:ph type="title"/>
+          </p:nvPr>
+        </p:nvSpPr>
+        <p:spPr/>
+        <p:txBody>
+          <a:bodyPr/>
+          <a:lstStyle/>
+          <a:p>
+            <a:r>
+              <a:rPr lang="ko-KR" altLang="en-US" dirty="0" smtClean="0"/>
+              <a:t>좋은 부품의 조건</a:t>
+            </a:r>
+            <a:endParaRPr lang="ko-KR" altLang="en-US" dirty="0"/>
+          </a:p>
+        </p:txBody>
+      </p:sp>
+    </p:spTree>
+    <p:extLst>
+      <p:ext uri="{BB962C8B-B14F-4D97-AF65-F5344CB8AC3E}">
+        <p14:creationId xmlns:p14="http://schemas.microsoft.com/office/powerpoint/2010/main" val="2416233887"/>
+      </p:ext>
+    </p:extLst>
+  </p:cSld>
+  <p:clrMapOvr>
+    <a:masterClrMapping/>
+  </p:clrMapOvr>
+  <p:timing>
+    <p:tnLst>
+      <p:par>
+        <p:cTn id="1" dur="indefinite" restart="never" nodeType="tmRoot"/>
+      </p:par>
+    </p:tnLst>
+  </p:timing>
+</p:sld>
+</file>
+
+<file path=ppt/slides/slide22.xml><?xml version="1.0" encoding="utf-8"?>
+<p:sld xmlns:a="http://schemas.openxmlformats.org/drawingml/2006/main" xmlns:r="http://schemas.openxmlformats.org/officeDocument/2006/relationships" xmlns:p="http://schemas.openxmlformats.org/presentationml/2006/main">
+  <p:cSld>
+    <p:spTree>
+      <p:nvGrpSpPr>
+        <p:cNvPr id="1" name=""/>
+        <p:cNvGrpSpPr/>
+        <p:nvPr/>
+      </p:nvGrpSpPr>
+      <p:grpSpPr>
+        <a:xfrm>
+          <a:off x="0" y="0"/>
+          <a:ext cx="0" cy="0"/>
+          <a:chOff x="0" y="0"/>
+          <a:chExt cx="0" cy="0"/>
+        </a:xfrm>
+      </p:grpSpPr>
+      <p:sp>
+        <p:nvSpPr>
+          <p:cNvPr id="2" name="제목 1"/>
+          <p:cNvSpPr>
+            <a:spLocks noGrp="1"/>
+          </p:cNvSpPr>
+          <p:nvPr>
+            <p:ph type="title"/>
+          </p:nvPr>
+        </p:nvSpPr>
+        <p:spPr/>
+        <p:txBody>
+          <a:bodyPr>
+            <a:normAutofit fontScale="90000"/>
+          </a:bodyPr>
+          <a:lstStyle/>
+          <a:p>
+            <a:r>
+              <a:rPr lang="ko-KR" altLang="en-US" dirty="0" smtClean="0"/>
+              <a:t>작고 가볍다</a:t>
+            </a:r>
+            <a:r>
+              <a:rPr lang="en-US" altLang="ko-KR" dirty="0" smtClean="0"/>
+              <a:t/>
+            </a:r>
+            <a:br>
+              <a:rPr lang="en-US" altLang="ko-KR" dirty="0" smtClean="0"/>
+            </a:br>
+            <a:r>
+              <a:rPr lang="ko-KR" altLang="en-US" dirty="0" smtClean="0"/>
+              <a:t>단순하다</a:t>
+            </a:r>
+            <a:endParaRPr lang="ko-KR" altLang="en-US" dirty="0"/>
+          </a:p>
+        </p:txBody>
+      </p:sp>
+    </p:spTree>
+    <p:extLst>
+      <p:ext uri="{BB962C8B-B14F-4D97-AF65-F5344CB8AC3E}">
+        <p14:creationId xmlns:p14="http://schemas.microsoft.com/office/powerpoint/2010/main" val="2211194570"/>
       </p:ext>
     </p:extLst>
   </p:cSld>
@@ -8740,9 +9069,9 @@
           <p:grpSpPr>
             <a:xfrm>
               <a:off x="3035560" y="2640086"/>
-              <a:ext cx="1036289" cy="1095195"/>
+              <a:ext cx="1036289" cy="1135372"/>
               <a:chOff x="1877654" y="1556951"/>
-              <a:chExt cx="873783" cy="839506"/>
+              <a:chExt cx="873783" cy="870303"/>
             </a:xfrm>
           </p:grpSpPr>
           <p:sp>
@@ -8800,7 +9129,9 @@
                       <a:srgbClr val="333333"/>
                     </a:solidFill>
                   </a:ln>
-                  <a:noFill/>
+                  <a:solidFill>
+                    <a:schemeClr val="tx1"/>
+                  </a:solidFill>
                 </a:endParaRPr>
               </a:p>
             </p:txBody>
@@ -8849,7 +9180,7 @@
             <p:spPr>
               <a:xfrm>
                 <a:off x="1877654" y="2120555"/>
-                <a:ext cx="870143" cy="274074"/>
+                <a:ext cx="870143" cy="306699"/>
               </a:xfrm>
               <a:prstGeom prst="rect">
                 <a:avLst/>
@@ -8868,18 +9199,12 @@
                 <a:pPr algn="ctr"/>
                 <a:r>
                   <a:rPr lang="en-US" altLang="ko-KR" sz="2000" dirty="0">
-                    <a:solidFill>
-                      <a:srgbClr val="333333"/>
-                    </a:solidFill>
                     <a:latin typeface="넥슨 풋볼고딕 B" panose="020B0803000000000000" pitchFamily="50" charset="-127"/>
                     <a:ea typeface="넥슨 풋볼고딕 B" panose="020B0803000000000000" pitchFamily="50" charset="-127"/>
                   </a:rPr>
                   <a:t>0</a:t>
                 </a:r>
                 <a:endParaRPr lang="ko-KR" altLang="en-US" sz="2000" dirty="0">
-                  <a:solidFill>
-                    <a:srgbClr val="333333"/>
-                  </a:solidFill>
                   <a:latin typeface="넥슨 풋볼고딕 B" panose="020B0803000000000000" pitchFamily="50" charset="-127"/>
                   <a:ea typeface="넥슨 풋볼고딕 B" panose="020B0803000000000000" pitchFamily="50" charset="-127"/>
                 </a:endParaRPr>
@@ -8902,9 +9227,7 @@
               </a:prstGeom>
               <a:noFill/>
               <a:ln>
-                <a:solidFill>
-                  <a:schemeClr val="tx1"/>
-                </a:solidFill>
+                <a:noFill/>
               </a:ln>
             </p:spPr>
             <p:txBody>
@@ -8916,18 +9239,12 @@
                 <a:pPr algn="ctr"/>
                 <a:r>
                   <a:rPr lang="en-US" altLang="ko-KR" sz="2100" dirty="0" smtClean="0">
-                    <a:solidFill>
-                      <a:srgbClr val="333333"/>
-                    </a:solidFill>
                     <a:latin typeface="넥슨 풋볼고딕 B" panose="020B0803000000000000" pitchFamily="50" charset="-127"/>
                     <a:ea typeface="넥슨 풋볼고딕 B" panose="020B0803000000000000" pitchFamily="50" charset="-127"/>
                   </a:rPr>
                   <a:t>10</a:t>
                 </a:r>
                 <a:endParaRPr lang="ko-KR" altLang="en-US" sz="2100" dirty="0">
-                  <a:solidFill>
-                    <a:srgbClr val="333333"/>
-                  </a:solidFill>
                   <a:latin typeface="넥슨 풋볼고딕 B" panose="020B0803000000000000" pitchFamily="50" charset="-127"/>
                   <a:ea typeface="넥슨 풋볼고딕 B" panose="020B0803000000000000" pitchFamily="50" charset="-127"/>
                 </a:endParaRPr>
@@ -8944,9 +9261,9 @@
           <p:grpSpPr>
             <a:xfrm>
               <a:off x="4487804" y="2640086"/>
-              <a:ext cx="1036289" cy="1095195"/>
+              <a:ext cx="1036289" cy="1135372"/>
               <a:chOff x="1877654" y="1556951"/>
-              <a:chExt cx="873783" cy="839506"/>
+              <a:chExt cx="873783" cy="870303"/>
             </a:xfrm>
           </p:grpSpPr>
           <p:sp>
@@ -9004,7 +9321,9 @@
                       <a:srgbClr val="333333"/>
                     </a:solidFill>
                   </a:ln>
-                  <a:noFill/>
+                  <a:solidFill>
+                    <a:schemeClr val="tx1"/>
+                  </a:solidFill>
                 </a:endParaRPr>
               </a:p>
             </p:txBody>
@@ -9053,7 +9372,7 @@
             <p:spPr>
               <a:xfrm>
                 <a:off x="1877654" y="2120555"/>
-                <a:ext cx="870143" cy="274074"/>
+                <a:ext cx="870143" cy="306699"/>
               </a:xfrm>
               <a:prstGeom prst="rect">
                 <a:avLst/>
@@ -9072,18 +9391,12 @@
                 <a:pPr algn="ctr"/>
                 <a:r>
                   <a:rPr lang="en-US" altLang="ko-KR" sz="2000" dirty="0">
-                    <a:solidFill>
-                      <a:srgbClr val="333333"/>
-                    </a:solidFill>
                     <a:latin typeface="넥슨 풋볼고딕 B" panose="020B0803000000000000" pitchFamily="50" charset="-127"/>
                     <a:ea typeface="넥슨 풋볼고딕 B" panose="020B0803000000000000" pitchFamily="50" charset="-127"/>
                   </a:rPr>
                   <a:t>1</a:t>
                 </a:r>
                 <a:endParaRPr lang="ko-KR" altLang="en-US" sz="2000" dirty="0">
-                  <a:solidFill>
-                    <a:srgbClr val="333333"/>
-                  </a:solidFill>
                   <a:latin typeface="넥슨 풋볼고딕 B" panose="020B0803000000000000" pitchFamily="50" charset="-127"/>
                   <a:ea typeface="넥슨 풋볼고딕 B" panose="020B0803000000000000" pitchFamily="50" charset="-127"/>
                 </a:endParaRPr>
@@ -9118,18 +9431,12 @@
                 <a:pPr algn="ctr"/>
                 <a:r>
                   <a:rPr lang="en-US" altLang="ko-KR" sz="2100" dirty="0" smtClean="0">
-                    <a:solidFill>
-                      <a:srgbClr val="333333"/>
-                    </a:solidFill>
                     <a:latin typeface="넥슨 풋볼고딕 B" panose="020B0803000000000000" pitchFamily="50" charset="-127"/>
                     <a:ea typeface="넥슨 풋볼고딕 B" panose="020B0803000000000000" pitchFamily="50" charset="-127"/>
                   </a:rPr>
                   <a:t>20</a:t>
                 </a:r>
                 <a:endParaRPr lang="ko-KR" altLang="en-US" sz="2100" dirty="0">
-                  <a:solidFill>
-                    <a:srgbClr val="333333"/>
-                  </a:solidFill>
                   <a:latin typeface="넥슨 풋볼고딕 B" panose="020B0803000000000000" pitchFamily="50" charset="-127"/>
                   <a:ea typeface="넥슨 풋볼고딕 B" panose="020B0803000000000000" pitchFamily="50" charset="-127"/>
                 </a:endParaRPr>
@@ -9146,9 +9453,9 @@
           <p:grpSpPr>
             <a:xfrm>
               <a:off x="5940047" y="2640086"/>
-              <a:ext cx="1036289" cy="1095195"/>
+              <a:ext cx="1036289" cy="1135372"/>
               <a:chOff x="1877654" y="1556951"/>
-              <a:chExt cx="873783" cy="839506"/>
+              <a:chExt cx="873783" cy="870303"/>
             </a:xfrm>
           </p:grpSpPr>
           <p:sp>
@@ -9206,7 +9513,9 @@
                       <a:srgbClr val="333333"/>
                     </a:solidFill>
                   </a:ln>
-                  <a:noFill/>
+                  <a:solidFill>
+                    <a:schemeClr val="tx1"/>
+                  </a:solidFill>
                 </a:endParaRPr>
               </a:p>
             </p:txBody>
@@ -9255,7 +9564,7 @@
             <p:spPr>
               <a:xfrm>
                 <a:off x="1877654" y="2120555"/>
-                <a:ext cx="870143" cy="274074"/>
+                <a:ext cx="870143" cy="306699"/>
               </a:xfrm>
               <a:prstGeom prst="rect">
                 <a:avLst/>
@@ -9274,18 +9583,12 @@
                 <a:pPr algn="ctr"/>
                 <a:r>
                   <a:rPr lang="en-US" altLang="ko-KR" sz="2000" dirty="0">
-                    <a:solidFill>
-                      <a:srgbClr val="333333"/>
-                    </a:solidFill>
                     <a:latin typeface="넥슨 풋볼고딕 B" panose="020B0803000000000000" pitchFamily="50" charset="-127"/>
                     <a:ea typeface="넥슨 풋볼고딕 B" panose="020B0803000000000000" pitchFamily="50" charset="-127"/>
                   </a:rPr>
                   <a:t>2</a:t>
                 </a:r>
                 <a:endParaRPr lang="ko-KR" altLang="en-US" sz="2000" dirty="0">
-                  <a:solidFill>
-                    <a:srgbClr val="333333"/>
-                  </a:solidFill>
                   <a:latin typeface="넥슨 풋볼고딕 B" panose="020B0803000000000000" pitchFamily="50" charset="-127"/>
                   <a:ea typeface="넥슨 풋볼고딕 B" panose="020B0803000000000000" pitchFamily="50" charset="-127"/>
                 </a:endParaRPr>
@@ -9320,18 +9623,12 @@
                 <a:pPr algn="ctr"/>
                 <a:r>
                   <a:rPr lang="en-US" altLang="ko-KR" sz="2100" dirty="0" smtClean="0">
-                    <a:solidFill>
-                      <a:srgbClr val="333333"/>
-                    </a:solidFill>
                     <a:latin typeface="넥슨 풋볼고딕 B" panose="020B0803000000000000" pitchFamily="50" charset="-127"/>
                     <a:ea typeface="넥슨 풋볼고딕 B" panose="020B0803000000000000" pitchFamily="50" charset="-127"/>
                   </a:rPr>
                   <a:t>30</a:t>
                 </a:r>
                 <a:endParaRPr lang="ko-KR" altLang="en-US" sz="2100" dirty="0">
-                  <a:solidFill>
-                    <a:srgbClr val="333333"/>
-                  </a:solidFill>
                   <a:latin typeface="넥슨 풋볼고딕 B" panose="020B0803000000000000" pitchFamily="50" charset="-127"/>
                   <a:ea typeface="넥슨 풋볼고딕 B" panose="020B0803000000000000" pitchFamily="50" charset="-127"/>
                 </a:endParaRPr>
@@ -9408,7 +9705,9 @@
                       <a:srgbClr val="333333"/>
                     </a:solidFill>
                   </a:ln>
-                  <a:noFill/>
+                  <a:solidFill>
+                    <a:schemeClr val="tx1"/>
+                  </a:solidFill>
                 </a:endParaRPr>
               </a:p>
             </p:txBody>
@@ -9476,18 +9775,12 @@
                 <a:pPr algn="ctr"/>
                 <a:r>
                   <a:rPr lang="en-US" altLang="ko-KR" sz="2000" dirty="0" smtClean="0">
-                    <a:solidFill>
-                      <a:srgbClr val="333333"/>
-                    </a:solidFill>
                     <a:latin typeface="넥슨 풋볼고딕 B" panose="020B0803000000000000" pitchFamily="50" charset="-127"/>
                     <a:ea typeface="넥슨 풋볼고딕 B" panose="020B0803000000000000" pitchFamily="50" charset="-127"/>
                   </a:rPr>
                   <a:t>3</a:t>
                 </a:r>
                 <a:endParaRPr lang="ko-KR" altLang="en-US" sz="2000" dirty="0">
-                  <a:solidFill>
-                    <a:srgbClr val="333333"/>
-                  </a:solidFill>
                   <a:latin typeface="넥슨 풋볼고딕 B" panose="020B0803000000000000" pitchFamily="50" charset="-127"/>
                   <a:ea typeface="넥슨 풋볼고딕 B" panose="020B0803000000000000" pitchFamily="50" charset="-127"/>
                 </a:endParaRPr>
@@ -9522,18 +9815,12 @@
                 <a:pPr algn="ctr"/>
                 <a:r>
                   <a:rPr lang="en-US" altLang="ko-KR" sz="2100" dirty="0" smtClean="0">
-                    <a:solidFill>
-                      <a:srgbClr val="333333"/>
-                    </a:solidFill>
                     <a:latin typeface="넥슨 풋볼고딕 B" panose="020B0803000000000000" pitchFamily="50" charset="-127"/>
                     <a:ea typeface="넥슨 풋볼고딕 B" panose="020B0803000000000000" pitchFamily="50" charset="-127"/>
                   </a:rPr>
                   <a:t>0</a:t>
                 </a:r>
                 <a:endParaRPr lang="ko-KR" altLang="en-US" sz="2100" dirty="0">
-                  <a:solidFill>
-                    <a:srgbClr val="333333"/>
-                  </a:solidFill>
                   <a:latin typeface="넥슨 풋볼고딕 B" panose="020B0803000000000000" pitchFamily="50" charset="-127"/>
                   <a:ea typeface="넥슨 풋볼고딕 B" panose="020B0803000000000000" pitchFamily="50" charset="-127"/>
                 </a:endParaRPr>

</xml_diff>